<commit_message>
Mācību materiālā veikti labojumi tekstam. Izveidots pirmo uzdevumu piemēru slaids.
</commit_message>
<xml_diff>
--- a/Mainigie_DatuTipi_macibu_materials.pptx
+++ b/Mainigie_DatuTipi_macibu_materials.pptx
@@ -178,7 +178,7 @@
           <a:noFill/>
           <a:extLst>
             <a:ext uri="{909E8E84-426E-40dd-AFC4-6F175D3DCCD1}">
-              <a14:hiddenFill xmlns:a14="http://schemas.microsoft.com/office/drawing/2010/main" xmlns="">
+              <a14:hiddenFill xmlns="" xmlns:a14="http://schemas.microsoft.com/office/drawing/2010/main">
                 <a:solidFill>
                   <a:srgbClr val="FFFFFF"/>
                 </a:solidFill>
@@ -238,7 +238,7 @@
             </a:ln>
             <a:extLst>
               <a:ext uri="{91240B29-F687-4f45-9708-019B960494DF}">
-                <a14:hiddenLine xmlns:a14="http://schemas.microsoft.com/office/drawing/2010/main" xmlns="" w="9525">
+                <a14:hiddenLine xmlns="" xmlns:a14="http://schemas.microsoft.com/office/drawing/2010/main" w="9525">
                   <a:solidFill>
                     <a:srgbClr val="000000"/>
                   </a:solidFill>
@@ -328,7 +328,7 @@
             </a:ln>
             <a:extLst>
               <a:ext uri="{91240B29-F687-4f45-9708-019B960494DF}">
-                <a14:hiddenLine xmlns:a14="http://schemas.microsoft.com/office/drawing/2010/main" xmlns="" w="9525">
+                <a14:hiddenLine xmlns="" xmlns:a14="http://schemas.microsoft.com/office/drawing/2010/main" w="9525">
                   <a:solidFill>
                     <a:srgbClr val="000000"/>
                   </a:solidFill>
@@ -418,7 +418,7 @@
             </a:ln>
             <a:extLst>
               <a:ext uri="{91240B29-F687-4f45-9708-019B960494DF}">
-                <a14:hiddenLine xmlns:a14="http://schemas.microsoft.com/office/drawing/2010/main" xmlns="" w="9525">
+                <a14:hiddenLine xmlns="" xmlns:a14="http://schemas.microsoft.com/office/drawing/2010/main" w="9525">
                   <a:solidFill>
                     <a:srgbClr val="000000"/>
                   </a:solidFill>
@@ -452,7 +452,7 @@
             </a:ln>
             <a:extLst>
               <a:ext uri="{91240B29-F687-4f45-9708-019B960494DF}">
-                <a14:hiddenLine xmlns:a14="http://schemas.microsoft.com/office/drawing/2010/main" xmlns="" w="9525">
+                <a14:hiddenLine xmlns="" xmlns:a14="http://schemas.microsoft.com/office/drawing/2010/main" w="9525">
                   <a:solidFill>
                     <a:srgbClr val="000000"/>
                   </a:solidFill>
@@ -542,7 +542,7 @@
             </a:ln>
             <a:extLst>
               <a:ext uri="{91240B29-F687-4f45-9708-019B960494DF}">
-                <a14:hiddenLine xmlns:a14="http://schemas.microsoft.com/office/drawing/2010/main" xmlns="" w="9525">
+                <a14:hiddenLine xmlns="" xmlns:a14="http://schemas.microsoft.com/office/drawing/2010/main" w="9525">
                   <a:solidFill>
                     <a:srgbClr val="000000"/>
                   </a:solidFill>
@@ -604,7 +604,7 @@
             </a:ln>
             <a:extLst>
               <a:ext uri="{91240B29-F687-4f45-9708-019B960494DF}">
-                <a14:hiddenLine xmlns:a14="http://schemas.microsoft.com/office/drawing/2010/main" xmlns="" w="9525">
+                <a14:hiddenLine xmlns="" xmlns:a14="http://schemas.microsoft.com/office/drawing/2010/main" w="9525">
                   <a:solidFill>
                     <a:srgbClr val="000000"/>
                   </a:solidFill>
@@ -666,7 +666,7 @@
             </a:ln>
             <a:extLst>
               <a:ext uri="{91240B29-F687-4f45-9708-019B960494DF}">
-                <a14:hiddenLine xmlns:a14="http://schemas.microsoft.com/office/drawing/2010/main" xmlns="" w="9525">
+                <a14:hiddenLine xmlns="" xmlns:a14="http://schemas.microsoft.com/office/drawing/2010/main" w="9525">
                   <a:solidFill>
                     <a:srgbClr val="000000"/>
                   </a:solidFill>
@@ -756,7 +756,7 @@
             </a:ln>
             <a:extLst>
               <a:ext uri="{91240B29-F687-4f45-9708-019B960494DF}">
-                <a14:hiddenLine xmlns:a14="http://schemas.microsoft.com/office/drawing/2010/main" xmlns="" w="9525">
+                <a14:hiddenLine xmlns="" xmlns:a14="http://schemas.microsoft.com/office/drawing/2010/main" w="9525">
                   <a:solidFill>
                     <a:srgbClr val="000000"/>
                   </a:solidFill>
@@ -818,7 +818,7 @@
             </a:ln>
             <a:extLst>
               <a:ext uri="{91240B29-F687-4f45-9708-019B960494DF}">
-                <a14:hiddenLine xmlns:a14="http://schemas.microsoft.com/office/drawing/2010/main" xmlns="" w="9525">
+                <a14:hiddenLine xmlns="" xmlns:a14="http://schemas.microsoft.com/office/drawing/2010/main" w="9525">
                   <a:solidFill>
                     <a:srgbClr val="000000"/>
                   </a:solidFill>
@@ -880,7 +880,7 @@
             </a:ln>
             <a:extLst>
               <a:ext uri="{91240B29-F687-4f45-9708-019B960494DF}">
-                <a14:hiddenLine xmlns:a14="http://schemas.microsoft.com/office/drawing/2010/main" xmlns="" w="9525">
+                <a14:hiddenLine xmlns="" xmlns:a14="http://schemas.microsoft.com/office/drawing/2010/main" w="9525">
                   <a:solidFill>
                     <a:srgbClr val="000000"/>
                   </a:solidFill>
@@ -970,7 +970,7 @@
             </a:ln>
             <a:extLst>
               <a:ext uri="{91240B29-F687-4f45-9708-019B960494DF}">
-                <a14:hiddenLine xmlns:a14="http://schemas.microsoft.com/office/drawing/2010/main" xmlns="" w="9525">
+                <a14:hiddenLine xmlns="" xmlns:a14="http://schemas.microsoft.com/office/drawing/2010/main" w="9525">
                   <a:solidFill>
                     <a:srgbClr val="000000"/>
                   </a:solidFill>
@@ -1060,7 +1060,7 @@
             </a:ln>
             <a:extLst>
               <a:ext uri="{91240B29-F687-4f45-9708-019B960494DF}">
-                <a14:hiddenLine xmlns:a14="http://schemas.microsoft.com/office/drawing/2010/main" xmlns="" w="9525">
+                <a14:hiddenLine xmlns="" xmlns:a14="http://schemas.microsoft.com/office/drawing/2010/main" w="9525">
                   <a:solidFill>
                     <a:srgbClr val="000000"/>
                   </a:solidFill>
@@ -1122,7 +1122,7 @@
             </a:ln>
             <a:extLst>
               <a:ext uri="{91240B29-F687-4f45-9708-019B960494DF}">
-                <a14:hiddenLine xmlns:a14="http://schemas.microsoft.com/office/drawing/2010/main" xmlns="" w="9525">
+                <a14:hiddenLine xmlns="" xmlns:a14="http://schemas.microsoft.com/office/drawing/2010/main" w="9525">
                   <a:solidFill>
                     <a:srgbClr val="000000"/>
                   </a:solidFill>
@@ -1232,7 +1232,7 @@
             </a:ln>
             <a:extLst>
               <a:ext uri="{91240B29-F687-4f45-9708-019B960494DF}">
-                <a14:hiddenLine xmlns:a14="http://schemas.microsoft.com/office/drawing/2010/main" xmlns="" w="9525">
+                <a14:hiddenLine xmlns="" xmlns:a14="http://schemas.microsoft.com/office/drawing/2010/main" w="9525">
                   <a:solidFill>
                     <a:srgbClr val="000000"/>
                   </a:solidFill>
@@ -1294,7 +1294,7 @@
             </a:ln>
             <a:extLst>
               <a:ext uri="{91240B29-F687-4f45-9708-019B960494DF}">
-                <a14:hiddenLine xmlns:a14="http://schemas.microsoft.com/office/drawing/2010/main" xmlns="" w="9525">
+                <a14:hiddenLine xmlns="" xmlns:a14="http://schemas.microsoft.com/office/drawing/2010/main" w="9525">
                   <a:solidFill>
                     <a:srgbClr val="000000"/>
                   </a:solidFill>
@@ -1384,7 +1384,7 @@
             </a:ln>
             <a:extLst>
               <a:ext uri="{91240B29-F687-4f45-9708-019B960494DF}">
-                <a14:hiddenLine xmlns:a14="http://schemas.microsoft.com/office/drawing/2010/main" xmlns="" w="9525">
+                <a14:hiddenLine xmlns="" xmlns:a14="http://schemas.microsoft.com/office/drawing/2010/main" w="9525">
                   <a:solidFill>
                     <a:srgbClr val="000000"/>
                   </a:solidFill>
@@ -1474,7 +1474,7 @@
             </a:ln>
             <a:extLst>
               <a:ext uri="{91240B29-F687-4f45-9708-019B960494DF}">
-                <a14:hiddenLine xmlns:a14="http://schemas.microsoft.com/office/drawing/2010/main" xmlns="" w="9525">
+                <a14:hiddenLine xmlns="" xmlns:a14="http://schemas.microsoft.com/office/drawing/2010/main" w="9525">
                   <a:solidFill>
                     <a:srgbClr val="000000"/>
                   </a:solidFill>
@@ -1536,7 +1536,7 @@
             </a:ln>
             <a:extLst>
               <a:ext uri="{91240B29-F687-4f45-9708-019B960494DF}">
-                <a14:hiddenLine xmlns:a14="http://schemas.microsoft.com/office/drawing/2010/main" xmlns="" w="9525">
+                <a14:hiddenLine xmlns="" xmlns:a14="http://schemas.microsoft.com/office/drawing/2010/main" w="9525">
                   <a:solidFill>
                     <a:srgbClr val="000000"/>
                   </a:solidFill>
@@ -1626,7 +1626,7 @@
             </a:ln>
             <a:extLst>
               <a:ext uri="{91240B29-F687-4f45-9708-019B960494DF}">
-                <a14:hiddenLine xmlns:a14="http://schemas.microsoft.com/office/drawing/2010/main" xmlns="" w="9525">
+                <a14:hiddenLine xmlns="" xmlns:a14="http://schemas.microsoft.com/office/drawing/2010/main" w="9525">
                   <a:solidFill>
                     <a:srgbClr val="000000"/>
                   </a:solidFill>
@@ -1716,7 +1716,7 @@
             </a:ln>
             <a:extLst>
               <a:ext uri="{91240B29-F687-4f45-9708-019B960494DF}">
-                <a14:hiddenLine xmlns:a14="http://schemas.microsoft.com/office/drawing/2010/main" xmlns="" w="9525">
+                <a14:hiddenLine xmlns="" xmlns:a14="http://schemas.microsoft.com/office/drawing/2010/main" w="9525">
                   <a:solidFill>
                     <a:srgbClr val="000000"/>
                   </a:solidFill>
@@ -1772,7 +1772,7 @@
             </a:ln>
             <a:extLst>
               <a:ext uri="{91240B29-F687-4f45-9708-019B960494DF}">
-                <a14:hiddenLine xmlns:a14="http://schemas.microsoft.com/office/drawing/2010/main" xmlns="" w="9525">
+                <a14:hiddenLine xmlns="" xmlns:a14="http://schemas.microsoft.com/office/drawing/2010/main" w="9525">
                   <a:solidFill>
                     <a:srgbClr val="000000"/>
                   </a:solidFill>
@@ -1862,7 +1862,7 @@
             </a:ln>
             <a:extLst>
               <a:ext uri="{91240B29-F687-4f45-9708-019B960494DF}">
-                <a14:hiddenLine xmlns:a14="http://schemas.microsoft.com/office/drawing/2010/main" xmlns="" w="9525">
+                <a14:hiddenLine xmlns="" xmlns:a14="http://schemas.microsoft.com/office/drawing/2010/main" w="9525">
                   <a:solidFill>
                     <a:srgbClr val="000000"/>
                   </a:solidFill>
@@ -1918,7 +1918,7 @@
             </a:ln>
             <a:extLst>
               <a:ext uri="{91240B29-F687-4f45-9708-019B960494DF}">
-                <a14:hiddenLine xmlns:a14="http://schemas.microsoft.com/office/drawing/2010/main" xmlns="" w="9525">
+                <a14:hiddenLine xmlns="" xmlns:a14="http://schemas.microsoft.com/office/drawing/2010/main" w="9525">
                   <a:solidFill>
                     <a:srgbClr val="000000"/>
                   </a:solidFill>
@@ -2008,7 +2008,7 @@
             </a:ln>
             <a:extLst>
               <a:ext uri="{91240B29-F687-4f45-9708-019B960494DF}">
-                <a14:hiddenLine xmlns:a14="http://schemas.microsoft.com/office/drawing/2010/main" xmlns="" w="9525">
+                <a14:hiddenLine xmlns="" xmlns:a14="http://schemas.microsoft.com/office/drawing/2010/main" w="9525">
                   <a:solidFill>
                     <a:srgbClr val="000000"/>
                   </a:solidFill>
@@ -2076,7 +2076,7 @@
             </a:ln>
             <a:extLst>
               <a:ext uri="{91240B29-F687-4f45-9708-019B960494DF}">
-                <a14:hiddenLine xmlns:a14="http://schemas.microsoft.com/office/drawing/2010/main" xmlns="" w="9525">
+                <a14:hiddenLine xmlns="" xmlns:a14="http://schemas.microsoft.com/office/drawing/2010/main" w="9525">
                   <a:solidFill>
                     <a:srgbClr val="000000"/>
                   </a:solidFill>
@@ -2166,7 +2166,7 @@
             </a:ln>
             <a:extLst>
               <a:ext uri="{91240B29-F687-4f45-9708-019B960494DF}">
-                <a14:hiddenLine xmlns:a14="http://schemas.microsoft.com/office/drawing/2010/main" xmlns="" w="9525">
+                <a14:hiddenLine xmlns="" xmlns:a14="http://schemas.microsoft.com/office/drawing/2010/main" w="9525">
                   <a:solidFill>
                     <a:srgbClr val="000000"/>
                   </a:solidFill>
@@ -2234,7 +2234,7 @@
             </a:ln>
             <a:extLst>
               <a:ext uri="{91240B29-F687-4f45-9708-019B960494DF}">
-                <a14:hiddenLine xmlns:a14="http://schemas.microsoft.com/office/drawing/2010/main" xmlns="" w="9525">
+                <a14:hiddenLine xmlns="" xmlns:a14="http://schemas.microsoft.com/office/drawing/2010/main" w="9525">
                   <a:solidFill>
                     <a:srgbClr val="000000"/>
                   </a:solidFill>
@@ -2324,7 +2324,7 @@
             </a:ln>
             <a:extLst>
               <a:ext uri="{91240B29-F687-4f45-9708-019B960494DF}">
-                <a14:hiddenLine xmlns:a14="http://schemas.microsoft.com/office/drawing/2010/main" xmlns="" w="9525">
+                <a14:hiddenLine xmlns="" xmlns:a14="http://schemas.microsoft.com/office/drawing/2010/main" w="9525">
                   <a:solidFill>
                     <a:srgbClr val="000000"/>
                   </a:solidFill>
@@ -2358,7 +2358,7 @@
             </a:ln>
             <a:extLst>
               <a:ext uri="{91240B29-F687-4f45-9708-019B960494DF}">
-                <a14:hiddenLine xmlns:a14="http://schemas.microsoft.com/office/drawing/2010/main" xmlns="" w="9525">
+                <a14:hiddenLine xmlns="" xmlns:a14="http://schemas.microsoft.com/office/drawing/2010/main" w="9525">
                   <a:solidFill>
                     <a:srgbClr val="000000"/>
                   </a:solidFill>
@@ -2448,7 +2448,7 @@
             </a:ln>
             <a:extLst>
               <a:ext uri="{91240B29-F687-4f45-9708-019B960494DF}">
-                <a14:hiddenLine xmlns:a14="http://schemas.microsoft.com/office/drawing/2010/main" xmlns="" w="9525">
+                <a14:hiddenLine xmlns="" xmlns:a14="http://schemas.microsoft.com/office/drawing/2010/main" w="9525">
                   <a:solidFill>
                     <a:srgbClr val="000000"/>
                   </a:solidFill>
@@ -2510,7 +2510,7 @@
             </a:ln>
             <a:extLst>
               <a:ext uri="{91240B29-F687-4f45-9708-019B960494DF}">
-                <a14:hiddenLine xmlns:a14="http://schemas.microsoft.com/office/drawing/2010/main" xmlns="" w="9525">
+                <a14:hiddenLine xmlns="" xmlns:a14="http://schemas.microsoft.com/office/drawing/2010/main" w="9525">
                   <a:solidFill>
                     <a:srgbClr val="000000"/>
                   </a:solidFill>
@@ -2572,7 +2572,7 @@
             </a:ln>
             <a:extLst>
               <a:ext uri="{91240B29-F687-4f45-9708-019B960494DF}">
-                <a14:hiddenLine xmlns:a14="http://schemas.microsoft.com/office/drawing/2010/main" xmlns="" w="9525">
+                <a14:hiddenLine xmlns="" xmlns:a14="http://schemas.microsoft.com/office/drawing/2010/main" w="9525">
                   <a:solidFill>
                     <a:srgbClr val="000000"/>
                   </a:solidFill>
@@ -2662,7 +2662,7 @@
             </a:ln>
             <a:extLst>
               <a:ext uri="{91240B29-F687-4f45-9708-019B960494DF}">
-                <a14:hiddenLine xmlns:a14="http://schemas.microsoft.com/office/drawing/2010/main" xmlns="" w="9525">
+                <a14:hiddenLine xmlns="" xmlns:a14="http://schemas.microsoft.com/office/drawing/2010/main" w="9525">
                   <a:solidFill>
                     <a:srgbClr val="000000"/>
                   </a:solidFill>
@@ -2730,7 +2730,7 @@
             </a:ln>
             <a:extLst>
               <a:ext uri="{91240B29-F687-4f45-9708-019B960494DF}">
-                <a14:hiddenLine xmlns:a14="http://schemas.microsoft.com/office/drawing/2010/main" xmlns="" w="9525">
+                <a14:hiddenLine xmlns="" xmlns:a14="http://schemas.microsoft.com/office/drawing/2010/main" w="9525">
                   <a:solidFill>
                     <a:srgbClr val="000000"/>
                   </a:solidFill>
@@ -2792,7 +2792,7 @@
             </a:ln>
             <a:extLst>
               <a:ext uri="{91240B29-F687-4f45-9708-019B960494DF}">
-                <a14:hiddenLine xmlns:a14="http://schemas.microsoft.com/office/drawing/2010/main" xmlns="" w="9525">
+                <a14:hiddenLine xmlns="" xmlns:a14="http://schemas.microsoft.com/office/drawing/2010/main" w="9525">
                   <a:solidFill>
                     <a:srgbClr val="000000"/>
                   </a:solidFill>
@@ -2882,7 +2882,7 @@
             </a:ln>
             <a:extLst>
               <a:ext uri="{91240B29-F687-4f45-9708-019B960494DF}">
-                <a14:hiddenLine xmlns:a14="http://schemas.microsoft.com/office/drawing/2010/main" xmlns="" w="9525">
+                <a14:hiddenLine xmlns="" xmlns:a14="http://schemas.microsoft.com/office/drawing/2010/main" w="9525">
                   <a:solidFill>
                     <a:srgbClr val="000000"/>
                   </a:solidFill>
@@ -2944,7 +2944,7 @@
             </a:ln>
             <a:extLst>
               <a:ext uri="{91240B29-F687-4f45-9708-019B960494DF}">
-                <a14:hiddenLine xmlns:a14="http://schemas.microsoft.com/office/drawing/2010/main" xmlns="" w="9525">
+                <a14:hiddenLine xmlns="" xmlns:a14="http://schemas.microsoft.com/office/drawing/2010/main" w="9525">
                   <a:solidFill>
                     <a:srgbClr val="000000"/>
                   </a:solidFill>
@@ -3034,7 +3034,7 @@
             </a:ln>
             <a:extLst>
               <a:ext uri="{91240B29-F687-4f45-9708-019B960494DF}">
-                <a14:hiddenLine xmlns:a14="http://schemas.microsoft.com/office/drawing/2010/main" xmlns="" w="9525">
+                <a14:hiddenLine xmlns="" xmlns:a14="http://schemas.microsoft.com/office/drawing/2010/main" w="9525">
                   <a:solidFill>
                     <a:srgbClr val="000000"/>
                   </a:solidFill>
@@ -3096,7 +3096,7 @@
             </a:ln>
             <a:extLst>
               <a:ext uri="{91240B29-F687-4f45-9708-019B960494DF}">
-                <a14:hiddenLine xmlns:a14="http://schemas.microsoft.com/office/drawing/2010/main" xmlns="" w="9525">
+                <a14:hiddenLine xmlns="" xmlns:a14="http://schemas.microsoft.com/office/drawing/2010/main" w="9525">
                   <a:solidFill>
                     <a:srgbClr val="000000"/>
                   </a:solidFill>
@@ -3186,7 +3186,7 @@
             </a:ln>
             <a:extLst>
               <a:ext uri="{91240B29-F687-4f45-9708-019B960494DF}">
-                <a14:hiddenLine xmlns:a14="http://schemas.microsoft.com/office/drawing/2010/main" xmlns="" w="9525">
+                <a14:hiddenLine xmlns="" xmlns:a14="http://schemas.microsoft.com/office/drawing/2010/main" w="9525">
                   <a:solidFill>
                     <a:srgbClr val="000000"/>
                   </a:solidFill>
@@ -3220,7 +3220,7 @@
             </a:ln>
             <a:extLst>
               <a:ext uri="{91240B29-F687-4f45-9708-019B960494DF}">
-                <a14:hiddenLine xmlns:a14="http://schemas.microsoft.com/office/drawing/2010/main" xmlns="" w="9525">
+                <a14:hiddenLine xmlns="" xmlns:a14="http://schemas.microsoft.com/office/drawing/2010/main" w="9525">
                   <a:solidFill>
                     <a:srgbClr val="000000"/>
                   </a:solidFill>
@@ -3285,7 +3285,7 @@
             </a:ln>
             <a:extLst>
               <a:ext uri="{91240B29-F687-4f45-9708-019B960494DF}">
-                <a14:hiddenLine xmlns:a14="http://schemas.microsoft.com/office/drawing/2010/main" xmlns="" w="9525">
+                <a14:hiddenLine xmlns="" xmlns:a14="http://schemas.microsoft.com/office/drawing/2010/main" w="9525">
                   <a:solidFill>
                     <a:srgbClr val="000000"/>
                   </a:solidFill>
@@ -3375,7 +3375,7 @@
             </a:ln>
             <a:extLst>
               <a:ext uri="{91240B29-F687-4f45-9708-019B960494DF}">
-                <a14:hiddenLine xmlns:a14="http://schemas.microsoft.com/office/drawing/2010/main" xmlns="" w="9525">
+                <a14:hiddenLine xmlns="" xmlns:a14="http://schemas.microsoft.com/office/drawing/2010/main" w="9525">
                   <a:solidFill>
                     <a:srgbClr val="000000"/>
                   </a:solidFill>
@@ -3437,7 +3437,7 @@
             </a:ln>
             <a:extLst>
               <a:ext uri="{91240B29-F687-4f45-9708-019B960494DF}">
-                <a14:hiddenLine xmlns:a14="http://schemas.microsoft.com/office/drawing/2010/main" xmlns="" w="9525">
+                <a14:hiddenLine xmlns="" xmlns:a14="http://schemas.microsoft.com/office/drawing/2010/main" w="9525">
                   <a:solidFill>
                     <a:srgbClr val="000000"/>
                   </a:solidFill>
@@ -3527,7 +3527,7 @@
             </a:ln>
             <a:extLst>
               <a:ext uri="{91240B29-F687-4f45-9708-019B960494DF}">
-                <a14:hiddenLine xmlns:a14="http://schemas.microsoft.com/office/drawing/2010/main" xmlns="" w="9525">
+                <a14:hiddenLine xmlns="" xmlns:a14="http://schemas.microsoft.com/office/drawing/2010/main" w="9525">
                   <a:solidFill>
                     <a:srgbClr val="000000"/>
                   </a:solidFill>
@@ -3617,7 +3617,7 @@
             </a:ln>
             <a:extLst>
               <a:ext uri="{91240B29-F687-4f45-9708-019B960494DF}">
-                <a14:hiddenLine xmlns:a14="http://schemas.microsoft.com/office/drawing/2010/main" xmlns="" w="9525">
+                <a14:hiddenLine xmlns="" xmlns:a14="http://schemas.microsoft.com/office/drawing/2010/main" w="9525">
                   <a:solidFill>
                     <a:srgbClr val="000000"/>
                   </a:solidFill>
@@ -3682,7 +3682,7 @@
             </a:ln>
             <a:extLst>
               <a:ext uri="{91240B29-F687-4f45-9708-019B960494DF}">
-                <a14:hiddenLine xmlns:a14="http://schemas.microsoft.com/office/drawing/2010/main" xmlns="" w="9525">
+                <a14:hiddenLine xmlns="" xmlns:a14="http://schemas.microsoft.com/office/drawing/2010/main" w="9525">
                   <a:solidFill>
                     <a:srgbClr val="000000"/>
                   </a:solidFill>
@@ -3744,7 +3744,7 @@
             </a:ln>
             <a:extLst>
               <a:ext uri="{91240B29-F687-4f45-9708-019B960494DF}">
-                <a14:hiddenLine xmlns:a14="http://schemas.microsoft.com/office/drawing/2010/main" xmlns="" w="9525">
+                <a14:hiddenLine xmlns="" xmlns:a14="http://schemas.microsoft.com/office/drawing/2010/main" w="9525">
                   <a:solidFill>
                     <a:srgbClr val="000000"/>
                   </a:solidFill>
@@ -3834,7 +3834,7 @@
             </a:ln>
             <a:extLst>
               <a:ext uri="{91240B29-F687-4f45-9708-019B960494DF}">
-                <a14:hiddenLine xmlns:a14="http://schemas.microsoft.com/office/drawing/2010/main" xmlns="" w="9525">
+                <a14:hiddenLine xmlns="" xmlns:a14="http://schemas.microsoft.com/office/drawing/2010/main" w="9525">
                   <a:solidFill>
                     <a:srgbClr val="000000"/>
                   </a:solidFill>
@@ -3924,7 +3924,7 @@
             </a:ln>
             <a:extLst>
               <a:ext uri="{91240B29-F687-4f45-9708-019B960494DF}">
-                <a14:hiddenLine xmlns:a14="http://schemas.microsoft.com/office/drawing/2010/main" xmlns="" w="9525">
+                <a14:hiddenLine xmlns="" xmlns:a14="http://schemas.microsoft.com/office/drawing/2010/main" w="9525">
                   <a:solidFill>
                     <a:srgbClr val="000000"/>
                   </a:solidFill>
@@ -3986,7 +3986,7 @@
             </a:ln>
             <a:extLst>
               <a:ext uri="{91240B29-F687-4f45-9708-019B960494DF}">
-                <a14:hiddenLine xmlns:a14="http://schemas.microsoft.com/office/drawing/2010/main" xmlns="" w="9525">
+                <a14:hiddenLine xmlns="" xmlns:a14="http://schemas.microsoft.com/office/drawing/2010/main" w="9525">
                   <a:solidFill>
                     <a:srgbClr val="000000"/>
                   </a:solidFill>
@@ -4106,7 +4106,7 @@
             </a:ln>
             <a:extLst>
               <a:ext uri="{91240B29-F687-4f45-9708-019B960494DF}">
-                <a14:hiddenLine xmlns:a14="http://schemas.microsoft.com/office/drawing/2010/main" xmlns="" w="9525">
+                <a14:hiddenLine xmlns="" xmlns:a14="http://schemas.microsoft.com/office/drawing/2010/main" w="9525">
                   <a:solidFill>
                     <a:srgbClr val="000000"/>
                   </a:solidFill>
@@ -4174,7 +4174,7 @@
             </a:ln>
             <a:extLst>
               <a:ext uri="{91240B29-F687-4f45-9708-019B960494DF}">
-                <a14:hiddenLine xmlns:a14="http://schemas.microsoft.com/office/drawing/2010/main" xmlns="" w="9525">
+                <a14:hiddenLine xmlns="" xmlns:a14="http://schemas.microsoft.com/office/drawing/2010/main" w="9525">
                   <a:solidFill>
                     <a:srgbClr val="000000"/>
                   </a:solidFill>
@@ -4264,7 +4264,7 @@
             </a:ln>
             <a:extLst>
               <a:ext uri="{91240B29-F687-4f45-9708-019B960494DF}">
-                <a14:hiddenLine xmlns:a14="http://schemas.microsoft.com/office/drawing/2010/main" xmlns="" w="9525">
+                <a14:hiddenLine xmlns="" xmlns:a14="http://schemas.microsoft.com/office/drawing/2010/main" w="9525">
                   <a:solidFill>
                     <a:srgbClr val="000000"/>
                   </a:solidFill>
@@ -4404,7 +4404,7 @@
           <a:p>
             <a:fld id="{EC6921FB-D1AD-4A93-B134-4EA3BD989524}" type="datetimeFigureOut">
               <a:rPr lang="lv-LV" smtClean="0"/>
-              <a:t>09.06.2025</a:t>
+              <a:t>10.06.2025</a:t>
             </a:fld>
             <a:endParaRPr lang="lv-LV"/>
           </a:p>
@@ -4671,7 +4671,7 @@
           <a:p>
             <a:fld id="{EC6921FB-D1AD-4A93-B134-4EA3BD989524}" type="datetimeFigureOut">
               <a:rPr lang="lv-LV" smtClean="0"/>
-              <a:t>09.06.2025</a:t>
+              <a:t>10.06.2025</a:t>
             </a:fld>
             <a:endParaRPr lang="lv-LV"/>
           </a:p>
@@ -4867,7 +4867,7 @@
           <a:p>
             <a:fld id="{EC6921FB-D1AD-4A93-B134-4EA3BD989524}" type="datetimeFigureOut">
               <a:rPr lang="lv-LV" smtClean="0"/>
-              <a:t>09.06.2025</a:t>
+              <a:t>10.06.2025</a:t>
             </a:fld>
             <a:endParaRPr lang="lv-LV"/>
           </a:p>
@@ -5130,7 +5130,7 @@
           <a:p>
             <a:fld id="{EC6921FB-D1AD-4A93-B134-4EA3BD989524}" type="datetimeFigureOut">
               <a:rPr lang="lv-LV" smtClean="0"/>
-              <a:t>09.06.2025</a:t>
+              <a:t>10.06.2025</a:t>
             </a:fld>
             <a:endParaRPr lang="lv-LV"/>
           </a:p>
@@ -5564,7 +5564,7 @@
           <a:p>
             <a:fld id="{EC6921FB-D1AD-4A93-B134-4EA3BD989524}" type="datetimeFigureOut">
               <a:rPr lang="lv-LV" smtClean="0"/>
-              <a:t>09.06.2025</a:t>
+              <a:t>10.06.2025</a:t>
             </a:fld>
             <a:endParaRPr lang="lv-LV"/>
           </a:p>
@@ -6110,7 +6110,7 @@
           <a:p>
             <a:fld id="{EC6921FB-D1AD-4A93-B134-4EA3BD989524}" type="datetimeFigureOut">
               <a:rPr lang="lv-LV" smtClean="0"/>
-              <a:t>09.06.2025</a:t>
+              <a:t>10.06.2025</a:t>
             </a:fld>
             <a:endParaRPr lang="lv-LV"/>
           </a:p>
@@ -6830,7 +6830,7 @@
           <a:p>
             <a:fld id="{EC6921FB-D1AD-4A93-B134-4EA3BD989524}" type="datetimeFigureOut">
               <a:rPr lang="lv-LV" smtClean="0"/>
-              <a:t>09.06.2025</a:t>
+              <a:t>10.06.2025</a:t>
             </a:fld>
             <a:endParaRPr lang="lv-LV"/>
           </a:p>
@@ -7000,7 +7000,7 @@
           <a:p>
             <a:fld id="{EC6921FB-D1AD-4A93-B134-4EA3BD989524}" type="datetimeFigureOut">
               <a:rPr lang="lv-LV" smtClean="0"/>
-              <a:t>09.06.2025</a:t>
+              <a:t>10.06.2025</a:t>
             </a:fld>
             <a:endParaRPr lang="lv-LV"/>
           </a:p>
@@ -7180,7 +7180,7 @@
           <a:p>
             <a:fld id="{EC6921FB-D1AD-4A93-B134-4EA3BD989524}" type="datetimeFigureOut">
               <a:rPr lang="lv-LV" smtClean="0"/>
-              <a:t>09.06.2025</a:t>
+              <a:t>10.06.2025</a:t>
             </a:fld>
             <a:endParaRPr lang="lv-LV"/>
           </a:p>
@@ -7350,7 +7350,7 @@
           <a:p>
             <a:fld id="{EC6921FB-D1AD-4A93-B134-4EA3BD989524}" type="datetimeFigureOut">
               <a:rPr lang="lv-LV" smtClean="0"/>
-              <a:t>09.06.2025</a:t>
+              <a:t>10.06.2025</a:t>
             </a:fld>
             <a:endParaRPr lang="lv-LV"/>
           </a:p>
@@ -7600,7 +7600,7 @@
           <a:p>
             <a:fld id="{EC6921FB-D1AD-4A93-B134-4EA3BD989524}" type="datetimeFigureOut">
               <a:rPr lang="lv-LV" smtClean="0"/>
-              <a:t>09.06.2025</a:t>
+              <a:t>10.06.2025</a:t>
             </a:fld>
             <a:endParaRPr lang="lv-LV"/>
           </a:p>
@@ -7832,7 +7832,7 @@
           <a:p>
             <a:fld id="{EC6921FB-D1AD-4A93-B134-4EA3BD989524}" type="datetimeFigureOut">
               <a:rPr lang="lv-LV" smtClean="0"/>
-              <a:t>09.06.2025</a:t>
+              <a:t>10.06.2025</a:t>
             </a:fld>
             <a:endParaRPr lang="lv-LV"/>
           </a:p>
@@ -8213,7 +8213,7 @@
           <a:p>
             <a:fld id="{EC6921FB-D1AD-4A93-B134-4EA3BD989524}" type="datetimeFigureOut">
               <a:rPr lang="lv-LV" smtClean="0"/>
-              <a:t>09.06.2025</a:t>
+              <a:t>10.06.2025</a:t>
             </a:fld>
             <a:endParaRPr lang="lv-LV"/>
           </a:p>
@@ -8331,7 +8331,7 @@
           <a:p>
             <a:fld id="{EC6921FB-D1AD-4A93-B134-4EA3BD989524}" type="datetimeFigureOut">
               <a:rPr lang="lv-LV" smtClean="0"/>
-              <a:t>09.06.2025</a:t>
+              <a:t>10.06.2025</a:t>
             </a:fld>
             <a:endParaRPr lang="lv-LV"/>
           </a:p>
@@ -8426,7 +8426,7 @@
           <a:p>
             <a:fld id="{EC6921FB-D1AD-4A93-B134-4EA3BD989524}" type="datetimeFigureOut">
               <a:rPr lang="lv-LV" smtClean="0"/>
-              <a:t>09.06.2025</a:t>
+              <a:t>10.06.2025</a:t>
             </a:fld>
             <a:endParaRPr lang="lv-LV"/>
           </a:p>
@@ -8675,7 +8675,7 @@
           <a:p>
             <a:fld id="{EC6921FB-D1AD-4A93-B134-4EA3BD989524}" type="datetimeFigureOut">
               <a:rPr lang="lv-LV" smtClean="0"/>
-              <a:t>09.06.2025</a:t>
+              <a:t>10.06.2025</a:t>
             </a:fld>
             <a:endParaRPr lang="lv-LV"/>
           </a:p>
@@ -8955,7 +8955,7 @@
           <a:p>
             <a:fld id="{EC6921FB-D1AD-4A93-B134-4EA3BD989524}" type="datetimeFigureOut">
               <a:rPr lang="lv-LV" smtClean="0"/>
-              <a:t>09.06.2025</a:t>
+              <a:t>10.06.2025</a:t>
             </a:fld>
             <a:endParaRPr lang="lv-LV"/>
           </a:p>
@@ -9071,7 +9071,7 @@
           <a:noFill/>
           <a:extLst>
             <a:ext uri="{909E8E84-426E-40dd-AFC4-6F175D3DCCD1}">
-              <a14:hiddenFill xmlns:a14="http://schemas.microsoft.com/office/drawing/2010/main" xmlns="">
+              <a14:hiddenFill xmlns="" xmlns:a14="http://schemas.microsoft.com/office/drawing/2010/main">
                 <a:solidFill>
                   <a:srgbClr val="FFFFFF"/>
                 </a:solidFill>
@@ -9145,7 +9145,7 @@
               </a:ln>
               <a:extLst>
                 <a:ext uri="{91240B29-F687-4f45-9708-019B960494DF}">
-                  <a14:hiddenLine xmlns:a14="http://schemas.microsoft.com/office/drawing/2010/main" xmlns="" w="9525">
+                  <a14:hiddenLine xmlns="" xmlns:a14="http://schemas.microsoft.com/office/drawing/2010/main" w="9525">
                     <a:solidFill>
                       <a:srgbClr val="000000"/>
                     </a:solidFill>
@@ -9235,7 +9235,7 @@
               </a:ln>
               <a:extLst>
                 <a:ext uri="{91240B29-F687-4f45-9708-019B960494DF}">
-                  <a14:hiddenLine xmlns:a14="http://schemas.microsoft.com/office/drawing/2010/main" xmlns="" w="9525">
+                  <a14:hiddenLine xmlns="" xmlns:a14="http://schemas.microsoft.com/office/drawing/2010/main" w="9525">
                     <a:solidFill>
                       <a:srgbClr val="000000"/>
                     </a:solidFill>
@@ -9325,7 +9325,7 @@
               </a:ln>
               <a:extLst>
                 <a:ext uri="{91240B29-F687-4f45-9708-019B960494DF}">
-                  <a14:hiddenLine xmlns:a14="http://schemas.microsoft.com/office/drawing/2010/main" xmlns="" w="9525">
+                  <a14:hiddenLine xmlns="" xmlns:a14="http://schemas.microsoft.com/office/drawing/2010/main" w="9525">
                     <a:solidFill>
                       <a:srgbClr val="000000"/>
                     </a:solidFill>
@@ -9387,7 +9387,7 @@
               </a:ln>
               <a:extLst>
                 <a:ext uri="{91240B29-F687-4f45-9708-019B960494DF}">
-                  <a14:hiddenLine xmlns:a14="http://schemas.microsoft.com/office/drawing/2010/main" xmlns="" w="9525">
+                  <a14:hiddenLine xmlns="" xmlns:a14="http://schemas.microsoft.com/office/drawing/2010/main" w="9525">
                     <a:solidFill>
                       <a:srgbClr val="000000"/>
                     </a:solidFill>
@@ -9477,7 +9477,7 @@
               </a:ln>
               <a:extLst>
                 <a:ext uri="{91240B29-F687-4f45-9708-019B960494DF}">
-                  <a14:hiddenLine xmlns:a14="http://schemas.microsoft.com/office/drawing/2010/main" xmlns="" w="9525">
+                  <a14:hiddenLine xmlns="" xmlns:a14="http://schemas.microsoft.com/office/drawing/2010/main" w="9525">
                     <a:solidFill>
                       <a:srgbClr val="000000"/>
                     </a:solidFill>
@@ -9539,7 +9539,7 @@
               </a:ln>
               <a:extLst>
                 <a:ext uri="{91240B29-F687-4f45-9708-019B960494DF}">
-                  <a14:hiddenLine xmlns:a14="http://schemas.microsoft.com/office/drawing/2010/main" xmlns="" w="9525">
+                  <a14:hiddenLine xmlns="" xmlns:a14="http://schemas.microsoft.com/office/drawing/2010/main" w="9525">
                     <a:solidFill>
                       <a:srgbClr val="000000"/>
                     </a:solidFill>
@@ -9601,7 +9601,7 @@
               </a:ln>
               <a:extLst>
                 <a:ext uri="{91240B29-F687-4f45-9708-019B960494DF}">
-                  <a14:hiddenLine xmlns:a14="http://schemas.microsoft.com/office/drawing/2010/main" xmlns="" w="9525">
+                  <a14:hiddenLine xmlns="" xmlns:a14="http://schemas.microsoft.com/office/drawing/2010/main" w="9525">
                     <a:solidFill>
                       <a:srgbClr val="000000"/>
                     </a:solidFill>
@@ -9691,7 +9691,7 @@
               </a:ln>
               <a:extLst>
                 <a:ext uri="{91240B29-F687-4f45-9708-019B960494DF}">
-                  <a14:hiddenLine xmlns:a14="http://schemas.microsoft.com/office/drawing/2010/main" xmlns="" w="9525">
+                  <a14:hiddenLine xmlns="" xmlns:a14="http://schemas.microsoft.com/office/drawing/2010/main" w="9525">
                     <a:solidFill>
                       <a:srgbClr val="000000"/>
                     </a:solidFill>
@@ -9781,7 +9781,7 @@
               </a:ln>
               <a:extLst>
                 <a:ext uri="{91240B29-F687-4f45-9708-019B960494DF}">
-                  <a14:hiddenLine xmlns:a14="http://schemas.microsoft.com/office/drawing/2010/main" xmlns="" w="9525">
+                  <a14:hiddenLine xmlns="" xmlns:a14="http://schemas.microsoft.com/office/drawing/2010/main" w="9525">
                     <a:solidFill>
                       <a:srgbClr val="000000"/>
                     </a:solidFill>
@@ -9843,7 +9843,7 @@
               </a:ln>
               <a:extLst>
                 <a:ext uri="{91240B29-F687-4f45-9708-019B960494DF}">
-                  <a14:hiddenLine xmlns:a14="http://schemas.microsoft.com/office/drawing/2010/main" xmlns="" w="9525">
+                  <a14:hiddenLine xmlns="" xmlns:a14="http://schemas.microsoft.com/office/drawing/2010/main" w="9525">
                     <a:solidFill>
                       <a:srgbClr val="000000"/>
                     </a:solidFill>
@@ -9953,7 +9953,7 @@
               </a:ln>
               <a:extLst>
                 <a:ext uri="{91240B29-F687-4f45-9708-019B960494DF}">
-                  <a14:hiddenLine xmlns:a14="http://schemas.microsoft.com/office/drawing/2010/main" xmlns="" w="9525">
+                  <a14:hiddenLine xmlns="" xmlns:a14="http://schemas.microsoft.com/office/drawing/2010/main" w="9525">
                     <a:solidFill>
                       <a:srgbClr val="000000"/>
                     </a:solidFill>
@@ -10037,7 +10037,7 @@
               </a:ln>
               <a:extLst>
                 <a:ext uri="{91240B29-F687-4f45-9708-019B960494DF}">
-                  <a14:hiddenLine xmlns:a14="http://schemas.microsoft.com/office/drawing/2010/main" xmlns="" w="9525">
+                  <a14:hiddenLine xmlns="" xmlns:a14="http://schemas.microsoft.com/office/drawing/2010/main" w="9525">
                     <a:solidFill>
                       <a:srgbClr val="000000"/>
                     </a:solidFill>
@@ -10099,7 +10099,7 @@
               </a:ln>
               <a:extLst>
                 <a:ext uri="{91240B29-F687-4f45-9708-019B960494DF}">
-                  <a14:hiddenLine xmlns:a14="http://schemas.microsoft.com/office/drawing/2010/main" xmlns="" w="9525">
+                  <a14:hiddenLine xmlns="" xmlns:a14="http://schemas.microsoft.com/office/drawing/2010/main" w="9525">
                     <a:solidFill>
                       <a:srgbClr val="000000"/>
                     </a:solidFill>
@@ -10161,7 +10161,7 @@
               </a:ln>
               <a:extLst>
                 <a:ext uri="{91240B29-F687-4f45-9708-019B960494DF}">
-                  <a14:hiddenLine xmlns:a14="http://schemas.microsoft.com/office/drawing/2010/main" xmlns="" w="9525">
+                  <a14:hiddenLine xmlns="" xmlns:a14="http://schemas.microsoft.com/office/drawing/2010/main" w="9525">
                     <a:solidFill>
                       <a:srgbClr val="000000"/>
                     </a:solidFill>
@@ -10251,7 +10251,7 @@
               </a:ln>
               <a:extLst>
                 <a:ext uri="{91240B29-F687-4f45-9708-019B960494DF}">
-                  <a14:hiddenLine xmlns:a14="http://schemas.microsoft.com/office/drawing/2010/main" xmlns="" w="9525">
+                  <a14:hiddenLine xmlns="" xmlns:a14="http://schemas.microsoft.com/office/drawing/2010/main" w="9525">
                     <a:solidFill>
                       <a:srgbClr val="000000"/>
                     </a:solidFill>
@@ -10285,7 +10285,7 @@
               </a:ln>
               <a:extLst>
                 <a:ext uri="{91240B29-F687-4f45-9708-019B960494DF}">
-                  <a14:hiddenLine xmlns:a14="http://schemas.microsoft.com/office/drawing/2010/main" xmlns="" w="9525">
+                  <a14:hiddenLine xmlns="" xmlns:a14="http://schemas.microsoft.com/office/drawing/2010/main" w="9525">
                     <a:solidFill>
                       <a:srgbClr val="000000"/>
                     </a:solidFill>
@@ -10350,7 +10350,7 @@
               </a:ln>
               <a:extLst>
                 <a:ext uri="{91240B29-F687-4f45-9708-019B960494DF}">
-                  <a14:hiddenLine xmlns:a14="http://schemas.microsoft.com/office/drawing/2010/main" xmlns="" w="9525">
+                  <a14:hiddenLine xmlns="" xmlns:a14="http://schemas.microsoft.com/office/drawing/2010/main" w="9525">
                     <a:solidFill>
                       <a:srgbClr val="000000"/>
                     </a:solidFill>
@@ -10440,7 +10440,7 @@
               </a:ln>
               <a:extLst>
                 <a:ext uri="{91240B29-F687-4f45-9708-019B960494DF}">
-                  <a14:hiddenLine xmlns:a14="http://schemas.microsoft.com/office/drawing/2010/main" xmlns="" w="9525">
+                  <a14:hiddenLine xmlns="" xmlns:a14="http://schemas.microsoft.com/office/drawing/2010/main" w="9525">
                     <a:solidFill>
                       <a:srgbClr val="000000"/>
                     </a:solidFill>
@@ -10502,7 +10502,7 @@
               </a:ln>
               <a:extLst>
                 <a:ext uri="{91240B29-F687-4f45-9708-019B960494DF}">
-                  <a14:hiddenLine xmlns:a14="http://schemas.microsoft.com/office/drawing/2010/main" xmlns="" w="9525">
+                  <a14:hiddenLine xmlns="" xmlns:a14="http://schemas.microsoft.com/office/drawing/2010/main" w="9525">
                     <a:solidFill>
                       <a:srgbClr val="000000"/>
                     </a:solidFill>
@@ -10592,7 +10592,7 @@
               </a:ln>
               <a:extLst>
                 <a:ext uri="{91240B29-F687-4f45-9708-019B960494DF}">
-                  <a14:hiddenLine xmlns:a14="http://schemas.microsoft.com/office/drawing/2010/main" xmlns="" w="9525">
+                  <a14:hiddenLine xmlns="" xmlns:a14="http://schemas.microsoft.com/office/drawing/2010/main" w="9525">
                     <a:solidFill>
                       <a:srgbClr val="000000"/>
                     </a:solidFill>
@@ -10657,7 +10657,7 @@
               </a:ln>
               <a:extLst>
                 <a:ext uri="{91240B29-F687-4f45-9708-019B960494DF}">
-                  <a14:hiddenLine xmlns:a14="http://schemas.microsoft.com/office/drawing/2010/main" xmlns="" w="9525">
+                  <a14:hiddenLine xmlns="" xmlns:a14="http://schemas.microsoft.com/office/drawing/2010/main" w="9525">
                     <a:solidFill>
                       <a:srgbClr val="000000"/>
                     </a:solidFill>
@@ -10719,7 +10719,7 @@
               </a:ln>
               <a:extLst>
                 <a:ext uri="{91240B29-F687-4f45-9708-019B960494DF}">
-                  <a14:hiddenLine xmlns:a14="http://schemas.microsoft.com/office/drawing/2010/main" xmlns="" w="9525">
+                  <a14:hiddenLine xmlns="" xmlns:a14="http://schemas.microsoft.com/office/drawing/2010/main" w="9525">
                     <a:solidFill>
                       <a:srgbClr val="000000"/>
                     </a:solidFill>
@@ -10809,7 +10809,7 @@
               </a:ln>
               <a:extLst>
                 <a:ext uri="{91240B29-F687-4f45-9708-019B960494DF}">
-                  <a14:hiddenLine xmlns:a14="http://schemas.microsoft.com/office/drawing/2010/main" xmlns="" w="9525">
+                  <a14:hiddenLine xmlns="" xmlns:a14="http://schemas.microsoft.com/office/drawing/2010/main" w="9525">
                     <a:solidFill>
                       <a:srgbClr val="000000"/>
                     </a:solidFill>
@@ -10899,7 +10899,7 @@
               </a:ln>
               <a:extLst>
                 <a:ext uri="{91240B29-F687-4f45-9708-019B960494DF}">
-                  <a14:hiddenLine xmlns:a14="http://schemas.microsoft.com/office/drawing/2010/main" xmlns="" w="9525">
+                  <a14:hiddenLine xmlns="" xmlns:a14="http://schemas.microsoft.com/office/drawing/2010/main" w="9525">
                     <a:solidFill>
                       <a:srgbClr val="000000"/>
                     </a:solidFill>
@@ -10964,7 +10964,7 @@
               </a:ln>
               <a:extLst>
                 <a:ext uri="{91240B29-F687-4f45-9708-019B960494DF}">
-                  <a14:hiddenLine xmlns:a14="http://schemas.microsoft.com/office/drawing/2010/main" xmlns="" w="9525">
+                  <a14:hiddenLine xmlns="" xmlns:a14="http://schemas.microsoft.com/office/drawing/2010/main" w="9525">
                     <a:solidFill>
                       <a:srgbClr val="000000"/>
                     </a:solidFill>
@@ -11084,7 +11084,7 @@
               </a:ln>
               <a:extLst>
                 <a:ext uri="{91240B29-F687-4f45-9708-019B960494DF}">
-                  <a14:hiddenLine xmlns:a14="http://schemas.microsoft.com/office/drawing/2010/main" xmlns="" w="9525">
+                  <a14:hiddenLine xmlns="" xmlns:a14="http://schemas.microsoft.com/office/drawing/2010/main" w="9525">
                     <a:solidFill>
                       <a:srgbClr val="000000"/>
                     </a:solidFill>
@@ -11182,7 +11182,7 @@
               </a:ln>
               <a:extLst>
                 <a:ext uri="{91240B29-F687-4f45-9708-019B960494DF}">
-                  <a14:hiddenLine xmlns:a14="http://schemas.microsoft.com/office/drawing/2010/main" xmlns="" w="9525">
+                  <a14:hiddenLine xmlns="" xmlns:a14="http://schemas.microsoft.com/office/drawing/2010/main" w="9525">
                     <a:solidFill>
                       <a:srgbClr val="000000"/>
                     </a:solidFill>
@@ -11297,7 +11297,7 @@
               </a:ln>
               <a:extLst>
                 <a:ext uri="{91240B29-F687-4f45-9708-019B960494DF}">
-                  <a14:hiddenLine xmlns:a14="http://schemas.microsoft.com/office/drawing/2010/main" xmlns="" w="9525">
+                  <a14:hiddenLine xmlns="" xmlns:a14="http://schemas.microsoft.com/office/drawing/2010/main" w="9525">
                     <a:solidFill>
                       <a:srgbClr val="000000"/>
                     </a:solidFill>
@@ -11387,7 +11387,7 @@
               </a:ln>
               <a:extLst>
                 <a:ext uri="{91240B29-F687-4f45-9708-019B960494DF}">
-                  <a14:hiddenLine xmlns:a14="http://schemas.microsoft.com/office/drawing/2010/main" xmlns="" w="9525">
+                  <a14:hiddenLine xmlns="" xmlns:a14="http://schemas.microsoft.com/office/drawing/2010/main" w="9525">
                     <a:solidFill>
                       <a:srgbClr val="000000"/>
                     </a:solidFill>
@@ -11452,7 +11452,7 @@
               </a:ln>
               <a:extLst>
                 <a:ext uri="{91240B29-F687-4f45-9708-019B960494DF}">
-                  <a14:hiddenLine xmlns:a14="http://schemas.microsoft.com/office/drawing/2010/main" xmlns="" w="9525">
+                  <a14:hiddenLine xmlns="" xmlns:a14="http://schemas.microsoft.com/office/drawing/2010/main" w="9525">
                     <a:solidFill>
                       <a:srgbClr val="000000"/>
                     </a:solidFill>
@@ -11542,7 +11542,7 @@
               </a:ln>
               <a:extLst>
                 <a:ext uri="{91240B29-F687-4f45-9708-019B960494DF}">
-                  <a14:hiddenLine xmlns:a14="http://schemas.microsoft.com/office/drawing/2010/main" xmlns="" w="9525">
+                  <a14:hiddenLine xmlns="" xmlns:a14="http://schemas.microsoft.com/office/drawing/2010/main" w="9525">
                     <a:solidFill>
                       <a:srgbClr val="000000"/>
                     </a:solidFill>
@@ -11610,7 +11610,7 @@
               </a:ln>
               <a:extLst>
                 <a:ext uri="{91240B29-F687-4f45-9708-019B960494DF}">
-                  <a14:hiddenLine xmlns:a14="http://schemas.microsoft.com/office/drawing/2010/main" xmlns="" w="9525">
+                  <a14:hiddenLine xmlns="" xmlns:a14="http://schemas.microsoft.com/office/drawing/2010/main" w="9525">
                     <a:solidFill>
                       <a:srgbClr val="000000"/>
                     </a:solidFill>
@@ -11700,7 +11700,7 @@
               </a:ln>
               <a:extLst>
                 <a:ext uri="{91240B29-F687-4f45-9708-019B960494DF}">
-                  <a14:hiddenLine xmlns:a14="http://schemas.microsoft.com/office/drawing/2010/main" xmlns="" w="9525">
+                  <a14:hiddenLine xmlns="" xmlns:a14="http://schemas.microsoft.com/office/drawing/2010/main" w="9525">
                     <a:solidFill>
                       <a:srgbClr val="000000"/>
                     </a:solidFill>
@@ -11768,7 +11768,7 @@
               </a:ln>
               <a:extLst>
                 <a:ext uri="{91240B29-F687-4f45-9708-019B960494DF}">
-                  <a14:hiddenLine xmlns:a14="http://schemas.microsoft.com/office/drawing/2010/main" xmlns="" w="9525">
+                  <a14:hiddenLine xmlns="" xmlns:a14="http://schemas.microsoft.com/office/drawing/2010/main" w="9525">
                     <a:solidFill>
                       <a:srgbClr val="000000"/>
                     </a:solidFill>
@@ -11858,7 +11858,7 @@
               </a:ln>
               <a:extLst>
                 <a:ext uri="{91240B29-F687-4f45-9708-019B960494DF}">
-                  <a14:hiddenLine xmlns:a14="http://schemas.microsoft.com/office/drawing/2010/main" xmlns="" w="9525">
+                  <a14:hiddenLine xmlns="" xmlns:a14="http://schemas.microsoft.com/office/drawing/2010/main" w="9525">
                     <a:solidFill>
                       <a:srgbClr val="000000"/>
                     </a:solidFill>
@@ -11892,7 +11892,7 @@
               </a:ln>
               <a:extLst>
                 <a:ext uri="{91240B29-F687-4f45-9708-019B960494DF}">
-                  <a14:hiddenLine xmlns:a14="http://schemas.microsoft.com/office/drawing/2010/main" xmlns="" w="9525">
+                  <a14:hiddenLine xmlns="" xmlns:a14="http://schemas.microsoft.com/office/drawing/2010/main" w="9525">
                     <a:solidFill>
                       <a:srgbClr val="000000"/>
                     </a:solidFill>
@@ -12032,7 +12032,7 @@
           <a:p>
             <a:fld id="{EC6921FB-D1AD-4A93-B134-4EA3BD989524}" type="datetimeFigureOut">
               <a:rPr lang="lv-LV" smtClean="0"/>
-              <a:t>09.06.2025</a:t>
+              <a:t>10.06.2025</a:t>
             </a:fld>
             <a:endParaRPr lang="lv-LV"/>
           </a:p>
@@ -16528,12 +16528,25 @@
             <p:ph type="title"/>
           </p:nvPr>
         </p:nvSpPr>
-        <p:spPr/>
+        <p:spPr>
+          <a:xfrm>
+            <a:off x="1141412" y="139124"/>
+            <a:ext cx="9905998" cy="1478570"/>
+          </a:xfrm>
+        </p:spPr>
         <p:txBody>
           <a:bodyPr/>
           <a:lstStyle/>
           <a:p>
-            <a:endParaRPr lang="lv-LV"/>
+            <a:r>
+              <a:rPr lang="lv-LV" dirty="0"/>
+              <a:t>UZDEVUMS 1: </a:t>
+            </a:r>
+            <a:r>
+              <a:rPr lang="it-IT" dirty="0"/>
+              <a:t>Aritmētiskie operatori un dažādi datu tipi</a:t>
+            </a:r>
+            <a:endParaRPr lang="lv-LV" dirty="0"/>
           </a:p>
         </p:txBody>
       </p:sp>
@@ -16553,12 +16566,796 @@
             <p:ph idx="1"/>
           </p:nvPr>
         </p:nvSpPr>
-        <p:spPr/>
+        <p:spPr>
+          <a:xfrm>
+            <a:off x="895253" y="5598346"/>
+            <a:ext cx="10398316" cy="949911"/>
+          </a:xfrm>
+        </p:spPr>
         <p:txBody>
-          <a:bodyPr/>
+          <a:bodyPr>
+            <a:normAutofit/>
+          </a:bodyPr>
           <a:lstStyle/>
           <a:p>
-            <a:endParaRPr lang="lv-LV"/>
+            <a:pPr marL="0" indent="0">
+              <a:buNone/>
+            </a:pPr>
+            <a:r>
+              <a:rPr lang="lv-LV" dirty="0"/>
+              <a:t>1. Sākumā definējam divus mainīgos ar veselajiem (</a:t>
+            </a:r>
+            <a:r>
+              <a:rPr lang="lv-LV" dirty="0">
+                <a:solidFill>
+                  <a:schemeClr val="tx2"/>
+                </a:solidFill>
+              </a:rPr>
+              <a:t>int</a:t>
+            </a:r>
+            <a:r>
+              <a:rPr lang="lv-LV" dirty="0"/>
+              <a:t>) un reālajiem (</a:t>
+            </a:r>
+            <a:r>
+              <a:rPr lang="lv-LV" dirty="0">
+                <a:solidFill>
+                  <a:schemeClr val="tx2"/>
+                </a:solidFill>
+              </a:rPr>
+              <a:t>float</a:t>
+            </a:r>
+            <a:r>
+              <a:rPr lang="lv-LV" dirty="0"/>
+              <a:t>) skaitļiem.</a:t>
+            </a:r>
+          </a:p>
+          <a:p>
+            <a:pPr marL="0" indent="0">
+              <a:buNone/>
+            </a:pPr>
+            <a:endParaRPr lang="lv-LV" dirty="0"/>
+          </a:p>
+        </p:txBody>
+      </p:sp>
+      <p:pic>
+        <p:nvPicPr>
+          <p:cNvPr id="4" name="Picture 3">
+            <a:extLst>
+              <a:ext uri="{FF2B5EF4-FFF2-40B4-BE49-F238E27FC236}">
+                <a16:creationId xmlns:a16="http://schemas.microsoft.com/office/drawing/2014/main" id="{FF192176-859E-4A1A-8230-26CC1FD0CFCA}"/>
+              </a:ext>
+            </a:extLst>
+          </p:cNvPr>
+          <p:cNvPicPr>
+            <a:picLocks noChangeAspect="1"/>
+          </p:cNvPicPr>
+          <p:nvPr/>
+        </p:nvPicPr>
+        <p:blipFill>
+          <a:blip r:embed="rId2"/>
+          <a:stretch>
+            <a:fillRect/>
+          </a:stretch>
+        </p:blipFill>
+        <p:spPr>
+          <a:xfrm>
+            <a:off x="1869096" y="1493071"/>
+            <a:ext cx="8867775" cy="4105275"/>
+          </a:xfrm>
+          <a:prstGeom prst="rect">
+            <a:avLst/>
+          </a:prstGeom>
+        </p:spPr>
+      </p:pic>
+      <p:sp>
+        <p:nvSpPr>
+          <p:cNvPr id="5" name="Content Placeholder 2">
+            <a:extLst>
+              <a:ext uri="{FF2B5EF4-FFF2-40B4-BE49-F238E27FC236}">
+                <a16:creationId xmlns:a16="http://schemas.microsoft.com/office/drawing/2014/main" id="{BDEC7BD1-9716-4E7E-A120-4271EE30C100}"/>
+              </a:ext>
+            </a:extLst>
+          </p:cNvPr>
+          <p:cNvSpPr txBox="1">
+            <a:spLocks/>
+          </p:cNvSpPr>
+          <p:nvPr/>
+        </p:nvSpPr>
+        <p:spPr>
+          <a:xfrm>
+            <a:off x="1250853" y="5598345"/>
+            <a:ext cx="9905999" cy="949911"/>
+          </a:xfrm>
+          <a:prstGeom prst="rect">
+            <a:avLst/>
+          </a:prstGeom>
+        </p:spPr>
+        <p:txBody>
+          <a:bodyPr vert="horz" lIns="91440" tIns="45720" rIns="91440" bIns="45720" rtlCol="0">
+            <a:normAutofit lnSpcReduction="10000"/>
+          </a:bodyPr>
+          <a:lstStyle>
+            <a:lvl1pPr marL="228600" indent="-228600" algn="l" defTabSz="914400" rtl="0" eaLnBrk="1" latinLnBrk="0" hangingPunct="1">
+              <a:lnSpc>
+                <a:spcPct val="120000"/>
+              </a:lnSpc>
+              <a:spcBef>
+                <a:spcPts val="1000"/>
+              </a:spcBef>
+              <a:buSzPct val="125000"/>
+              <a:buFont typeface="Arial" panose="020B0604020202020204" pitchFamily="34" charset="0"/>
+              <a:buChar char="•"/>
+              <a:defRPr sz="2400" kern="1200">
+                <a:solidFill>
+                  <a:schemeClr val="tx1"/>
+                </a:solidFill>
+                <a:latin typeface="+mn-lt"/>
+                <a:ea typeface="+mn-ea"/>
+                <a:cs typeface="+mn-cs"/>
+              </a:defRPr>
+            </a:lvl1pPr>
+            <a:lvl2pPr marL="685800" indent="-228600" algn="l" defTabSz="914400" rtl="0" eaLnBrk="1" latinLnBrk="0" hangingPunct="1">
+              <a:lnSpc>
+                <a:spcPct val="120000"/>
+              </a:lnSpc>
+              <a:spcBef>
+                <a:spcPts val="500"/>
+              </a:spcBef>
+              <a:buSzPct val="125000"/>
+              <a:buFont typeface="Arial" panose="020B0604020202020204" pitchFamily="34" charset="0"/>
+              <a:buChar char="•"/>
+              <a:defRPr sz="2000" kern="1200">
+                <a:solidFill>
+                  <a:schemeClr val="tx1"/>
+                </a:solidFill>
+                <a:latin typeface="+mn-lt"/>
+                <a:ea typeface="+mn-ea"/>
+                <a:cs typeface="+mn-cs"/>
+              </a:defRPr>
+            </a:lvl2pPr>
+            <a:lvl3pPr marL="1143000" indent="-228600" algn="l" defTabSz="914400" rtl="0" eaLnBrk="1" latinLnBrk="0" hangingPunct="1">
+              <a:lnSpc>
+                <a:spcPct val="120000"/>
+              </a:lnSpc>
+              <a:spcBef>
+                <a:spcPts val="500"/>
+              </a:spcBef>
+              <a:buSzPct val="125000"/>
+              <a:buFont typeface="Arial" panose="020B0604020202020204" pitchFamily="34" charset="0"/>
+              <a:buChar char="•"/>
+              <a:defRPr sz="1800" kern="1200">
+                <a:solidFill>
+                  <a:schemeClr val="tx1"/>
+                </a:solidFill>
+                <a:latin typeface="+mn-lt"/>
+                <a:ea typeface="+mn-ea"/>
+                <a:cs typeface="+mn-cs"/>
+              </a:defRPr>
+            </a:lvl3pPr>
+            <a:lvl4pPr marL="1600200" indent="-228600" algn="l" defTabSz="914400" rtl="0" eaLnBrk="1" latinLnBrk="0" hangingPunct="1">
+              <a:lnSpc>
+                <a:spcPct val="120000"/>
+              </a:lnSpc>
+              <a:spcBef>
+                <a:spcPts val="500"/>
+              </a:spcBef>
+              <a:buSzPct val="125000"/>
+              <a:buFont typeface="Arial" panose="020B0604020202020204" pitchFamily="34" charset="0"/>
+              <a:buChar char="•"/>
+              <a:defRPr sz="1600" kern="1200">
+                <a:solidFill>
+                  <a:schemeClr val="tx1"/>
+                </a:solidFill>
+                <a:latin typeface="+mn-lt"/>
+                <a:ea typeface="+mn-ea"/>
+                <a:cs typeface="+mn-cs"/>
+              </a:defRPr>
+            </a:lvl4pPr>
+            <a:lvl5pPr marL="2057400" indent="-228600" algn="l" defTabSz="914400" rtl="0" eaLnBrk="1" latinLnBrk="0" hangingPunct="1">
+              <a:lnSpc>
+                <a:spcPct val="120000"/>
+              </a:lnSpc>
+              <a:spcBef>
+                <a:spcPts val="500"/>
+              </a:spcBef>
+              <a:buSzPct val="125000"/>
+              <a:buFont typeface="Arial" panose="020B0604020202020204" pitchFamily="34" charset="0"/>
+              <a:buChar char="•"/>
+              <a:defRPr sz="1600" kern="1200">
+                <a:solidFill>
+                  <a:schemeClr val="tx1"/>
+                </a:solidFill>
+                <a:latin typeface="+mn-lt"/>
+                <a:ea typeface="+mn-ea"/>
+                <a:cs typeface="+mn-cs"/>
+              </a:defRPr>
+            </a:lvl5pPr>
+            <a:lvl6pPr marL="2514600" indent="-228600" algn="l" defTabSz="914400" rtl="0" eaLnBrk="1" latinLnBrk="0" hangingPunct="1">
+              <a:lnSpc>
+                <a:spcPct val="120000"/>
+              </a:lnSpc>
+              <a:spcBef>
+                <a:spcPts val="500"/>
+              </a:spcBef>
+              <a:buSzPct val="125000"/>
+              <a:buFont typeface="Arial" panose="020B0604020202020204" pitchFamily="34" charset="0"/>
+              <a:buChar char="•"/>
+              <a:defRPr sz="1400" kern="1200">
+                <a:solidFill>
+                  <a:schemeClr val="tx1"/>
+                </a:solidFill>
+                <a:latin typeface="+mn-lt"/>
+                <a:ea typeface="+mn-ea"/>
+                <a:cs typeface="+mn-cs"/>
+              </a:defRPr>
+            </a:lvl6pPr>
+            <a:lvl7pPr marL="2971800" indent="-228600" algn="l" defTabSz="914400" rtl="0" eaLnBrk="1" latinLnBrk="0" hangingPunct="1">
+              <a:lnSpc>
+                <a:spcPct val="120000"/>
+              </a:lnSpc>
+              <a:spcBef>
+                <a:spcPts val="500"/>
+              </a:spcBef>
+              <a:buSzPct val="125000"/>
+              <a:buFont typeface="Arial" panose="020B0604020202020204" pitchFamily="34" charset="0"/>
+              <a:buChar char="•"/>
+              <a:defRPr sz="1400" kern="1200">
+                <a:solidFill>
+                  <a:schemeClr val="tx1"/>
+                </a:solidFill>
+                <a:latin typeface="+mn-lt"/>
+                <a:ea typeface="+mn-ea"/>
+                <a:cs typeface="+mn-cs"/>
+              </a:defRPr>
+            </a:lvl7pPr>
+            <a:lvl8pPr marL="3429000" indent="-228600" algn="l" defTabSz="914400" rtl="0" eaLnBrk="1" latinLnBrk="0" hangingPunct="1">
+              <a:lnSpc>
+                <a:spcPct val="120000"/>
+              </a:lnSpc>
+              <a:spcBef>
+                <a:spcPts val="500"/>
+              </a:spcBef>
+              <a:buSzPct val="125000"/>
+              <a:buFont typeface="Arial" panose="020B0604020202020204" pitchFamily="34" charset="0"/>
+              <a:buChar char="•"/>
+              <a:defRPr sz="1400" kern="1200">
+                <a:solidFill>
+                  <a:schemeClr val="tx1"/>
+                </a:solidFill>
+                <a:latin typeface="+mn-lt"/>
+                <a:ea typeface="+mn-ea"/>
+                <a:cs typeface="+mn-cs"/>
+              </a:defRPr>
+            </a:lvl8pPr>
+            <a:lvl9pPr marL="3886200" indent="-228600" algn="l" defTabSz="914400" rtl="0" eaLnBrk="1" latinLnBrk="0" hangingPunct="1">
+              <a:lnSpc>
+                <a:spcPct val="120000"/>
+              </a:lnSpc>
+              <a:spcBef>
+                <a:spcPts val="500"/>
+              </a:spcBef>
+              <a:buSzPct val="125000"/>
+              <a:buFont typeface="Arial" panose="020B0604020202020204" pitchFamily="34" charset="0"/>
+              <a:buChar char="•"/>
+              <a:defRPr sz="1400" kern="1200">
+                <a:solidFill>
+                  <a:schemeClr val="tx1"/>
+                </a:solidFill>
+                <a:latin typeface="+mn-lt"/>
+                <a:ea typeface="+mn-ea"/>
+                <a:cs typeface="+mn-cs"/>
+              </a:defRPr>
+            </a:lvl9pPr>
+          </a:lstStyle>
+          <a:p>
+            <a:pPr marL="0" indent="0">
+              <a:buNone/>
+            </a:pPr>
+            <a:r>
+              <a:rPr lang="lv-LV" dirty="0"/>
+              <a:t>2. Tad veicam dažādas </a:t>
+            </a:r>
+            <a:r>
+              <a:rPr lang="lv-LV" dirty="0">
+                <a:solidFill>
+                  <a:srgbClr val="FFFF00"/>
+                </a:solidFill>
+              </a:rPr>
+              <a:t>aritmētiskas operācijas</a:t>
+            </a:r>
+            <a:r>
+              <a:rPr lang="lv-LV" dirty="0"/>
+              <a:t>: </a:t>
+            </a:r>
+            <a:r>
+              <a:rPr lang="lv-LV" dirty="0">
+                <a:solidFill>
+                  <a:srgbClr val="00FA18"/>
+                </a:solidFill>
+              </a:rPr>
+              <a:t>saskaitīšanu</a:t>
+            </a:r>
+            <a:r>
+              <a:rPr lang="lv-LV" dirty="0"/>
+              <a:t>, </a:t>
+            </a:r>
+            <a:r>
+              <a:rPr lang="lv-LV" dirty="0">
+                <a:solidFill>
+                  <a:srgbClr val="00FA18"/>
+                </a:solidFill>
+              </a:rPr>
+              <a:t>atņemšanu</a:t>
+            </a:r>
+            <a:r>
+              <a:rPr lang="lv-LV" dirty="0"/>
+              <a:t>, </a:t>
+            </a:r>
+            <a:r>
+              <a:rPr lang="lv-LV" dirty="0">
+                <a:solidFill>
+                  <a:srgbClr val="00FA18"/>
+                </a:solidFill>
+              </a:rPr>
+              <a:t>reizināšanu</a:t>
+            </a:r>
+            <a:r>
+              <a:rPr lang="lv-LV" dirty="0"/>
+              <a:t>, </a:t>
+            </a:r>
+            <a:r>
+              <a:rPr lang="lv-LV" dirty="0">
+                <a:solidFill>
+                  <a:srgbClr val="00FA18"/>
+                </a:solidFill>
+              </a:rPr>
+              <a:t>dalīšanu</a:t>
+            </a:r>
+            <a:r>
+              <a:rPr lang="lv-LV" dirty="0"/>
+              <a:t>.</a:t>
+            </a:r>
+          </a:p>
+          <a:p>
+            <a:pPr marL="0" indent="0">
+              <a:buNone/>
+            </a:pPr>
+            <a:endParaRPr lang="lv-LV" dirty="0"/>
+          </a:p>
+        </p:txBody>
+      </p:sp>
+      <p:sp>
+        <p:nvSpPr>
+          <p:cNvPr id="7" name="Content Placeholder 2">
+            <a:extLst>
+              <a:ext uri="{FF2B5EF4-FFF2-40B4-BE49-F238E27FC236}">
+                <a16:creationId xmlns:a16="http://schemas.microsoft.com/office/drawing/2014/main" id="{92F2E38B-3C10-4D39-B7B8-FE24EEF98770}"/>
+              </a:ext>
+            </a:extLst>
+          </p:cNvPr>
+          <p:cNvSpPr txBox="1">
+            <a:spLocks/>
+          </p:cNvSpPr>
+          <p:nvPr/>
+        </p:nvSpPr>
+        <p:spPr>
+          <a:xfrm>
+            <a:off x="1250853" y="5598345"/>
+            <a:ext cx="9905999" cy="949911"/>
+          </a:xfrm>
+          <a:prstGeom prst="rect">
+            <a:avLst/>
+          </a:prstGeom>
+        </p:spPr>
+        <p:txBody>
+          <a:bodyPr vert="horz" lIns="91440" tIns="45720" rIns="91440" bIns="45720" rtlCol="0">
+            <a:normAutofit/>
+          </a:bodyPr>
+          <a:lstStyle>
+            <a:lvl1pPr marL="228600" indent="-228600" algn="l" defTabSz="914400" rtl="0" eaLnBrk="1" latinLnBrk="0" hangingPunct="1">
+              <a:lnSpc>
+                <a:spcPct val="120000"/>
+              </a:lnSpc>
+              <a:spcBef>
+                <a:spcPts val="1000"/>
+              </a:spcBef>
+              <a:buSzPct val="125000"/>
+              <a:buFont typeface="Arial" panose="020B0604020202020204" pitchFamily="34" charset="0"/>
+              <a:buChar char="•"/>
+              <a:defRPr sz="2400" kern="1200">
+                <a:solidFill>
+                  <a:schemeClr val="tx1"/>
+                </a:solidFill>
+                <a:latin typeface="+mn-lt"/>
+                <a:ea typeface="+mn-ea"/>
+                <a:cs typeface="+mn-cs"/>
+              </a:defRPr>
+            </a:lvl1pPr>
+            <a:lvl2pPr marL="685800" indent="-228600" algn="l" defTabSz="914400" rtl="0" eaLnBrk="1" latinLnBrk="0" hangingPunct="1">
+              <a:lnSpc>
+                <a:spcPct val="120000"/>
+              </a:lnSpc>
+              <a:spcBef>
+                <a:spcPts val="500"/>
+              </a:spcBef>
+              <a:buSzPct val="125000"/>
+              <a:buFont typeface="Arial" panose="020B0604020202020204" pitchFamily="34" charset="0"/>
+              <a:buChar char="•"/>
+              <a:defRPr sz="2000" kern="1200">
+                <a:solidFill>
+                  <a:schemeClr val="tx1"/>
+                </a:solidFill>
+                <a:latin typeface="+mn-lt"/>
+                <a:ea typeface="+mn-ea"/>
+                <a:cs typeface="+mn-cs"/>
+              </a:defRPr>
+            </a:lvl2pPr>
+            <a:lvl3pPr marL="1143000" indent="-228600" algn="l" defTabSz="914400" rtl="0" eaLnBrk="1" latinLnBrk="0" hangingPunct="1">
+              <a:lnSpc>
+                <a:spcPct val="120000"/>
+              </a:lnSpc>
+              <a:spcBef>
+                <a:spcPts val="500"/>
+              </a:spcBef>
+              <a:buSzPct val="125000"/>
+              <a:buFont typeface="Arial" panose="020B0604020202020204" pitchFamily="34" charset="0"/>
+              <a:buChar char="•"/>
+              <a:defRPr sz="1800" kern="1200">
+                <a:solidFill>
+                  <a:schemeClr val="tx1"/>
+                </a:solidFill>
+                <a:latin typeface="+mn-lt"/>
+                <a:ea typeface="+mn-ea"/>
+                <a:cs typeface="+mn-cs"/>
+              </a:defRPr>
+            </a:lvl3pPr>
+            <a:lvl4pPr marL="1600200" indent="-228600" algn="l" defTabSz="914400" rtl="0" eaLnBrk="1" latinLnBrk="0" hangingPunct="1">
+              <a:lnSpc>
+                <a:spcPct val="120000"/>
+              </a:lnSpc>
+              <a:spcBef>
+                <a:spcPts val="500"/>
+              </a:spcBef>
+              <a:buSzPct val="125000"/>
+              <a:buFont typeface="Arial" panose="020B0604020202020204" pitchFamily="34" charset="0"/>
+              <a:buChar char="•"/>
+              <a:defRPr sz="1600" kern="1200">
+                <a:solidFill>
+                  <a:schemeClr val="tx1"/>
+                </a:solidFill>
+                <a:latin typeface="+mn-lt"/>
+                <a:ea typeface="+mn-ea"/>
+                <a:cs typeface="+mn-cs"/>
+              </a:defRPr>
+            </a:lvl4pPr>
+            <a:lvl5pPr marL="2057400" indent="-228600" algn="l" defTabSz="914400" rtl="0" eaLnBrk="1" latinLnBrk="0" hangingPunct="1">
+              <a:lnSpc>
+                <a:spcPct val="120000"/>
+              </a:lnSpc>
+              <a:spcBef>
+                <a:spcPts val="500"/>
+              </a:spcBef>
+              <a:buSzPct val="125000"/>
+              <a:buFont typeface="Arial" panose="020B0604020202020204" pitchFamily="34" charset="0"/>
+              <a:buChar char="•"/>
+              <a:defRPr sz="1600" kern="1200">
+                <a:solidFill>
+                  <a:schemeClr val="tx1"/>
+                </a:solidFill>
+                <a:latin typeface="+mn-lt"/>
+                <a:ea typeface="+mn-ea"/>
+                <a:cs typeface="+mn-cs"/>
+              </a:defRPr>
+            </a:lvl5pPr>
+            <a:lvl6pPr marL="2514600" indent="-228600" algn="l" defTabSz="914400" rtl="0" eaLnBrk="1" latinLnBrk="0" hangingPunct="1">
+              <a:lnSpc>
+                <a:spcPct val="120000"/>
+              </a:lnSpc>
+              <a:spcBef>
+                <a:spcPts val="500"/>
+              </a:spcBef>
+              <a:buSzPct val="125000"/>
+              <a:buFont typeface="Arial" panose="020B0604020202020204" pitchFamily="34" charset="0"/>
+              <a:buChar char="•"/>
+              <a:defRPr sz="1400" kern="1200">
+                <a:solidFill>
+                  <a:schemeClr val="tx1"/>
+                </a:solidFill>
+                <a:latin typeface="+mn-lt"/>
+                <a:ea typeface="+mn-ea"/>
+                <a:cs typeface="+mn-cs"/>
+              </a:defRPr>
+            </a:lvl6pPr>
+            <a:lvl7pPr marL="2971800" indent="-228600" algn="l" defTabSz="914400" rtl="0" eaLnBrk="1" latinLnBrk="0" hangingPunct="1">
+              <a:lnSpc>
+                <a:spcPct val="120000"/>
+              </a:lnSpc>
+              <a:spcBef>
+                <a:spcPts val="500"/>
+              </a:spcBef>
+              <a:buSzPct val="125000"/>
+              <a:buFont typeface="Arial" panose="020B0604020202020204" pitchFamily="34" charset="0"/>
+              <a:buChar char="•"/>
+              <a:defRPr sz="1400" kern="1200">
+                <a:solidFill>
+                  <a:schemeClr val="tx1"/>
+                </a:solidFill>
+                <a:latin typeface="+mn-lt"/>
+                <a:ea typeface="+mn-ea"/>
+                <a:cs typeface="+mn-cs"/>
+              </a:defRPr>
+            </a:lvl7pPr>
+            <a:lvl8pPr marL="3429000" indent="-228600" algn="l" defTabSz="914400" rtl="0" eaLnBrk="1" latinLnBrk="0" hangingPunct="1">
+              <a:lnSpc>
+                <a:spcPct val="120000"/>
+              </a:lnSpc>
+              <a:spcBef>
+                <a:spcPts val="500"/>
+              </a:spcBef>
+              <a:buSzPct val="125000"/>
+              <a:buFont typeface="Arial" panose="020B0604020202020204" pitchFamily="34" charset="0"/>
+              <a:buChar char="•"/>
+              <a:defRPr sz="1400" kern="1200">
+                <a:solidFill>
+                  <a:schemeClr val="tx1"/>
+                </a:solidFill>
+                <a:latin typeface="+mn-lt"/>
+                <a:ea typeface="+mn-ea"/>
+                <a:cs typeface="+mn-cs"/>
+              </a:defRPr>
+            </a:lvl8pPr>
+            <a:lvl9pPr marL="3886200" indent="-228600" algn="l" defTabSz="914400" rtl="0" eaLnBrk="1" latinLnBrk="0" hangingPunct="1">
+              <a:lnSpc>
+                <a:spcPct val="120000"/>
+              </a:lnSpc>
+              <a:spcBef>
+                <a:spcPts val="500"/>
+              </a:spcBef>
+              <a:buSzPct val="125000"/>
+              <a:buFont typeface="Arial" panose="020B0604020202020204" pitchFamily="34" charset="0"/>
+              <a:buChar char="•"/>
+              <a:defRPr sz="1400" kern="1200">
+                <a:solidFill>
+                  <a:schemeClr val="tx1"/>
+                </a:solidFill>
+                <a:latin typeface="+mn-lt"/>
+                <a:ea typeface="+mn-ea"/>
+                <a:cs typeface="+mn-cs"/>
+              </a:defRPr>
+            </a:lvl9pPr>
+          </a:lstStyle>
+          <a:p>
+            <a:pPr marL="0" indent="0">
+              <a:buNone/>
+            </a:pPr>
+            <a:r>
+              <a:rPr lang="lv-LV" dirty="0"/>
+              <a:t>3. Pēc tam saglabājam katra rezultāta vērtību jaunajos mainīgajos.</a:t>
+            </a:r>
+          </a:p>
+          <a:p>
+            <a:pPr marL="0" indent="0">
+              <a:buNone/>
+            </a:pPr>
+            <a:endParaRPr lang="lv-LV" dirty="0"/>
+          </a:p>
+        </p:txBody>
+      </p:sp>
+      <p:sp>
+        <p:nvSpPr>
+          <p:cNvPr id="9" name="Content Placeholder 2">
+            <a:extLst>
+              <a:ext uri="{FF2B5EF4-FFF2-40B4-BE49-F238E27FC236}">
+                <a16:creationId xmlns:a16="http://schemas.microsoft.com/office/drawing/2014/main" id="{9FA6E96A-9E46-4F2E-B619-595D10D95FDC}"/>
+              </a:ext>
+            </a:extLst>
+          </p:cNvPr>
+          <p:cNvSpPr txBox="1">
+            <a:spLocks/>
+          </p:cNvSpPr>
+          <p:nvPr/>
+        </p:nvSpPr>
+        <p:spPr>
+          <a:xfrm>
+            <a:off x="1387570" y="5598345"/>
+            <a:ext cx="9905999" cy="949911"/>
+          </a:xfrm>
+          <a:prstGeom prst="rect">
+            <a:avLst/>
+          </a:prstGeom>
+        </p:spPr>
+        <p:txBody>
+          <a:bodyPr vert="horz" lIns="91440" tIns="45720" rIns="91440" bIns="45720" rtlCol="0">
+            <a:normAutofit/>
+          </a:bodyPr>
+          <a:lstStyle>
+            <a:lvl1pPr marL="228600" indent="-228600" algn="l" defTabSz="914400" rtl="0" eaLnBrk="1" latinLnBrk="0" hangingPunct="1">
+              <a:lnSpc>
+                <a:spcPct val="120000"/>
+              </a:lnSpc>
+              <a:spcBef>
+                <a:spcPts val="1000"/>
+              </a:spcBef>
+              <a:buSzPct val="125000"/>
+              <a:buFont typeface="Arial" panose="020B0604020202020204" pitchFamily="34" charset="0"/>
+              <a:buChar char="•"/>
+              <a:defRPr sz="2400" kern="1200">
+                <a:solidFill>
+                  <a:schemeClr val="tx1"/>
+                </a:solidFill>
+                <a:latin typeface="+mn-lt"/>
+                <a:ea typeface="+mn-ea"/>
+                <a:cs typeface="+mn-cs"/>
+              </a:defRPr>
+            </a:lvl1pPr>
+            <a:lvl2pPr marL="685800" indent="-228600" algn="l" defTabSz="914400" rtl="0" eaLnBrk="1" latinLnBrk="0" hangingPunct="1">
+              <a:lnSpc>
+                <a:spcPct val="120000"/>
+              </a:lnSpc>
+              <a:spcBef>
+                <a:spcPts val="500"/>
+              </a:spcBef>
+              <a:buSzPct val="125000"/>
+              <a:buFont typeface="Arial" panose="020B0604020202020204" pitchFamily="34" charset="0"/>
+              <a:buChar char="•"/>
+              <a:defRPr sz="2000" kern="1200">
+                <a:solidFill>
+                  <a:schemeClr val="tx1"/>
+                </a:solidFill>
+                <a:latin typeface="+mn-lt"/>
+                <a:ea typeface="+mn-ea"/>
+                <a:cs typeface="+mn-cs"/>
+              </a:defRPr>
+            </a:lvl2pPr>
+            <a:lvl3pPr marL="1143000" indent="-228600" algn="l" defTabSz="914400" rtl="0" eaLnBrk="1" latinLnBrk="0" hangingPunct="1">
+              <a:lnSpc>
+                <a:spcPct val="120000"/>
+              </a:lnSpc>
+              <a:spcBef>
+                <a:spcPts val="500"/>
+              </a:spcBef>
+              <a:buSzPct val="125000"/>
+              <a:buFont typeface="Arial" panose="020B0604020202020204" pitchFamily="34" charset="0"/>
+              <a:buChar char="•"/>
+              <a:defRPr sz="1800" kern="1200">
+                <a:solidFill>
+                  <a:schemeClr val="tx1"/>
+                </a:solidFill>
+                <a:latin typeface="+mn-lt"/>
+                <a:ea typeface="+mn-ea"/>
+                <a:cs typeface="+mn-cs"/>
+              </a:defRPr>
+            </a:lvl3pPr>
+            <a:lvl4pPr marL="1600200" indent="-228600" algn="l" defTabSz="914400" rtl="0" eaLnBrk="1" latinLnBrk="0" hangingPunct="1">
+              <a:lnSpc>
+                <a:spcPct val="120000"/>
+              </a:lnSpc>
+              <a:spcBef>
+                <a:spcPts val="500"/>
+              </a:spcBef>
+              <a:buSzPct val="125000"/>
+              <a:buFont typeface="Arial" panose="020B0604020202020204" pitchFamily="34" charset="0"/>
+              <a:buChar char="•"/>
+              <a:defRPr sz="1600" kern="1200">
+                <a:solidFill>
+                  <a:schemeClr val="tx1"/>
+                </a:solidFill>
+                <a:latin typeface="+mn-lt"/>
+                <a:ea typeface="+mn-ea"/>
+                <a:cs typeface="+mn-cs"/>
+              </a:defRPr>
+            </a:lvl4pPr>
+            <a:lvl5pPr marL="2057400" indent="-228600" algn="l" defTabSz="914400" rtl="0" eaLnBrk="1" latinLnBrk="0" hangingPunct="1">
+              <a:lnSpc>
+                <a:spcPct val="120000"/>
+              </a:lnSpc>
+              <a:spcBef>
+                <a:spcPts val="500"/>
+              </a:spcBef>
+              <a:buSzPct val="125000"/>
+              <a:buFont typeface="Arial" panose="020B0604020202020204" pitchFamily="34" charset="0"/>
+              <a:buChar char="•"/>
+              <a:defRPr sz="1600" kern="1200">
+                <a:solidFill>
+                  <a:schemeClr val="tx1"/>
+                </a:solidFill>
+                <a:latin typeface="+mn-lt"/>
+                <a:ea typeface="+mn-ea"/>
+                <a:cs typeface="+mn-cs"/>
+              </a:defRPr>
+            </a:lvl5pPr>
+            <a:lvl6pPr marL="2514600" indent="-228600" algn="l" defTabSz="914400" rtl="0" eaLnBrk="1" latinLnBrk="0" hangingPunct="1">
+              <a:lnSpc>
+                <a:spcPct val="120000"/>
+              </a:lnSpc>
+              <a:spcBef>
+                <a:spcPts val="500"/>
+              </a:spcBef>
+              <a:buSzPct val="125000"/>
+              <a:buFont typeface="Arial" panose="020B0604020202020204" pitchFamily="34" charset="0"/>
+              <a:buChar char="•"/>
+              <a:defRPr sz="1400" kern="1200">
+                <a:solidFill>
+                  <a:schemeClr val="tx1"/>
+                </a:solidFill>
+                <a:latin typeface="+mn-lt"/>
+                <a:ea typeface="+mn-ea"/>
+                <a:cs typeface="+mn-cs"/>
+              </a:defRPr>
+            </a:lvl6pPr>
+            <a:lvl7pPr marL="2971800" indent="-228600" algn="l" defTabSz="914400" rtl="0" eaLnBrk="1" latinLnBrk="0" hangingPunct="1">
+              <a:lnSpc>
+                <a:spcPct val="120000"/>
+              </a:lnSpc>
+              <a:spcBef>
+                <a:spcPts val="500"/>
+              </a:spcBef>
+              <a:buSzPct val="125000"/>
+              <a:buFont typeface="Arial" panose="020B0604020202020204" pitchFamily="34" charset="0"/>
+              <a:buChar char="•"/>
+              <a:defRPr sz="1400" kern="1200">
+                <a:solidFill>
+                  <a:schemeClr val="tx1"/>
+                </a:solidFill>
+                <a:latin typeface="+mn-lt"/>
+                <a:ea typeface="+mn-ea"/>
+                <a:cs typeface="+mn-cs"/>
+              </a:defRPr>
+            </a:lvl7pPr>
+            <a:lvl8pPr marL="3429000" indent="-228600" algn="l" defTabSz="914400" rtl="0" eaLnBrk="1" latinLnBrk="0" hangingPunct="1">
+              <a:lnSpc>
+                <a:spcPct val="120000"/>
+              </a:lnSpc>
+              <a:spcBef>
+                <a:spcPts val="500"/>
+              </a:spcBef>
+              <a:buSzPct val="125000"/>
+              <a:buFont typeface="Arial" panose="020B0604020202020204" pitchFamily="34" charset="0"/>
+              <a:buChar char="•"/>
+              <a:defRPr sz="1400" kern="1200">
+                <a:solidFill>
+                  <a:schemeClr val="tx1"/>
+                </a:solidFill>
+                <a:latin typeface="+mn-lt"/>
+                <a:ea typeface="+mn-ea"/>
+                <a:cs typeface="+mn-cs"/>
+              </a:defRPr>
+            </a:lvl8pPr>
+            <a:lvl9pPr marL="3886200" indent="-228600" algn="l" defTabSz="914400" rtl="0" eaLnBrk="1" latinLnBrk="0" hangingPunct="1">
+              <a:lnSpc>
+                <a:spcPct val="120000"/>
+              </a:lnSpc>
+              <a:spcBef>
+                <a:spcPts val="500"/>
+              </a:spcBef>
+              <a:buSzPct val="125000"/>
+              <a:buFont typeface="Arial" panose="020B0604020202020204" pitchFamily="34" charset="0"/>
+              <a:buChar char="•"/>
+              <a:defRPr sz="1400" kern="1200">
+                <a:solidFill>
+                  <a:schemeClr val="tx1"/>
+                </a:solidFill>
+                <a:latin typeface="+mn-lt"/>
+                <a:ea typeface="+mn-ea"/>
+                <a:cs typeface="+mn-cs"/>
+              </a:defRPr>
+            </a:lvl9pPr>
+          </a:lstStyle>
+          <a:p>
+            <a:pPr marL="0" indent="0">
+              <a:buNone/>
+            </a:pPr>
+            <a:r>
+              <a:rPr lang="lv-LV" dirty="0"/>
+              <a:t>4. Beigās izvadām rezultātus konsolē ar paskaidrojošu tekstu.</a:t>
+            </a:r>
+          </a:p>
+          <a:p>
+            <a:pPr marL="0" indent="0">
+              <a:buNone/>
+            </a:pPr>
+            <a:endParaRPr lang="lv-LV" dirty="0"/>
           </a:p>
         </p:txBody>
       </p:sp>
@@ -16572,6 +17369,470 @@
   <p:clrMapOvr>
     <a:masterClrMapping/>
   </p:clrMapOvr>
+  <p:timing>
+    <p:tnLst>
+      <p:par>
+        <p:cTn id="1" dur="indefinite" restart="never" nodeType="tmRoot">
+          <p:childTnLst>
+            <p:seq concurrent="1" nextAc="seek">
+              <p:cTn id="2" dur="indefinite" nodeType="mainSeq">
+                <p:childTnLst>
+                  <p:par>
+                    <p:cTn id="3" fill="hold">
+                      <p:stCondLst>
+                        <p:cond delay="indefinite"/>
+                        <p:cond evt="onBegin" delay="0">
+                          <p:tn val="2"/>
+                        </p:cond>
+                      </p:stCondLst>
+                      <p:childTnLst>
+                        <p:par>
+                          <p:cTn id="4" fill="hold">
+                            <p:stCondLst>
+                              <p:cond delay="0"/>
+                            </p:stCondLst>
+                            <p:childTnLst>
+                              <p:par>
+                                <p:cTn id="5" presetID="10" presetClass="entr" presetSubtype="0" fill="hold" grpId="0" nodeType="withEffect">
+                                  <p:stCondLst>
+                                    <p:cond delay="0"/>
+                                  </p:stCondLst>
+                                  <p:childTnLst>
+                                    <p:set>
+                                      <p:cBhvr>
+                                        <p:cTn id="6" dur="1" fill="hold">
+                                          <p:stCondLst>
+                                            <p:cond delay="0"/>
+                                          </p:stCondLst>
+                                        </p:cTn>
+                                        <p:tgtEl>
+                                          <p:spTgt spid="2"/>
+                                        </p:tgtEl>
+                                        <p:attrNameLst>
+                                          <p:attrName>style.visibility</p:attrName>
+                                        </p:attrNameLst>
+                                      </p:cBhvr>
+                                      <p:to>
+                                        <p:strVal val="visible"/>
+                                      </p:to>
+                                    </p:set>
+                                    <p:animEffect transition="in" filter="fade">
+                                      <p:cBhvr>
+                                        <p:cTn id="7" dur="500"/>
+                                        <p:tgtEl>
+                                          <p:spTgt spid="2"/>
+                                        </p:tgtEl>
+                                      </p:cBhvr>
+                                    </p:animEffect>
+                                  </p:childTnLst>
+                                </p:cTn>
+                              </p:par>
+                            </p:childTnLst>
+                          </p:cTn>
+                        </p:par>
+                      </p:childTnLst>
+                    </p:cTn>
+                  </p:par>
+                  <p:par>
+                    <p:cTn id="8" fill="hold">
+                      <p:stCondLst>
+                        <p:cond delay="indefinite"/>
+                      </p:stCondLst>
+                      <p:childTnLst>
+                        <p:par>
+                          <p:cTn id="9" fill="hold">
+                            <p:stCondLst>
+                              <p:cond delay="0"/>
+                            </p:stCondLst>
+                            <p:childTnLst>
+                              <p:par>
+                                <p:cTn id="10" presetID="10" presetClass="entr" presetSubtype="0" fill="hold" nodeType="clickEffect">
+                                  <p:stCondLst>
+                                    <p:cond delay="0"/>
+                                  </p:stCondLst>
+                                  <p:childTnLst>
+                                    <p:set>
+                                      <p:cBhvr>
+                                        <p:cTn id="11" dur="1" fill="hold">
+                                          <p:stCondLst>
+                                            <p:cond delay="0"/>
+                                          </p:stCondLst>
+                                        </p:cTn>
+                                        <p:tgtEl>
+                                          <p:spTgt spid="4"/>
+                                        </p:tgtEl>
+                                        <p:attrNameLst>
+                                          <p:attrName>style.visibility</p:attrName>
+                                        </p:attrNameLst>
+                                      </p:cBhvr>
+                                      <p:to>
+                                        <p:strVal val="visible"/>
+                                      </p:to>
+                                    </p:set>
+                                    <p:animEffect transition="in" filter="fade">
+                                      <p:cBhvr>
+                                        <p:cTn id="12" dur="500"/>
+                                        <p:tgtEl>
+                                          <p:spTgt spid="4"/>
+                                        </p:tgtEl>
+                                      </p:cBhvr>
+                                    </p:animEffect>
+                                  </p:childTnLst>
+                                </p:cTn>
+                              </p:par>
+                              <p:par>
+                                <p:cTn id="13" presetID="10" presetClass="entr" presetSubtype="0" fill="hold" grpId="0" nodeType="withEffect">
+                                  <p:stCondLst>
+                                    <p:cond delay="0"/>
+                                  </p:stCondLst>
+                                  <p:childTnLst>
+                                    <p:set>
+                                      <p:cBhvr>
+                                        <p:cTn id="14" dur="1" fill="hold">
+                                          <p:stCondLst>
+                                            <p:cond delay="0"/>
+                                          </p:stCondLst>
+                                        </p:cTn>
+                                        <p:tgtEl>
+                                          <p:spTgt spid="3">
+                                            <p:txEl>
+                                              <p:pRg st="0" end="0"/>
+                                            </p:txEl>
+                                          </p:spTgt>
+                                        </p:tgtEl>
+                                        <p:attrNameLst>
+                                          <p:attrName>style.visibility</p:attrName>
+                                        </p:attrNameLst>
+                                      </p:cBhvr>
+                                      <p:to>
+                                        <p:strVal val="visible"/>
+                                      </p:to>
+                                    </p:set>
+                                    <p:animEffect transition="in" filter="fade">
+                                      <p:cBhvr>
+                                        <p:cTn id="15" dur="500"/>
+                                        <p:tgtEl>
+                                          <p:spTgt spid="3">
+                                            <p:txEl>
+                                              <p:pRg st="0" end="0"/>
+                                            </p:txEl>
+                                          </p:spTgt>
+                                        </p:tgtEl>
+                                      </p:cBhvr>
+                                    </p:animEffect>
+                                  </p:childTnLst>
+                                </p:cTn>
+                              </p:par>
+                            </p:childTnLst>
+                          </p:cTn>
+                        </p:par>
+                      </p:childTnLst>
+                    </p:cTn>
+                  </p:par>
+                  <p:par>
+                    <p:cTn id="16" fill="hold">
+                      <p:stCondLst>
+                        <p:cond delay="indefinite"/>
+                      </p:stCondLst>
+                      <p:childTnLst>
+                        <p:par>
+                          <p:cTn id="17" fill="hold">
+                            <p:stCondLst>
+                              <p:cond delay="0"/>
+                            </p:stCondLst>
+                            <p:childTnLst>
+                              <p:par>
+                                <p:cTn id="18" presetID="10" presetClass="exit" presetSubtype="0" fill="hold" grpId="1" nodeType="clickEffect">
+                                  <p:stCondLst>
+                                    <p:cond delay="0"/>
+                                  </p:stCondLst>
+                                  <p:childTnLst>
+                                    <p:animEffect transition="out" filter="fade">
+                                      <p:cBhvr>
+                                        <p:cTn id="19" dur="500"/>
+                                        <p:tgtEl>
+                                          <p:spTgt spid="3">
+                                            <p:txEl>
+                                              <p:pRg st="0" end="0"/>
+                                            </p:txEl>
+                                          </p:spTgt>
+                                        </p:tgtEl>
+                                      </p:cBhvr>
+                                    </p:animEffect>
+                                    <p:set>
+                                      <p:cBhvr>
+                                        <p:cTn id="20" dur="1" fill="hold">
+                                          <p:stCondLst>
+                                            <p:cond delay="499"/>
+                                          </p:stCondLst>
+                                        </p:cTn>
+                                        <p:tgtEl>
+                                          <p:spTgt spid="3">
+                                            <p:txEl>
+                                              <p:pRg st="0" end="0"/>
+                                            </p:txEl>
+                                          </p:spTgt>
+                                        </p:tgtEl>
+                                        <p:attrNameLst>
+                                          <p:attrName>style.visibility</p:attrName>
+                                        </p:attrNameLst>
+                                      </p:cBhvr>
+                                      <p:to>
+                                        <p:strVal val="hidden"/>
+                                      </p:to>
+                                    </p:set>
+                                  </p:childTnLst>
+                                </p:cTn>
+                              </p:par>
+                              <p:par>
+                                <p:cTn id="21" presetID="10" presetClass="entr" presetSubtype="0" fill="hold" grpId="0" nodeType="withEffect">
+                                  <p:stCondLst>
+                                    <p:cond delay="0"/>
+                                  </p:stCondLst>
+                                  <p:childTnLst>
+                                    <p:set>
+                                      <p:cBhvr>
+                                        <p:cTn id="22" dur="1" fill="hold">
+                                          <p:stCondLst>
+                                            <p:cond delay="0"/>
+                                          </p:stCondLst>
+                                        </p:cTn>
+                                        <p:tgtEl>
+                                          <p:spTgt spid="5"/>
+                                        </p:tgtEl>
+                                        <p:attrNameLst>
+                                          <p:attrName>style.visibility</p:attrName>
+                                        </p:attrNameLst>
+                                      </p:cBhvr>
+                                      <p:to>
+                                        <p:strVal val="visible"/>
+                                      </p:to>
+                                    </p:set>
+                                    <p:animEffect transition="in" filter="fade">
+                                      <p:cBhvr>
+                                        <p:cTn id="23" dur="500"/>
+                                        <p:tgtEl>
+                                          <p:spTgt spid="5"/>
+                                        </p:tgtEl>
+                                      </p:cBhvr>
+                                    </p:animEffect>
+                                  </p:childTnLst>
+                                </p:cTn>
+                              </p:par>
+                            </p:childTnLst>
+                          </p:cTn>
+                        </p:par>
+                      </p:childTnLst>
+                    </p:cTn>
+                  </p:par>
+                  <p:par>
+                    <p:cTn id="24" fill="hold">
+                      <p:stCondLst>
+                        <p:cond delay="indefinite"/>
+                      </p:stCondLst>
+                      <p:childTnLst>
+                        <p:par>
+                          <p:cTn id="25" fill="hold">
+                            <p:stCondLst>
+                              <p:cond delay="0"/>
+                            </p:stCondLst>
+                            <p:childTnLst>
+                              <p:par>
+                                <p:cTn id="26" presetID="10" presetClass="exit" presetSubtype="0" fill="hold" grpId="1" nodeType="clickEffect">
+                                  <p:stCondLst>
+                                    <p:cond delay="0"/>
+                                  </p:stCondLst>
+                                  <p:childTnLst>
+                                    <p:animEffect transition="out" filter="fade">
+                                      <p:cBhvr>
+                                        <p:cTn id="27" dur="500"/>
+                                        <p:tgtEl>
+                                          <p:spTgt spid="5"/>
+                                        </p:tgtEl>
+                                      </p:cBhvr>
+                                    </p:animEffect>
+                                    <p:set>
+                                      <p:cBhvr>
+                                        <p:cTn id="28" dur="1" fill="hold">
+                                          <p:stCondLst>
+                                            <p:cond delay="499"/>
+                                          </p:stCondLst>
+                                        </p:cTn>
+                                        <p:tgtEl>
+                                          <p:spTgt spid="5"/>
+                                        </p:tgtEl>
+                                        <p:attrNameLst>
+                                          <p:attrName>style.visibility</p:attrName>
+                                        </p:attrNameLst>
+                                      </p:cBhvr>
+                                      <p:to>
+                                        <p:strVal val="hidden"/>
+                                      </p:to>
+                                    </p:set>
+                                  </p:childTnLst>
+                                </p:cTn>
+                              </p:par>
+                              <p:par>
+                                <p:cTn id="29" presetID="10" presetClass="entr" presetSubtype="0" fill="hold" grpId="0" nodeType="withEffect">
+                                  <p:stCondLst>
+                                    <p:cond delay="0"/>
+                                  </p:stCondLst>
+                                  <p:childTnLst>
+                                    <p:set>
+                                      <p:cBhvr>
+                                        <p:cTn id="30" dur="1" fill="hold">
+                                          <p:stCondLst>
+                                            <p:cond delay="0"/>
+                                          </p:stCondLst>
+                                        </p:cTn>
+                                        <p:tgtEl>
+                                          <p:spTgt spid="7"/>
+                                        </p:tgtEl>
+                                        <p:attrNameLst>
+                                          <p:attrName>style.visibility</p:attrName>
+                                        </p:attrNameLst>
+                                      </p:cBhvr>
+                                      <p:to>
+                                        <p:strVal val="visible"/>
+                                      </p:to>
+                                    </p:set>
+                                    <p:animEffect transition="in" filter="fade">
+                                      <p:cBhvr>
+                                        <p:cTn id="31" dur="500"/>
+                                        <p:tgtEl>
+                                          <p:spTgt spid="7"/>
+                                        </p:tgtEl>
+                                      </p:cBhvr>
+                                    </p:animEffect>
+                                  </p:childTnLst>
+                                </p:cTn>
+                              </p:par>
+                            </p:childTnLst>
+                          </p:cTn>
+                        </p:par>
+                      </p:childTnLst>
+                    </p:cTn>
+                  </p:par>
+                  <p:par>
+                    <p:cTn id="32" fill="hold">
+                      <p:stCondLst>
+                        <p:cond delay="indefinite"/>
+                      </p:stCondLst>
+                      <p:childTnLst>
+                        <p:par>
+                          <p:cTn id="33" fill="hold">
+                            <p:stCondLst>
+                              <p:cond delay="0"/>
+                            </p:stCondLst>
+                            <p:childTnLst>
+                              <p:par>
+                                <p:cTn id="34" presetID="10" presetClass="exit" presetSubtype="0" fill="hold" grpId="1" nodeType="clickEffect">
+                                  <p:stCondLst>
+                                    <p:cond delay="0"/>
+                                  </p:stCondLst>
+                                  <p:childTnLst>
+                                    <p:animEffect transition="out" filter="fade">
+                                      <p:cBhvr>
+                                        <p:cTn id="35" dur="500"/>
+                                        <p:tgtEl>
+                                          <p:spTgt spid="7"/>
+                                        </p:tgtEl>
+                                      </p:cBhvr>
+                                    </p:animEffect>
+                                    <p:set>
+                                      <p:cBhvr>
+                                        <p:cTn id="36" dur="1" fill="hold">
+                                          <p:stCondLst>
+                                            <p:cond delay="499"/>
+                                          </p:stCondLst>
+                                        </p:cTn>
+                                        <p:tgtEl>
+                                          <p:spTgt spid="7"/>
+                                        </p:tgtEl>
+                                        <p:attrNameLst>
+                                          <p:attrName>style.visibility</p:attrName>
+                                        </p:attrNameLst>
+                                      </p:cBhvr>
+                                      <p:to>
+                                        <p:strVal val="hidden"/>
+                                      </p:to>
+                                    </p:set>
+                                  </p:childTnLst>
+                                </p:cTn>
+                              </p:par>
+                              <p:par>
+                                <p:cTn id="37" presetID="10" presetClass="entr" presetSubtype="0" fill="hold" grpId="0" nodeType="withEffect">
+                                  <p:stCondLst>
+                                    <p:cond delay="0"/>
+                                  </p:stCondLst>
+                                  <p:childTnLst>
+                                    <p:set>
+                                      <p:cBhvr>
+                                        <p:cTn id="38" dur="1" fill="hold">
+                                          <p:stCondLst>
+                                            <p:cond delay="0"/>
+                                          </p:stCondLst>
+                                        </p:cTn>
+                                        <p:tgtEl>
+                                          <p:spTgt spid="9"/>
+                                        </p:tgtEl>
+                                        <p:attrNameLst>
+                                          <p:attrName>style.visibility</p:attrName>
+                                        </p:attrNameLst>
+                                      </p:cBhvr>
+                                      <p:to>
+                                        <p:strVal val="visible"/>
+                                      </p:to>
+                                    </p:set>
+                                    <p:animEffect transition="in" filter="fade">
+                                      <p:cBhvr>
+                                        <p:cTn id="39" dur="500"/>
+                                        <p:tgtEl>
+                                          <p:spTgt spid="9"/>
+                                        </p:tgtEl>
+                                      </p:cBhvr>
+                                    </p:animEffect>
+                                  </p:childTnLst>
+                                </p:cTn>
+                              </p:par>
+                            </p:childTnLst>
+                          </p:cTn>
+                        </p:par>
+                      </p:childTnLst>
+                    </p:cTn>
+                  </p:par>
+                </p:childTnLst>
+              </p:cTn>
+              <p:prevCondLst>
+                <p:cond evt="onPrev" delay="0">
+                  <p:tgtEl>
+                    <p:sldTgt/>
+                  </p:tgtEl>
+                </p:cond>
+              </p:prevCondLst>
+              <p:nextCondLst>
+                <p:cond evt="onNext" delay="0">
+                  <p:tgtEl>
+                    <p:sldTgt/>
+                  </p:tgtEl>
+                </p:cond>
+              </p:nextCondLst>
+            </p:seq>
+          </p:childTnLst>
+        </p:cTn>
+      </p:par>
+    </p:tnLst>
+    <p:bldLst>
+      <p:bldP spid="2" grpId="0"/>
+      <p:bldP spid="3" grpId="0" build="p"/>
+      <p:bldP spid="3" grpId="1" build="p"/>
+      <p:bldP spid="5" grpId="0"/>
+      <p:bldP spid="5" grpId="1"/>
+      <p:bldP spid="7" grpId="0"/>
+      <p:bldP spid="7" grpId="1"/>
+      <p:bldP spid="9" grpId="0"/>
+    </p:bldLst>
+  </p:timing>
 </p:sld>
 </file>
 
@@ -18369,7 +19630,7 @@
           <a:p>
             <a:r>
               <a:rPr lang="lv-LV" sz="4800" dirty="0"/>
-              <a:t>Kas ir mainīgie?</a:t>
+              <a:t>Mainīgie</a:t>
             </a:r>
           </a:p>
         </p:txBody>
@@ -18398,7 +19659,7 @@
         </p:spPr>
         <p:txBody>
           <a:bodyPr>
-            <a:normAutofit lnSpcReduction="10000"/>
+            <a:normAutofit fontScale="92500"/>
           </a:bodyPr>
           <a:lstStyle/>
           <a:p>
@@ -18449,7 +19710,11 @@
             </a:r>
             <a:r>
               <a:rPr lang="en-US" dirty="0" err="1"/>
-              <a:t>vērtības</a:t>
+              <a:t>vērtīb</a:t>
+            </a:r>
+            <a:r>
+              <a:rPr lang="lv-LV" dirty="0"/>
+              <a:t>u</a:t>
             </a:r>
             <a:r>
               <a:rPr lang="en-US" dirty="0"/>
@@ -18468,21 +19733,21 @@
             <a:pPr algn="just"/>
             <a:r>
               <a:rPr lang="lv-LV" dirty="0"/>
-              <a:t>Python nav komandas mainīgā deklarēšanai.</a:t>
+              <a:t>Python valodā nav komandas mainīgā deklarēšanai.</a:t>
             </a:r>
           </a:p>
           <a:p>
             <a:pPr algn="just"/>
             <a:r>
               <a:rPr lang="lv-LV" dirty="0"/>
-              <a:t>Mainīgais tiek izveidots brīdī, kad tam pirmo reizi piešķirat vērtību.</a:t>
+              <a:t>Mainīgais tiek izveidots brīdī, kad tam pirmo reizi piešķir vērtību.</a:t>
             </a:r>
           </a:p>
           <a:p>
             <a:pPr algn="just"/>
             <a:r>
               <a:rPr lang="lv-LV" dirty="0"/>
-              <a:t>Mainīgie nav jādeklarē ar konkrētu tipu, un to tips var mainīties pat pēc iestatīšanas.</a:t>
+              <a:t>Mainīgie nav jādeklarē ar konkrētu tipu, un to tips var mainīties arī pat pēc iestatīšanas.</a:t>
             </a:r>
           </a:p>
           <a:p>

</xml_diff>

<commit_message>
Mācību materiālā izveidots slaids ar otro uzdevumu piemēru.
</commit_message>
<xml_diff>
--- a/Mainigie_DatuTipi_macibu_materials.pptx
+++ b/Mainigie_DatuTipi_macibu_materials.pptx
@@ -19,9 +19,11 @@
     <p:sldId id="266" r:id="rId13"/>
     <p:sldId id="263" r:id="rId14"/>
     <p:sldId id="269" r:id="rId15"/>
-    <p:sldId id="270" r:id="rId16"/>
-    <p:sldId id="272" r:id="rId17"/>
-    <p:sldId id="264" r:id="rId18"/>
+    <p:sldId id="273" r:id="rId16"/>
+    <p:sldId id="274" r:id="rId17"/>
+    <p:sldId id="270" r:id="rId18"/>
+    <p:sldId id="272" r:id="rId19"/>
+    <p:sldId id="264" r:id="rId20"/>
   </p:sldIdLst>
   <p:sldSz cx="12192000" cy="6858000"/>
   <p:notesSz cx="6858000" cy="9144000"/>
@@ -16568,7 +16570,7 @@
         </p:nvSpPr>
         <p:spPr>
           <a:xfrm>
-            <a:off x="895253" y="5598346"/>
+            <a:off x="1103825" y="5609075"/>
             <a:ext cx="10398316" cy="949911"/>
           </a:xfrm>
         </p:spPr>
@@ -16664,7 +16666,7 @@
         </p:nvSpPr>
         <p:spPr>
           <a:xfrm>
-            <a:off x="1250853" y="5598345"/>
+            <a:off x="1798183" y="5609075"/>
             <a:ext cx="9905999" cy="949911"/>
           </a:xfrm>
           <a:prstGeom prst="rect">
@@ -16941,7 +16943,7 @@
         </p:nvSpPr>
         <p:spPr>
           <a:xfrm>
-            <a:off x="1250853" y="5598345"/>
+            <a:off x="2208796" y="5621582"/>
             <a:ext cx="9905999" cy="949911"/>
           </a:xfrm>
           <a:prstGeom prst="rect">
@@ -17158,7 +17160,7 @@
         </p:nvSpPr>
         <p:spPr>
           <a:xfrm>
-            <a:off x="1387570" y="5598345"/>
+            <a:off x="2286001" y="5612319"/>
             <a:ext cx="9905999" cy="949911"/>
           </a:xfrm>
           <a:prstGeom prst="rect">
@@ -17858,6 +17860,1412 @@
           <p:cNvPr id="2" name="Title 1">
             <a:extLst>
               <a:ext uri="{FF2B5EF4-FFF2-40B4-BE49-F238E27FC236}">
+                <a16:creationId xmlns:a16="http://schemas.microsoft.com/office/drawing/2014/main" id="{2A55F87A-99EA-462C-AE86-05FEDE2BA801}"/>
+              </a:ext>
+            </a:extLst>
+          </p:cNvPr>
+          <p:cNvSpPr>
+            <a:spLocks noGrp="1"/>
+          </p:cNvSpPr>
+          <p:nvPr>
+            <p:ph type="title"/>
+          </p:nvPr>
+        </p:nvSpPr>
+        <p:spPr>
+          <a:xfrm>
+            <a:off x="1141412" y="161318"/>
+            <a:ext cx="9905998" cy="1478570"/>
+          </a:xfrm>
+        </p:spPr>
+        <p:txBody>
+          <a:bodyPr/>
+          <a:lstStyle/>
+          <a:p>
+            <a:r>
+              <a:rPr lang="lv-LV" dirty="0"/>
+              <a:t>Uzdevums 2: Loģiskā pārbaude ar vairākiem nosacījumiem</a:t>
+            </a:r>
+          </a:p>
+        </p:txBody>
+      </p:sp>
+      <p:sp>
+        <p:nvSpPr>
+          <p:cNvPr id="3" name="Content Placeholder 2">
+            <a:extLst>
+              <a:ext uri="{FF2B5EF4-FFF2-40B4-BE49-F238E27FC236}">
+                <a16:creationId xmlns:a16="http://schemas.microsoft.com/office/drawing/2014/main" id="{9C4F7428-80B5-4F84-919B-44E100CD989A}"/>
+              </a:ext>
+            </a:extLst>
+          </p:cNvPr>
+          <p:cNvSpPr>
+            <a:spLocks noGrp="1"/>
+          </p:cNvSpPr>
+          <p:nvPr>
+            <p:ph idx="1"/>
+          </p:nvPr>
+        </p:nvSpPr>
+        <p:spPr>
+          <a:xfrm>
+            <a:off x="1827211" y="5366005"/>
+            <a:ext cx="9905999" cy="1101345"/>
+          </a:xfrm>
+        </p:spPr>
+        <p:txBody>
+          <a:bodyPr/>
+          <a:lstStyle/>
+          <a:p>
+            <a:pPr marL="0" indent="0">
+              <a:buNone/>
+            </a:pPr>
+            <a:r>
+              <a:rPr lang="lv-LV" dirty="0"/>
+              <a:t>1. Definējam mainīgo skaitli ar veselā skaitļa datu tipa vērtību.</a:t>
+            </a:r>
+          </a:p>
+        </p:txBody>
+      </p:sp>
+      <p:pic>
+        <p:nvPicPr>
+          <p:cNvPr id="4" name="Picture 3">
+            <a:extLst>
+              <a:ext uri="{FF2B5EF4-FFF2-40B4-BE49-F238E27FC236}">
+                <a16:creationId xmlns:a16="http://schemas.microsoft.com/office/drawing/2014/main" id="{5916A3C1-A992-45CA-9F49-D1406560F4E1}"/>
+              </a:ext>
+            </a:extLst>
+          </p:cNvPr>
+          <p:cNvPicPr>
+            <a:picLocks noChangeAspect="1"/>
+          </p:cNvPicPr>
+          <p:nvPr/>
+        </p:nvPicPr>
+        <p:blipFill>
+          <a:blip r:embed="rId2"/>
+          <a:stretch>
+            <a:fillRect/>
+          </a:stretch>
+        </p:blipFill>
+        <p:spPr>
+          <a:xfrm>
+            <a:off x="304800" y="1534885"/>
+            <a:ext cx="11658600" cy="3441069"/>
+          </a:xfrm>
+          <a:prstGeom prst="rect">
+            <a:avLst/>
+          </a:prstGeom>
+        </p:spPr>
+      </p:pic>
+      <p:sp>
+        <p:nvSpPr>
+          <p:cNvPr id="6" name="Content Placeholder 2">
+            <a:extLst>
+              <a:ext uri="{FF2B5EF4-FFF2-40B4-BE49-F238E27FC236}">
+                <a16:creationId xmlns:a16="http://schemas.microsoft.com/office/drawing/2014/main" id="{22D515AF-AAFD-4ACB-AD68-EC384731CA35}"/>
+              </a:ext>
+            </a:extLst>
+          </p:cNvPr>
+          <p:cNvSpPr txBox="1">
+            <a:spLocks/>
+          </p:cNvSpPr>
+          <p:nvPr/>
+        </p:nvSpPr>
+        <p:spPr>
+          <a:xfrm>
+            <a:off x="1727312" y="5382296"/>
+            <a:ext cx="9905999" cy="1101345"/>
+          </a:xfrm>
+          <a:prstGeom prst="rect">
+            <a:avLst/>
+          </a:prstGeom>
+        </p:spPr>
+        <p:txBody>
+          <a:bodyPr vert="horz" lIns="91440" tIns="45720" rIns="91440" bIns="45720" rtlCol="0">
+            <a:normAutofit/>
+          </a:bodyPr>
+          <a:lstStyle>
+            <a:lvl1pPr marL="228600" indent="-228600" algn="l" defTabSz="914400" rtl="0" eaLnBrk="1" latinLnBrk="0" hangingPunct="1">
+              <a:lnSpc>
+                <a:spcPct val="120000"/>
+              </a:lnSpc>
+              <a:spcBef>
+                <a:spcPts val="1000"/>
+              </a:spcBef>
+              <a:buSzPct val="125000"/>
+              <a:buFont typeface="Arial" panose="020B0604020202020204" pitchFamily="34" charset="0"/>
+              <a:buChar char="•"/>
+              <a:defRPr sz="2400" kern="1200">
+                <a:solidFill>
+                  <a:schemeClr val="tx1"/>
+                </a:solidFill>
+                <a:latin typeface="+mn-lt"/>
+                <a:ea typeface="+mn-ea"/>
+                <a:cs typeface="+mn-cs"/>
+              </a:defRPr>
+            </a:lvl1pPr>
+            <a:lvl2pPr marL="685800" indent="-228600" algn="l" defTabSz="914400" rtl="0" eaLnBrk="1" latinLnBrk="0" hangingPunct="1">
+              <a:lnSpc>
+                <a:spcPct val="120000"/>
+              </a:lnSpc>
+              <a:spcBef>
+                <a:spcPts val="500"/>
+              </a:spcBef>
+              <a:buSzPct val="125000"/>
+              <a:buFont typeface="Arial" panose="020B0604020202020204" pitchFamily="34" charset="0"/>
+              <a:buChar char="•"/>
+              <a:defRPr sz="2000" kern="1200">
+                <a:solidFill>
+                  <a:schemeClr val="tx1"/>
+                </a:solidFill>
+                <a:latin typeface="+mn-lt"/>
+                <a:ea typeface="+mn-ea"/>
+                <a:cs typeface="+mn-cs"/>
+              </a:defRPr>
+            </a:lvl2pPr>
+            <a:lvl3pPr marL="1143000" indent="-228600" algn="l" defTabSz="914400" rtl="0" eaLnBrk="1" latinLnBrk="0" hangingPunct="1">
+              <a:lnSpc>
+                <a:spcPct val="120000"/>
+              </a:lnSpc>
+              <a:spcBef>
+                <a:spcPts val="500"/>
+              </a:spcBef>
+              <a:buSzPct val="125000"/>
+              <a:buFont typeface="Arial" panose="020B0604020202020204" pitchFamily="34" charset="0"/>
+              <a:buChar char="•"/>
+              <a:defRPr sz="1800" kern="1200">
+                <a:solidFill>
+                  <a:schemeClr val="tx1"/>
+                </a:solidFill>
+                <a:latin typeface="+mn-lt"/>
+                <a:ea typeface="+mn-ea"/>
+                <a:cs typeface="+mn-cs"/>
+              </a:defRPr>
+            </a:lvl3pPr>
+            <a:lvl4pPr marL="1600200" indent="-228600" algn="l" defTabSz="914400" rtl="0" eaLnBrk="1" latinLnBrk="0" hangingPunct="1">
+              <a:lnSpc>
+                <a:spcPct val="120000"/>
+              </a:lnSpc>
+              <a:spcBef>
+                <a:spcPts val="500"/>
+              </a:spcBef>
+              <a:buSzPct val="125000"/>
+              <a:buFont typeface="Arial" panose="020B0604020202020204" pitchFamily="34" charset="0"/>
+              <a:buChar char="•"/>
+              <a:defRPr sz="1600" kern="1200">
+                <a:solidFill>
+                  <a:schemeClr val="tx1"/>
+                </a:solidFill>
+                <a:latin typeface="+mn-lt"/>
+                <a:ea typeface="+mn-ea"/>
+                <a:cs typeface="+mn-cs"/>
+              </a:defRPr>
+            </a:lvl4pPr>
+            <a:lvl5pPr marL="2057400" indent="-228600" algn="l" defTabSz="914400" rtl="0" eaLnBrk="1" latinLnBrk="0" hangingPunct="1">
+              <a:lnSpc>
+                <a:spcPct val="120000"/>
+              </a:lnSpc>
+              <a:spcBef>
+                <a:spcPts val="500"/>
+              </a:spcBef>
+              <a:buSzPct val="125000"/>
+              <a:buFont typeface="Arial" panose="020B0604020202020204" pitchFamily="34" charset="0"/>
+              <a:buChar char="•"/>
+              <a:defRPr sz="1600" kern="1200">
+                <a:solidFill>
+                  <a:schemeClr val="tx1"/>
+                </a:solidFill>
+                <a:latin typeface="+mn-lt"/>
+                <a:ea typeface="+mn-ea"/>
+                <a:cs typeface="+mn-cs"/>
+              </a:defRPr>
+            </a:lvl5pPr>
+            <a:lvl6pPr marL="2514600" indent="-228600" algn="l" defTabSz="914400" rtl="0" eaLnBrk="1" latinLnBrk="0" hangingPunct="1">
+              <a:lnSpc>
+                <a:spcPct val="120000"/>
+              </a:lnSpc>
+              <a:spcBef>
+                <a:spcPts val="500"/>
+              </a:spcBef>
+              <a:buSzPct val="125000"/>
+              <a:buFont typeface="Arial" panose="020B0604020202020204" pitchFamily="34" charset="0"/>
+              <a:buChar char="•"/>
+              <a:defRPr sz="1400" kern="1200">
+                <a:solidFill>
+                  <a:schemeClr val="tx1"/>
+                </a:solidFill>
+                <a:latin typeface="+mn-lt"/>
+                <a:ea typeface="+mn-ea"/>
+                <a:cs typeface="+mn-cs"/>
+              </a:defRPr>
+            </a:lvl6pPr>
+            <a:lvl7pPr marL="2971800" indent="-228600" algn="l" defTabSz="914400" rtl="0" eaLnBrk="1" latinLnBrk="0" hangingPunct="1">
+              <a:lnSpc>
+                <a:spcPct val="120000"/>
+              </a:lnSpc>
+              <a:spcBef>
+                <a:spcPts val="500"/>
+              </a:spcBef>
+              <a:buSzPct val="125000"/>
+              <a:buFont typeface="Arial" panose="020B0604020202020204" pitchFamily="34" charset="0"/>
+              <a:buChar char="•"/>
+              <a:defRPr sz="1400" kern="1200">
+                <a:solidFill>
+                  <a:schemeClr val="tx1"/>
+                </a:solidFill>
+                <a:latin typeface="+mn-lt"/>
+                <a:ea typeface="+mn-ea"/>
+                <a:cs typeface="+mn-cs"/>
+              </a:defRPr>
+            </a:lvl7pPr>
+            <a:lvl8pPr marL="3429000" indent="-228600" algn="l" defTabSz="914400" rtl="0" eaLnBrk="1" latinLnBrk="0" hangingPunct="1">
+              <a:lnSpc>
+                <a:spcPct val="120000"/>
+              </a:lnSpc>
+              <a:spcBef>
+                <a:spcPts val="500"/>
+              </a:spcBef>
+              <a:buSzPct val="125000"/>
+              <a:buFont typeface="Arial" panose="020B0604020202020204" pitchFamily="34" charset="0"/>
+              <a:buChar char="•"/>
+              <a:defRPr sz="1400" kern="1200">
+                <a:solidFill>
+                  <a:schemeClr val="tx1"/>
+                </a:solidFill>
+                <a:latin typeface="+mn-lt"/>
+                <a:ea typeface="+mn-ea"/>
+                <a:cs typeface="+mn-cs"/>
+              </a:defRPr>
+            </a:lvl8pPr>
+            <a:lvl9pPr marL="3886200" indent="-228600" algn="l" defTabSz="914400" rtl="0" eaLnBrk="1" latinLnBrk="0" hangingPunct="1">
+              <a:lnSpc>
+                <a:spcPct val="120000"/>
+              </a:lnSpc>
+              <a:spcBef>
+                <a:spcPts val="500"/>
+              </a:spcBef>
+              <a:buSzPct val="125000"/>
+              <a:buFont typeface="Arial" panose="020B0604020202020204" pitchFamily="34" charset="0"/>
+              <a:buChar char="•"/>
+              <a:defRPr sz="1400" kern="1200">
+                <a:solidFill>
+                  <a:schemeClr val="tx1"/>
+                </a:solidFill>
+                <a:latin typeface="+mn-lt"/>
+                <a:ea typeface="+mn-ea"/>
+                <a:cs typeface="+mn-cs"/>
+              </a:defRPr>
+            </a:lvl9pPr>
+          </a:lstStyle>
+          <a:p>
+            <a:pPr marL="0" indent="0">
+              <a:buNone/>
+            </a:pPr>
+            <a:r>
+              <a:rPr lang="lv-LV" dirty="0"/>
+              <a:t>2. Pārbaudām, vai skaitlis ir pozitīvs, pāra skaitlis un mazāks par 100.</a:t>
+            </a:r>
+          </a:p>
+        </p:txBody>
+      </p:sp>
+      <p:sp>
+        <p:nvSpPr>
+          <p:cNvPr id="11" name="Content Placeholder 2">
+            <a:extLst>
+              <a:ext uri="{FF2B5EF4-FFF2-40B4-BE49-F238E27FC236}">
+                <a16:creationId xmlns:a16="http://schemas.microsoft.com/office/drawing/2014/main" id="{6A2F3484-D948-48DE-8C88-3798B9335EF6}"/>
+              </a:ext>
+            </a:extLst>
+          </p:cNvPr>
+          <p:cNvSpPr txBox="1">
+            <a:spLocks/>
+          </p:cNvSpPr>
+          <p:nvPr/>
+        </p:nvSpPr>
+        <p:spPr>
+          <a:xfrm>
+            <a:off x="2740142" y="5398587"/>
+            <a:ext cx="9905999" cy="1101345"/>
+          </a:xfrm>
+          <a:prstGeom prst="rect">
+            <a:avLst/>
+          </a:prstGeom>
+        </p:spPr>
+        <p:txBody>
+          <a:bodyPr vert="horz" lIns="91440" tIns="45720" rIns="91440" bIns="45720" rtlCol="0">
+            <a:normAutofit/>
+          </a:bodyPr>
+          <a:lstStyle>
+            <a:lvl1pPr marL="228600" indent="-228600" algn="l" defTabSz="914400" rtl="0" eaLnBrk="1" latinLnBrk="0" hangingPunct="1">
+              <a:lnSpc>
+                <a:spcPct val="120000"/>
+              </a:lnSpc>
+              <a:spcBef>
+                <a:spcPts val="1000"/>
+              </a:spcBef>
+              <a:buSzPct val="125000"/>
+              <a:buFont typeface="Arial" panose="020B0604020202020204" pitchFamily="34" charset="0"/>
+              <a:buChar char="•"/>
+              <a:defRPr sz="2400" kern="1200">
+                <a:solidFill>
+                  <a:schemeClr val="tx1"/>
+                </a:solidFill>
+                <a:latin typeface="+mn-lt"/>
+                <a:ea typeface="+mn-ea"/>
+                <a:cs typeface="+mn-cs"/>
+              </a:defRPr>
+            </a:lvl1pPr>
+            <a:lvl2pPr marL="685800" indent="-228600" algn="l" defTabSz="914400" rtl="0" eaLnBrk="1" latinLnBrk="0" hangingPunct="1">
+              <a:lnSpc>
+                <a:spcPct val="120000"/>
+              </a:lnSpc>
+              <a:spcBef>
+                <a:spcPts val="500"/>
+              </a:spcBef>
+              <a:buSzPct val="125000"/>
+              <a:buFont typeface="Arial" panose="020B0604020202020204" pitchFamily="34" charset="0"/>
+              <a:buChar char="•"/>
+              <a:defRPr sz="2000" kern="1200">
+                <a:solidFill>
+                  <a:schemeClr val="tx1"/>
+                </a:solidFill>
+                <a:latin typeface="+mn-lt"/>
+                <a:ea typeface="+mn-ea"/>
+                <a:cs typeface="+mn-cs"/>
+              </a:defRPr>
+            </a:lvl2pPr>
+            <a:lvl3pPr marL="1143000" indent="-228600" algn="l" defTabSz="914400" rtl="0" eaLnBrk="1" latinLnBrk="0" hangingPunct="1">
+              <a:lnSpc>
+                <a:spcPct val="120000"/>
+              </a:lnSpc>
+              <a:spcBef>
+                <a:spcPts val="500"/>
+              </a:spcBef>
+              <a:buSzPct val="125000"/>
+              <a:buFont typeface="Arial" panose="020B0604020202020204" pitchFamily="34" charset="0"/>
+              <a:buChar char="•"/>
+              <a:defRPr sz="1800" kern="1200">
+                <a:solidFill>
+                  <a:schemeClr val="tx1"/>
+                </a:solidFill>
+                <a:latin typeface="+mn-lt"/>
+                <a:ea typeface="+mn-ea"/>
+                <a:cs typeface="+mn-cs"/>
+              </a:defRPr>
+            </a:lvl3pPr>
+            <a:lvl4pPr marL="1600200" indent="-228600" algn="l" defTabSz="914400" rtl="0" eaLnBrk="1" latinLnBrk="0" hangingPunct="1">
+              <a:lnSpc>
+                <a:spcPct val="120000"/>
+              </a:lnSpc>
+              <a:spcBef>
+                <a:spcPts val="500"/>
+              </a:spcBef>
+              <a:buSzPct val="125000"/>
+              <a:buFont typeface="Arial" panose="020B0604020202020204" pitchFamily="34" charset="0"/>
+              <a:buChar char="•"/>
+              <a:defRPr sz="1600" kern="1200">
+                <a:solidFill>
+                  <a:schemeClr val="tx1"/>
+                </a:solidFill>
+                <a:latin typeface="+mn-lt"/>
+                <a:ea typeface="+mn-ea"/>
+                <a:cs typeface="+mn-cs"/>
+              </a:defRPr>
+            </a:lvl4pPr>
+            <a:lvl5pPr marL="2057400" indent="-228600" algn="l" defTabSz="914400" rtl="0" eaLnBrk="1" latinLnBrk="0" hangingPunct="1">
+              <a:lnSpc>
+                <a:spcPct val="120000"/>
+              </a:lnSpc>
+              <a:spcBef>
+                <a:spcPts val="500"/>
+              </a:spcBef>
+              <a:buSzPct val="125000"/>
+              <a:buFont typeface="Arial" panose="020B0604020202020204" pitchFamily="34" charset="0"/>
+              <a:buChar char="•"/>
+              <a:defRPr sz="1600" kern="1200">
+                <a:solidFill>
+                  <a:schemeClr val="tx1"/>
+                </a:solidFill>
+                <a:latin typeface="+mn-lt"/>
+                <a:ea typeface="+mn-ea"/>
+                <a:cs typeface="+mn-cs"/>
+              </a:defRPr>
+            </a:lvl5pPr>
+            <a:lvl6pPr marL="2514600" indent="-228600" algn="l" defTabSz="914400" rtl="0" eaLnBrk="1" latinLnBrk="0" hangingPunct="1">
+              <a:lnSpc>
+                <a:spcPct val="120000"/>
+              </a:lnSpc>
+              <a:spcBef>
+                <a:spcPts val="500"/>
+              </a:spcBef>
+              <a:buSzPct val="125000"/>
+              <a:buFont typeface="Arial" panose="020B0604020202020204" pitchFamily="34" charset="0"/>
+              <a:buChar char="•"/>
+              <a:defRPr sz="1400" kern="1200">
+                <a:solidFill>
+                  <a:schemeClr val="tx1"/>
+                </a:solidFill>
+                <a:latin typeface="+mn-lt"/>
+                <a:ea typeface="+mn-ea"/>
+                <a:cs typeface="+mn-cs"/>
+              </a:defRPr>
+            </a:lvl6pPr>
+            <a:lvl7pPr marL="2971800" indent="-228600" algn="l" defTabSz="914400" rtl="0" eaLnBrk="1" latinLnBrk="0" hangingPunct="1">
+              <a:lnSpc>
+                <a:spcPct val="120000"/>
+              </a:lnSpc>
+              <a:spcBef>
+                <a:spcPts val="500"/>
+              </a:spcBef>
+              <a:buSzPct val="125000"/>
+              <a:buFont typeface="Arial" panose="020B0604020202020204" pitchFamily="34" charset="0"/>
+              <a:buChar char="•"/>
+              <a:defRPr sz="1400" kern="1200">
+                <a:solidFill>
+                  <a:schemeClr val="tx1"/>
+                </a:solidFill>
+                <a:latin typeface="+mn-lt"/>
+                <a:ea typeface="+mn-ea"/>
+                <a:cs typeface="+mn-cs"/>
+              </a:defRPr>
+            </a:lvl7pPr>
+            <a:lvl8pPr marL="3429000" indent="-228600" algn="l" defTabSz="914400" rtl="0" eaLnBrk="1" latinLnBrk="0" hangingPunct="1">
+              <a:lnSpc>
+                <a:spcPct val="120000"/>
+              </a:lnSpc>
+              <a:spcBef>
+                <a:spcPts val="500"/>
+              </a:spcBef>
+              <a:buSzPct val="125000"/>
+              <a:buFont typeface="Arial" panose="020B0604020202020204" pitchFamily="34" charset="0"/>
+              <a:buChar char="•"/>
+              <a:defRPr sz="1400" kern="1200">
+                <a:solidFill>
+                  <a:schemeClr val="tx1"/>
+                </a:solidFill>
+                <a:latin typeface="+mn-lt"/>
+                <a:ea typeface="+mn-ea"/>
+                <a:cs typeface="+mn-cs"/>
+              </a:defRPr>
+            </a:lvl8pPr>
+            <a:lvl9pPr marL="3886200" indent="-228600" algn="l" defTabSz="914400" rtl="0" eaLnBrk="1" latinLnBrk="0" hangingPunct="1">
+              <a:lnSpc>
+                <a:spcPct val="120000"/>
+              </a:lnSpc>
+              <a:spcBef>
+                <a:spcPts val="500"/>
+              </a:spcBef>
+              <a:buSzPct val="125000"/>
+              <a:buFont typeface="Arial" panose="020B0604020202020204" pitchFamily="34" charset="0"/>
+              <a:buChar char="•"/>
+              <a:defRPr sz="1400" kern="1200">
+                <a:solidFill>
+                  <a:schemeClr val="tx1"/>
+                </a:solidFill>
+                <a:latin typeface="+mn-lt"/>
+                <a:ea typeface="+mn-ea"/>
+                <a:cs typeface="+mn-cs"/>
+              </a:defRPr>
+            </a:lvl9pPr>
+          </a:lstStyle>
+          <a:p>
+            <a:pPr marL="0" indent="0">
+              <a:buNone/>
+            </a:pPr>
+            <a:r>
+              <a:rPr lang="lv-LV" dirty="0"/>
+              <a:t>4. Izvadām rezultātu ar vērtību </a:t>
+            </a:r>
+            <a:r>
+              <a:rPr lang="lv-LV" dirty="0">
+                <a:solidFill>
+                  <a:srgbClr val="00FA18"/>
+                </a:solidFill>
+              </a:rPr>
+              <a:t>True</a:t>
+            </a:r>
+            <a:r>
+              <a:rPr lang="lv-LV" dirty="0"/>
+              <a:t> vai </a:t>
+            </a:r>
+            <a:r>
+              <a:rPr lang="lv-LV" dirty="0">
+                <a:solidFill>
+                  <a:srgbClr val="FF0000"/>
+                </a:solidFill>
+              </a:rPr>
+              <a:t>False</a:t>
+            </a:r>
+            <a:r>
+              <a:rPr lang="lv-LV" dirty="0"/>
+              <a:t>.</a:t>
+            </a:r>
+          </a:p>
+        </p:txBody>
+      </p:sp>
+      <p:sp>
+        <p:nvSpPr>
+          <p:cNvPr id="13" name="Content Placeholder 2">
+            <a:extLst>
+              <a:ext uri="{FF2B5EF4-FFF2-40B4-BE49-F238E27FC236}">
+                <a16:creationId xmlns:a16="http://schemas.microsoft.com/office/drawing/2014/main" id="{D2B3D9B6-595F-4ED6-B9F7-225D68C0AFD3}"/>
+              </a:ext>
+            </a:extLst>
+          </p:cNvPr>
+          <p:cNvSpPr txBox="1">
+            <a:spLocks/>
+          </p:cNvSpPr>
+          <p:nvPr/>
+        </p:nvSpPr>
+        <p:spPr>
+          <a:xfrm>
+            <a:off x="2840041" y="5358061"/>
+            <a:ext cx="9905999" cy="1101345"/>
+          </a:xfrm>
+          <a:prstGeom prst="rect">
+            <a:avLst/>
+          </a:prstGeom>
+        </p:spPr>
+        <p:txBody>
+          <a:bodyPr vert="horz" lIns="91440" tIns="45720" rIns="91440" bIns="45720" rtlCol="0">
+            <a:normAutofit/>
+          </a:bodyPr>
+          <a:lstStyle>
+            <a:lvl1pPr marL="228600" indent="-228600" algn="l" defTabSz="914400" rtl="0" eaLnBrk="1" latinLnBrk="0" hangingPunct="1">
+              <a:lnSpc>
+                <a:spcPct val="120000"/>
+              </a:lnSpc>
+              <a:spcBef>
+                <a:spcPts val="1000"/>
+              </a:spcBef>
+              <a:buSzPct val="125000"/>
+              <a:buFont typeface="Arial" panose="020B0604020202020204" pitchFamily="34" charset="0"/>
+              <a:buChar char="•"/>
+              <a:defRPr sz="2400" kern="1200">
+                <a:solidFill>
+                  <a:schemeClr val="tx1"/>
+                </a:solidFill>
+                <a:latin typeface="+mn-lt"/>
+                <a:ea typeface="+mn-ea"/>
+                <a:cs typeface="+mn-cs"/>
+              </a:defRPr>
+            </a:lvl1pPr>
+            <a:lvl2pPr marL="685800" indent="-228600" algn="l" defTabSz="914400" rtl="0" eaLnBrk="1" latinLnBrk="0" hangingPunct="1">
+              <a:lnSpc>
+                <a:spcPct val="120000"/>
+              </a:lnSpc>
+              <a:spcBef>
+                <a:spcPts val="500"/>
+              </a:spcBef>
+              <a:buSzPct val="125000"/>
+              <a:buFont typeface="Arial" panose="020B0604020202020204" pitchFamily="34" charset="0"/>
+              <a:buChar char="•"/>
+              <a:defRPr sz="2000" kern="1200">
+                <a:solidFill>
+                  <a:schemeClr val="tx1"/>
+                </a:solidFill>
+                <a:latin typeface="+mn-lt"/>
+                <a:ea typeface="+mn-ea"/>
+                <a:cs typeface="+mn-cs"/>
+              </a:defRPr>
+            </a:lvl2pPr>
+            <a:lvl3pPr marL="1143000" indent="-228600" algn="l" defTabSz="914400" rtl="0" eaLnBrk="1" latinLnBrk="0" hangingPunct="1">
+              <a:lnSpc>
+                <a:spcPct val="120000"/>
+              </a:lnSpc>
+              <a:spcBef>
+                <a:spcPts val="500"/>
+              </a:spcBef>
+              <a:buSzPct val="125000"/>
+              <a:buFont typeface="Arial" panose="020B0604020202020204" pitchFamily="34" charset="0"/>
+              <a:buChar char="•"/>
+              <a:defRPr sz="1800" kern="1200">
+                <a:solidFill>
+                  <a:schemeClr val="tx1"/>
+                </a:solidFill>
+                <a:latin typeface="+mn-lt"/>
+                <a:ea typeface="+mn-ea"/>
+                <a:cs typeface="+mn-cs"/>
+              </a:defRPr>
+            </a:lvl3pPr>
+            <a:lvl4pPr marL="1600200" indent="-228600" algn="l" defTabSz="914400" rtl="0" eaLnBrk="1" latinLnBrk="0" hangingPunct="1">
+              <a:lnSpc>
+                <a:spcPct val="120000"/>
+              </a:lnSpc>
+              <a:spcBef>
+                <a:spcPts val="500"/>
+              </a:spcBef>
+              <a:buSzPct val="125000"/>
+              <a:buFont typeface="Arial" panose="020B0604020202020204" pitchFamily="34" charset="0"/>
+              <a:buChar char="•"/>
+              <a:defRPr sz="1600" kern="1200">
+                <a:solidFill>
+                  <a:schemeClr val="tx1"/>
+                </a:solidFill>
+                <a:latin typeface="+mn-lt"/>
+                <a:ea typeface="+mn-ea"/>
+                <a:cs typeface="+mn-cs"/>
+              </a:defRPr>
+            </a:lvl4pPr>
+            <a:lvl5pPr marL="2057400" indent="-228600" algn="l" defTabSz="914400" rtl="0" eaLnBrk="1" latinLnBrk="0" hangingPunct="1">
+              <a:lnSpc>
+                <a:spcPct val="120000"/>
+              </a:lnSpc>
+              <a:spcBef>
+                <a:spcPts val="500"/>
+              </a:spcBef>
+              <a:buSzPct val="125000"/>
+              <a:buFont typeface="Arial" panose="020B0604020202020204" pitchFamily="34" charset="0"/>
+              <a:buChar char="•"/>
+              <a:defRPr sz="1600" kern="1200">
+                <a:solidFill>
+                  <a:schemeClr val="tx1"/>
+                </a:solidFill>
+                <a:latin typeface="+mn-lt"/>
+                <a:ea typeface="+mn-ea"/>
+                <a:cs typeface="+mn-cs"/>
+              </a:defRPr>
+            </a:lvl5pPr>
+            <a:lvl6pPr marL="2514600" indent="-228600" algn="l" defTabSz="914400" rtl="0" eaLnBrk="1" latinLnBrk="0" hangingPunct="1">
+              <a:lnSpc>
+                <a:spcPct val="120000"/>
+              </a:lnSpc>
+              <a:spcBef>
+                <a:spcPts val="500"/>
+              </a:spcBef>
+              <a:buSzPct val="125000"/>
+              <a:buFont typeface="Arial" panose="020B0604020202020204" pitchFamily="34" charset="0"/>
+              <a:buChar char="•"/>
+              <a:defRPr sz="1400" kern="1200">
+                <a:solidFill>
+                  <a:schemeClr val="tx1"/>
+                </a:solidFill>
+                <a:latin typeface="+mn-lt"/>
+                <a:ea typeface="+mn-ea"/>
+                <a:cs typeface="+mn-cs"/>
+              </a:defRPr>
+            </a:lvl6pPr>
+            <a:lvl7pPr marL="2971800" indent="-228600" algn="l" defTabSz="914400" rtl="0" eaLnBrk="1" latinLnBrk="0" hangingPunct="1">
+              <a:lnSpc>
+                <a:spcPct val="120000"/>
+              </a:lnSpc>
+              <a:spcBef>
+                <a:spcPts val="500"/>
+              </a:spcBef>
+              <a:buSzPct val="125000"/>
+              <a:buFont typeface="Arial" panose="020B0604020202020204" pitchFamily="34" charset="0"/>
+              <a:buChar char="•"/>
+              <a:defRPr sz="1400" kern="1200">
+                <a:solidFill>
+                  <a:schemeClr val="tx1"/>
+                </a:solidFill>
+                <a:latin typeface="+mn-lt"/>
+                <a:ea typeface="+mn-ea"/>
+                <a:cs typeface="+mn-cs"/>
+              </a:defRPr>
+            </a:lvl7pPr>
+            <a:lvl8pPr marL="3429000" indent="-228600" algn="l" defTabSz="914400" rtl="0" eaLnBrk="1" latinLnBrk="0" hangingPunct="1">
+              <a:lnSpc>
+                <a:spcPct val="120000"/>
+              </a:lnSpc>
+              <a:spcBef>
+                <a:spcPts val="500"/>
+              </a:spcBef>
+              <a:buSzPct val="125000"/>
+              <a:buFont typeface="Arial" panose="020B0604020202020204" pitchFamily="34" charset="0"/>
+              <a:buChar char="•"/>
+              <a:defRPr sz="1400" kern="1200">
+                <a:solidFill>
+                  <a:schemeClr val="tx1"/>
+                </a:solidFill>
+                <a:latin typeface="+mn-lt"/>
+                <a:ea typeface="+mn-ea"/>
+                <a:cs typeface="+mn-cs"/>
+              </a:defRPr>
+            </a:lvl8pPr>
+            <a:lvl9pPr marL="3886200" indent="-228600" algn="l" defTabSz="914400" rtl="0" eaLnBrk="1" latinLnBrk="0" hangingPunct="1">
+              <a:lnSpc>
+                <a:spcPct val="120000"/>
+              </a:lnSpc>
+              <a:spcBef>
+                <a:spcPts val="500"/>
+              </a:spcBef>
+              <a:buSzPct val="125000"/>
+              <a:buFont typeface="Arial" panose="020B0604020202020204" pitchFamily="34" charset="0"/>
+              <a:buChar char="•"/>
+              <a:defRPr sz="1400" kern="1200">
+                <a:solidFill>
+                  <a:schemeClr val="tx1"/>
+                </a:solidFill>
+                <a:latin typeface="+mn-lt"/>
+                <a:ea typeface="+mn-ea"/>
+                <a:cs typeface="+mn-cs"/>
+              </a:defRPr>
+            </a:lvl9pPr>
+          </a:lstStyle>
+          <a:p>
+            <a:pPr marL="0" indent="0">
+              <a:buNone/>
+            </a:pPr>
+            <a:r>
+              <a:rPr lang="lv-LV" dirty="0"/>
+              <a:t>3. </a:t>
+            </a:r>
+            <a:r>
+              <a:rPr lang="en-US" dirty="0" err="1"/>
+              <a:t>Lietojam</a:t>
+            </a:r>
+            <a:r>
+              <a:rPr lang="en-US" dirty="0"/>
+              <a:t> </a:t>
+            </a:r>
+            <a:r>
+              <a:rPr lang="en-US" dirty="0" err="1"/>
+              <a:t>loģiskos</a:t>
+            </a:r>
+            <a:r>
+              <a:rPr lang="en-US" dirty="0"/>
+              <a:t> </a:t>
+            </a:r>
+            <a:r>
+              <a:rPr lang="en-US" dirty="0" err="1"/>
+              <a:t>operatorus</a:t>
+            </a:r>
+            <a:r>
+              <a:rPr lang="en-US" dirty="0"/>
+              <a:t> </a:t>
+            </a:r>
+            <a:r>
+              <a:rPr lang="en-US" dirty="0">
+                <a:solidFill>
+                  <a:srgbClr val="FFFF00"/>
+                </a:solidFill>
+              </a:rPr>
+              <a:t>and</a:t>
+            </a:r>
+            <a:r>
+              <a:rPr lang="en-US" dirty="0"/>
+              <a:t>, </a:t>
+            </a:r>
+            <a:r>
+              <a:rPr lang="en-US" dirty="0">
+                <a:solidFill>
+                  <a:srgbClr val="FFFF00"/>
+                </a:solidFill>
+              </a:rPr>
+              <a:t>or</a:t>
+            </a:r>
+            <a:r>
+              <a:rPr lang="en-US" dirty="0"/>
+              <a:t>, un </a:t>
+            </a:r>
+            <a:r>
+              <a:rPr lang="en-US" dirty="0">
+                <a:solidFill>
+                  <a:srgbClr val="FFFF00"/>
+                </a:solidFill>
+              </a:rPr>
+              <a:t>not</a:t>
+            </a:r>
+            <a:r>
+              <a:rPr lang="en-US" dirty="0"/>
+              <a:t>.</a:t>
+            </a:r>
+            <a:endParaRPr lang="lv-LV" dirty="0"/>
+          </a:p>
+        </p:txBody>
+      </p:sp>
+    </p:spTree>
+    <p:extLst>
+      <p:ext uri="{BB962C8B-B14F-4D97-AF65-F5344CB8AC3E}">
+        <p14:creationId xmlns:p14="http://schemas.microsoft.com/office/powerpoint/2010/main" val="3458278161"/>
+      </p:ext>
+    </p:extLst>
+  </p:cSld>
+  <p:clrMapOvr>
+    <a:masterClrMapping/>
+  </p:clrMapOvr>
+  <p:timing>
+    <p:tnLst>
+      <p:par>
+        <p:cTn id="1" dur="indefinite" restart="never" nodeType="tmRoot">
+          <p:childTnLst>
+            <p:seq concurrent="1" nextAc="seek">
+              <p:cTn id="2" dur="indefinite" nodeType="mainSeq">
+                <p:childTnLst>
+                  <p:par>
+                    <p:cTn id="3" fill="hold">
+                      <p:stCondLst>
+                        <p:cond delay="indefinite"/>
+                        <p:cond evt="onBegin" delay="0">
+                          <p:tn val="2"/>
+                        </p:cond>
+                      </p:stCondLst>
+                      <p:childTnLst>
+                        <p:par>
+                          <p:cTn id="4" fill="hold">
+                            <p:stCondLst>
+                              <p:cond delay="0"/>
+                            </p:stCondLst>
+                            <p:childTnLst>
+                              <p:par>
+                                <p:cTn id="5" presetID="10" presetClass="entr" presetSubtype="0" fill="hold" grpId="0" nodeType="withEffect">
+                                  <p:stCondLst>
+                                    <p:cond delay="0"/>
+                                  </p:stCondLst>
+                                  <p:childTnLst>
+                                    <p:set>
+                                      <p:cBhvr>
+                                        <p:cTn id="6" dur="1" fill="hold">
+                                          <p:stCondLst>
+                                            <p:cond delay="0"/>
+                                          </p:stCondLst>
+                                        </p:cTn>
+                                        <p:tgtEl>
+                                          <p:spTgt spid="2"/>
+                                        </p:tgtEl>
+                                        <p:attrNameLst>
+                                          <p:attrName>style.visibility</p:attrName>
+                                        </p:attrNameLst>
+                                      </p:cBhvr>
+                                      <p:to>
+                                        <p:strVal val="visible"/>
+                                      </p:to>
+                                    </p:set>
+                                    <p:animEffect transition="in" filter="fade">
+                                      <p:cBhvr>
+                                        <p:cTn id="7" dur="500"/>
+                                        <p:tgtEl>
+                                          <p:spTgt spid="2"/>
+                                        </p:tgtEl>
+                                      </p:cBhvr>
+                                    </p:animEffect>
+                                  </p:childTnLst>
+                                </p:cTn>
+                              </p:par>
+                            </p:childTnLst>
+                          </p:cTn>
+                        </p:par>
+                      </p:childTnLst>
+                    </p:cTn>
+                  </p:par>
+                  <p:par>
+                    <p:cTn id="8" fill="hold">
+                      <p:stCondLst>
+                        <p:cond delay="indefinite"/>
+                      </p:stCondLst>
+                      <p:childTnLst>
+                        <p:par>
+                          <p:cTn id="9" fill="hold">
+                            <p:stCondLst>
+                              <p:cond delay="0"/>
+                            </p:stCondLst>
+                            <p:childTnLst>
+                              <p:par>
+                                <p:cTn id="10" presetID="10" presetClass="entr" presetSubtype="0" fill="hold" nodeType="clickEffect">
+                                  <p:stCondLst>
+                                    <p:cond delay="0"/>
+                                  </p:stCondLst>
+                                  <p:childTnLst>
+                                    <p:set>
+                                      <p:cBhvr>
+                                        <p:cTn id="11" dur="1" fill="hold">
+                                          <p:stCondLst>
+                                            <p:cond delay="0"/>
+                                          </p:stCondLst>
+                                        </p:cTn>
+                                        <p:tgtEl>
+                                          <p:spTgt spid="4"/>
+                                        </p:tgtEl>
+                                        <p:attrNameLst>
+                                          <p:attrName>style.visibility</p:attrName>
+                                        </p:attrNameLst>
+                                      </p:cBhvr>
+                                      <p:to>
+                                        <p:strVal val="visible"/>
+                                      </p:to>
+                                    </p:set>
+                                    <p:animEffect transition="in" filter="fade">
+                                      <p:cBhvr>
+                                        <p:cTn id="12" dur="500"/>
+                                        <p:tgtEl>
+                                          <p:spTgt spid="4"/>
+                                        </p:tgtEl>
+                                      </p:cBhvr>
+                                    </p:animEffect>
+                                  </p:childTnLst>
+                                </p:cTn>
+                              </p:par>
+                              <p:par>
+                                <p:cTn id="13" presetID="10" presetClass="entr" presetSubtype="0" fill="hold" grpId="0" nodeType="withEffect">
+                                  <p:stCondLst>
+                                    <p:cond delay="0"/>
+                                  </p:stCondLst>
+                                  <p:childTnLst>
+                                    <p:set>
+                                      <p:cBhvr>
+                                        <p:cTn id="14" dur="1" fill="hold">
+                                          <p:stCondLst>
+                                            <p:cond delay="0"/>
+                                          </p:stCondLst>
+                                        </p:cTn>
+                                        <p:tgtEl>
+                                          <p:spTgt spid="3">
+                                            <p:txEl>
+                                              <p:pRg st="0" end="0"/>
+                                            </p:txEl>
+                                          </p:spTgt>
+                                        </p:tgtEl>
+                                        <p:attrNameLst>
+                                          <p:attrName>style.visibility</p:attrName>
+                                        </p:attrNameLst>
+                                      </p:cBhvr>
+                                      <p:to>
+                                        <p:strVal val="visible"/>
+                                      </p:to>
+                                    </p:set>
+                                    <p:animEffect transition="in" filter="fade">
+                                      <p:cBhvr>
+                                        <p:cTn id="15" dur="500"/>
+                                        <p:tgtEl>
+                                          <p:spTgt spid="3">
+                                            <p:txEl>
+                                              <p:pRg st="0" end="0"/>
+                                            </p:txEl>
+                                          </p:spTgt>
+                                        </p:tgtEl>
+                                      </p:cBhvr>
+                                    </p:animEffect>
+                                  </p:childTnLst>
+                                </p:cTn>
+                              </p:par>
+                            </p:childTnLst>
+                          </p:cTn>
+                        </p:par>
+                      </p:childTnLst>
+                    </p:cTn>
+                  </p:par>
+                  <p:par>
+                    <p:cTn id="16" fill="hold">
+                      <p:stCondLst>
+                        <p:cond delay="indefinite"/>
+                      </p:stCondLst>
+                      <p:childTnLst>
+                        <p:par>
+                          <p:cTn id="17" fill="hold">
+                            <p:stCondLst>
+                              <p:cond delay="0"/>
+                            </p:stCondLst>
+                            <p:childTnLst>
+                              <p:par>
+                                <p:cTn id="18" presetID="10" presetClass="exit" presetSubtype="0" fill="hold" grpId="1" nodeType="clickEffect">
+                                  <p:stCondLst>
+                                    <p:cond delay="0"/>
+                                  </p:stCondLst>
+                                  <p:childTnLst>
+                                    <p:animEffect transition="out" filter="fade">
+                                      <p:cBhvr>
+                                        <p:cTn id="19" dur="500"/>
+                                        <p:tgtEl>
+                                          <p:spTgt spid="3">
+                                            <p:txEl>
+                                              <p:pRg st="0" end="0"/>
+                                            </p:txEl>
+                                          </p:spTgt>
+                                        </p:tgtEl>
+                                      </p:cBhvr>
+                                    </p:animEffect>
+                                    <p:set>
+                                      <p:cBhvr>
+                                        <p:cTn id="20" dur="1" fill="hold">
+                                          <p:stCondLst>
+                                            <p:cond delay="499"/>
+                                          </p:stCondLst>
+                                        </p:cTn>
+                                        <p:tgtEl>
+                                          <p:spTgt spid="3">
+                                            <p:txEl>
+                                              <p:pRg st="0" end="0"/>
+                                            </p:txEl>
+                                          </p:spTgt>
+                                        </p:tgtEl>
+                                        <p:attrNameLst>
+                                          <p:attrName>style.visibility</p:attrName>
+                                        </p:attrNameLst>
+                                      </p:cBhvr>
+                                      <p:to>
+                                        <p:strVal val="hidden"/>
+                                      </p:to>
+                                    </p:set>
+                                  </p:childTnLst>
+                                </p:cTn>
+                              </p:par>
+                              <p:par>
+                                <p:cTn id="21" presetID="10" presetClass="entr" presetSubtype="0" fill="hold" grpId="0" nodeType="withEffect">
+                                  <p:stCondLst>
+                                    <p:cond delay="0"/>
+                                  </p:stCondLst>
+                                  <p:childTnLst>
+                                    <p:set>
+                                      <p:cBhvr>
+                                        <p:cTn id="22" dur="1" fill="hold">
+                                          <p:stCondLst>
+                                            <p:cond delay="0"/>
+                                          </p:stCondLst>
+                                        </p:cTn>
+                                        <p:tgtEl>
+                                          <p:spTgt spid="6"/>
+                                        </p:tgtEl>
+                                        <p:attrNameLst>
+                                          <p:attrName>style.visibility</p:attrName>
+                                        </p:attrNameLst>
+                                      </p:cBhvr>
+                                      <p:to>
+                                        <p:strVal val="visible"/>
+                                      </p:to>
+                                    </p:set>
+                                    <p:animEffect transition="in" filter="fade">
+                                      <p:cBhvr>
+                                        <p:cTn id="23" dur="500"/>
+                                        <p:tgtEl>
+                                          <p:spTgt spid="6"/>
+                                        </p:tgtEl>
+                                      </p:cBhvr>
+                                    </p:animEffect>
+                                  </p:childTnLst>
+                                </p:cTn>
+                              </p:par>
+                            </p:childTnLst>
+                          </p:cTn>
+                        </p:par>
+                      </p:childTnLst>
+                    </p:cTn>
+                  </p:par>
+                  <p:par>
+                    <p:cTn id="24" fill="hold">
+                      <p:stCondLst>
+                        <p:cond delay="indefinite"/>
+                      </p:stCondLst>
+                      <p:childTnLst>
+                        <p:par>
+                          <p:cTn id="25" fill="hold">
+                            <p:stCondLst>
+                              <p:cond delay="0"/>
+                            </p:stCondLst>
+                            <p:childTnLst>
+                              <p:par>
+                                <p:cTn id="26" presetID="10" presetClass="exit" presetSubtype="0" fill="hold" grpId="1" nodeType="clickEffect">
+                                  <p:stCondLst>
+                                    <p:cond delay="0"/>
+                                  </p:stCondLst>
+                                  <p:childTnLst>
+                                    <p:animEffect transition="out" filter="fade">
+                                      <p:cBhvr>
+                                        <p:cTn id="27" dur="500"/>
+                                        <p:tgtEl>
+                                          <p:spTgt spid="6"/>
+                                        </p:tgtEl>
+                                      </p:cBhvr>
+                                    </p:animEffect>
+                                    <p:set>
+                                      <p:cBhvr>
+                                        <p:cTn id="28" dur="1" fill="hold">
+                                          <p:stCondLst>
+                                            <p:cond delay="499"/>
+                                          </p:stCondLst>
+                                        </p:cTn>
+                                        <p:tgtEl>
+                                          <p:spTgt spid="6"/>
+                                        </p:tgtEl>
+                                        <p:attrNameLst>
+                                          <p:attrName>style.visibility</p:attrName>
+                                        </p:attrNameLst>
+                                      </p:cBhvr>
+                                      <p:to>
+                                        <p:strVal val="hidden"/>
+                                      </p:to>
+                                    </p:set>
+                                  </p:childTnLst>
+                                </p:cTn>
+                              </p:par>
+                              <p:par>
+                                <p:cTn id="29" presetID="10" presetClass="entr" presetSubtype="0" fill="hold" nodeType="withEffect">
+                                  <p:stCondLst>
+                                    <p:cond delay="0"/>
+                                  </p:stCondLst>
+                                  <p:childTnLst>
+                                    <p:set>
+                                      <p:cBhvr>
+                                        <p:cTn id="30" dur="1" fill="hold">
+                                          <p:stCondLst>
+                                            <p:cond delay="0"/>
+                                          </p:stCondLst>
+                                        </p:cTn>
+                                        <p:tgtEl>
+                                          <p:spTgt spid="13">
+                                            <p:txEl>
+                                              <p:pRg st="0" end="0"/>
+                                            </p:txEl>
+                                          </p:spTgt>
+                                        </p:tgtEl>
+                                        <p:attrNameLst>
+                                          <p:attrName>style.visibility</p:attrName>
+                                        </p:attrNameLst>
+                                      </p:cBhvr>
+                                      <p:to>
+                                        <p:strVal val="visible"/>
+                                      </p:to>
+                                    </p:set>
+                                    <p:animEffect transition="in" filter="fade">
+                                      <p:cBhvr>
+                                        <p:cTn id="31" dur="500"/>
+                                        <p:tgtEl>
+                                          <p:spTgt spid="13">
+                                            <p:txEl>
+                                              <p:pRg st="0" end="0"/>
+                                            </p:txEl>
+                                          </p:spTgt>
+                                        </p:tgtEl>
+                                      </p:cBhvr>
+                                    </p:animEffect>
+                                  </p:childTnLst>
+                                </p:cTn>
+                              </p:par>
+                            </p:childTnLst>
+                          </p:cTn>
+                        </p:par>
+                      </p:childTnLst>
+                    </p:cTn>
+                  </p:par>
+                  <p:par>
+                    <p:cTn id="32" fill="hold">
+                      <p:stCondLst>
+                        <p:cond delay="indefinite"/>
+                      </p:stCondLst>
+                      <p:childTnLst>
+                        <p:par>
+                          <p:cTn id="33" fill="hold">
+                            <p:stCondLst>
+                              <p:cond delay="0"/>
+                            </p:stCondLst>
+                            <p:childTnLst>
+                              <p:par>
+                                <p:cTn id="34" presetID="10" presetClass="exit" presetSubtype="0" fill="hold" grpId="0" nodeType="clickEffect">
+                                  <p:stCondLst>
+                                    <p:cond delay="0"/>
+                                  </p:stCondLst>
+                                  <p:childTnLst>
+                                    <p:animEffect transition="out" filter="fade">
+                                      <p:cBhvr>
+                                        <p:cTn id="35" dur="500"/>
+                                        <p:tgtEl>
+                                          <p:spTgt spid="13">
+                                            <p:txEl>
+                                              <p:pRg st="0" end="0"/>
+                                            </p:txEl>
+                                          </p:spTgt>
+                                        </p:tgtEl>
+                                      </p:cBhvr>
+                                    </p:animEffect>
+                                    <p:set>
+                                      <p:cBhvr>
+                                        <p:cTn id="36" dur="1" fill="hold">
+                                          <p:stCondLst>
+                                            <p:cond delay="499"/>
+                                          </p:stCondLst>
+                                        </p:cTn>
+                                        <p:tgtEl>
+                                          <p:spTgt spid="13">
+                                            <p:txEl>
+                                              <p:pRg st="0" end="0"/>
+                                            </p:txEl>
+                                          </p:spTgt>
+                                        </p:tgtEl>
+                                        <p:attrNameLst>
+                                          <p:attrName>style.visibility</p:attrName>
+                                        </p:attrNameLst>
+                                      </p:cBhvr>
+                                      <p:to>
+                                        <p:strVal val="hidden"/>
+                                      </p:to>
+                                    </p:set>
+                                  </p:childTnLst>
+                                </p:cTn>
+                              </p:par>
+                              <p:par>
+                                <p:cTn id="37" presetID="10" presetClass="entr" presetSubtype="0" fill="hold" grpId="0" nodeType="withEffect">
+                                  <p:stCondLst>
+                                    <p:cond delay="0"/>
+                                  </p:stCondLst>
+                                  <p:childTnLst>
+                                    <p:set>
+                                      <p:cBhvr>
+                                        <p:cTn id="38" dur="1" fill="hold">
+                                          <p:stCondLst>
+                                            <p:cond delay="0"/>
+                                          </p:stCondLst>
+                                        </p:cTn>
+                                        <p:tgtEl>
+                                          <p:spTgt spid="11"/>
+                                        </p:tgtEl>
+                                        <p:attrNameLst>
+                                          <p:attrName>style.visibility</p:attrName>
+                                        </p:attrNameLst>
+                                      </p:cBhvr>
+                                      <p:to>
+                                        <p:strVal val="visible"/>
+                                      </p:to>
+                                    </p:set>
+                                    <p:animEffect transition="in" filter="fade">
+                                      <p:cBhvr>
+                                        <p:cTn id="39" dur="500"/>
+                                        <p:tgtEl>
+                                          <p:spTgt spid="11"/>
+                                        </p:tgtEl>
+                                      </p:cBhvr>
+                                    </p:animEffect>
+                                  </p:childTnLst>
+                                </p:cTn>
+                              </p:par>
+                            </p:childTnLst>
+                          </p:cTn>
+                        </p:par>
+                      </p:childTnLst>
+                    </p:cTn>
+                  </p:par>
+                </p:childTnLst>
+              </p:cTn>
+              <p:prevCondLst>
+                <p:cond evt="onPrev" delay="0">
+                  <p:tgtEl>
+                    <p:sldTgt/>
+                  </p:tgtEl>
+                </p:cond>
+              </p:prevCondLst>
+              <p:nextCondLst>
+                <p:cond evt="onNext" delay="0">
+                  <p:tgtEl>
+                    <p:sldTgt/>
+                  </p:tgtEl>
+                </p:cond>
+              </p:nextCondLst>
+            </p:seq>
+          </p:childTnLst>
+        </p:cTn>
+      </p:par>
+    </p:tnLst>
+    <p:bldLst>
+      <p:bldP spid="2" grpId="0"/>
+      <p:bldP spid="3" grpId="0" build="p"/>
+      <p:bldP spid="3" grpId="1" build="p"/>
+      <p:bldP spid="6" grpId="0"/>
+      <p:bldP spid="6" grpId="1"/>
+      <p:bldP spid="11" grpId="0"/>
+      <p:bldP spid="13" grpId="0" build="allAtOnce"/>
+    </p:bldLst>
+  </p:timing>
+</p:sld>
+</file>
+
+<file path=ppt/slides/slide16.xml><?xml version="1.0" encoding="utf-8"?>
+<p:sld xmlns:a="http://schemas.openxmlformats.org/drawingml/2006/main" xmlns:r="http://schemas.openxmlformats.org/officeDocument/2006/relationships" xmlns:p="http://schemas.openxmlformats.org/presentationml/2006/main">
+  <p:cSld>
+    <p:spTree>
+      <p:nvGrpSpPr>
+        <p:cNvPr id="1" name=""/>
+        <p:cNvGrpSpPr/>
+        <p:nvPr/>
+      </p:nvGrpSpPr>
+      <p:grpSpPr>
+        <a:xfrm>
+          <a:off x="0" y="0"/>
+          <a:ext cx="0" cy="0"/>
+          <a:chOff x="0" y="0"/>
+          <a:chExt cx="0" cy="0"/>
+        </a:xfrm>
+      </p:grpSpPr>
+      <p:sp>
+        <p:nvSpPr>
+          <p:cNvPr id="2" name="Title 1">
+            <a:extLst>
+              <a:ext uri="{FF2B5EF4-FFF2-40B4-BE49-F238E27FC236}">
+                <a16:creationId xmlns:a16="http://schemas.microsoft.com/office/drawing/2014/main" id="{9D016A6D-55FF-4CAD-953C-C130EE379103}"/>
+              </a:ext>
+            </a:extLst>
+          </p:cNvPr>
+          <p:cNvSpPr>
+            <a:spLocks noGrp="1"/>
+          </p:cNvSpPr>
+          <p:nvPr>
+            <p:ph type="title"/>
+          </p:nvPr>
+        </p:nvSpPr>
+        <p:spPr/>
+        <p:txBody>
+          <a:bodyPr/>
+          <a:lstStyle/>
+          <a:p>
+            <a:endParaRPr lang="lv-LV"/>
+          </a:p>
+        </p:txBody>
+      </p:sp>
+      <p:sp>
+        <p:nvSpPr>
+          <p:cNvPr id="3" name="Content Placeholder 2">
+            <a:extLst>
+              <a:ext uri="{FF2B5EF4-FFF2-40B4-BE49-F238E27FC236}">
+                <a16:creationId xmlns:a16="http://schemas.microsoft.com/office/drawing/2014/main" id="{2552BDE4-F70C-4629-A6D7-35CC44570241}"/>
+              </a:ext>
+            </a:extLst>
+          </p:cNvPr>
+          <p:cNvSpPr>
+            <a:spLocks noGrp="1"/>
+          </p:cNvSpPr>
+          <p:nvPr>
+            <p:ph idx="1"/>
+          </p:nvPr>
+        </p:nvSpPr>
+        <p:spPr/>
+        <p:txBody>
+          <a:bodyPr/>
+          <a:lstStyle/>
+          <a:p>
+            <a:endParaRPr lang="lv-LV"/>
+          </a:p>
+        </p:txBody>
+      </p:sp>
+    </p:spTree>
+    <p:extLst>
+      <p:ext uri="{BB962C8B-B14F-4D97-AF65-F5344CB8AC3E}">
+        <p14:creationId xmlns:p14="http://schemas.microsoft.com/office/powerpoint/2010/main" val="4169351868"/>
+      </p:ext>
+    </p:extLst>
+  </p:cSld>
+  <p:clrMapOvr>
+    <a:masterClrMapping/>
+  </p:clrMapOvr>
+</p:sld>
+</file>
+
+<file path=ppt/slides/slide17.xml><?xml version="1.0" encoding="utf-8"?>
+<p:sld xmlns:a="http://schemas.openxmlformats.org/drawingml/2006/main" xmlns:r="http://schemas.openxmlformats.org/officeDocument/2006/relationships" xmlns:p="http://schemas.openxmlformats.org/presentationml/2006/main">
+  <p:cSld>
+    <p:spTree>
+      <p:nvGrpSpPr>
+        <p:cNvPr id="1" name=""/>
+        <p:cNvGrpSpPr/>
+        <p:nvPr/>
+      </p:nvGrpSpPr>
+      <p:grpSpPr>
+        <a:xfrm>
+          <a:off x="0" y="0"/>
+          <a:ext cx="0" cy="0"/>
+          <a:chOff x="0" y="0"/>
+          <a:chExt cx="0" cy="0"/>
+        </a:xfrm>
+      </p:grpSpPr>
+      <p:sp>
+        <p:nvSpPr>
+          <p:cNvPr id="2" name="Title 1">
+            <a:extLst>
+              <a:ext uri="{FF2B5EF4-FFF2-40B4-BE49-F238E27FC236}">
                 <a16:creationId xmlns:a16="http://schemas.microsoft.com/office/drawing/2014/main" id="{B50330EF-B5EC-46E4-B867-D3E24A6E239D}"/>
               </a:ext>
             </a:extLst>
@@ -18610,7 +20018,7 @@
 </p:sld>
 </file>
 
-<file path=ppt/slides/slide16.xml><?xml version="1.0" encoding="utf-8"?>
+<file path=ppt/slides/slide18.xml><?xml version="1.0" encoding="utf-8"?>
 <p:sld xmlns:a="http://schemas.openxmlformats.org/drawingml/2006/main" xmlns:r="http://schemas.openxmlformats.org/officeDocument/2006/relationships" xmlns:p="http://schemas.openxmlformats.org/presentationml/2006/main">
   <p:cSld>
     <p:spTree>
@@ -19433,7 +20841,7 @@
 </p:sld>
 </file>
 
-<file path=ppt/slides/slide17.xml><?xml version="1.0" encoding="utf-8"?>
+<file path=ppt/slides/slide19.xml><?xml version="1.0" encoding="utf-8"?>
 <p:sld xmlns:a="http://schemas.openxmlformats.org/drawingml/2006/main" xmlns:r="http://schemas.openxmlformats.org/officeDocument/2006/relationships" xmlns:p="http://schemas.openxmlformats.org/presentationml/2006/main">
   <p:cSld>
     <p:spTree>

</xml_diff>

<commit_message>
Mācību materiālā izveidots 3. uzdevuma slaids, kopsavilkuma slaids, mainīgo definēšanas slaidā pielikti attēli.
</commit_message>
<xml_diff>
--- a/Mainigie_DatuTipi_macibu_materials.pptx
+++ b/Mainigie_DatuTipi_macibu_materials.pptx
@@ -21,9 +21,10 @@
     <p:sldId id="269" r:id="rId15"/>
     <p:sldId id="273" r:id="rId16"/>
     <p:sldId id="274" r:id="rId17"/>
-    <p:sldId id="270" r:id="rId18"/>
-    <p:sldId id="272" r:id="rId19"/>
-    <p:sldId id="264" r:id="rId20"/>
+    <p:sldId id="275" r:id="rId18"/>
+    <p:sldId id="270" r:id="rId19"/>
+    <p:sldId id="272" r:id="rId20"/>
+    <p:sldId id="264" r:id="rId21"/>
   </p:sldIdLst>
   <p:sldSz cx="12192000" cy="6858000"/>
   <p:notesSz cx="6858000" cy="9144000"/>
@@ -19197,12 +19198,20 @@
             <p:ph type="title"/>
           </p:nvPr>
         </p:nvSpPr>
-        <p:spPr/>
+        <p:spPr>
+          <a:xfrm>
+            <a:off x="1143000" y="218657"/>
+            <a:ext cx="9905998" cy="1478570"/>
+          </a:xfrm>
+        </p:spPr>
         <p:txBody>
           <a:bodyPr/>
           <a:lstStyle/>
           <a:p>
-            <a:endParaRPr lang="lv-LV"/>
+            <a:r>
+              <a:rPr lang="lv-LV" dirty="0"/>
+              <a:t>Uzdevums 3: Lietotāja ievade un tipu pārveidošana</a:t>
+            </a:r>
           </a:p>
         </p:txBody>
       </p:sp>
@@ -19222,12 +19231,939 @@
             <p:ph idx="1"/>
           </p:nvPr>
         </p:nvSpPr>
-        <p:spPr/>
+        <p:spPr>
+          <a:xfrm>
+            <a:off x="1720990" y="5511310"/>
+            <a:ext cx="9905999" cy="1164771"/>
+          </a:xfrm>
+        </p:spPr>
         <p:txBody>
           <a:bodyPr/>
           <a:lstStyle/>
           <a:p>
-            <a:endParaRPr lang="lv-LV"/>
+            <a:pPr marL="0" indent="0">
+              <a:buNone/>
+            </a:pPr>
+            <a:r>
+              <a:rPr lang="lv-LV" dirty="0"/>
+              <a:t>1. Ar atslēgvārdu </a:t>
+            </a:r>
+            <a:r>
+              <a:rPr lang="lv-LV" dirty="0">
+                <a:solidFill>
+                  <a:srgbClr val="FFFF00"/>
+                </a:solidFill>
+              </a:rPr>
+              <a:t>input</a:t>
+            </a:r>
+            <a:r>
+              <a:rPr lang="lv-LV" dirty="0"/>
+              <a:t>, pieprasam lietotājam ievadīt veselā tipa skaitli.</a:t>
+            </a:r>
+          </a:p>
+          <a:p>
+            <a:pPr marL="0" indent="0">
+              <a:buNone/>
+            </a:pPr>
+            <a:endParaRPr lang="lv-LV" dirty="0"/>
+          </a:p>
+        </p:txBody>
+      </p:sp>
+      <p:pic>
+        <p:nvPicPr>
+          <p:cNvPr id="6" name="Picture 5">
+            <a:extLst>
+              <a:ext uri="{FF2B5EF4-FFF2-40B4-BE49-F238E27FC236}">
+                <a16:creationId xmlns:a16="http://schemas.microsoft.com/office/drawing/2014/main" id="{6B83A6BF-CF01-45F2-87BC-8A85AFF42E71}"/>
+              </a:ext>
+            </a:extLst>
+          </p:cNvPr>
+          <p:cNvPicPr>
+            <a:picLocks noChangeAspect="1"/>
+          </p:cNvPicPr>
+          <p:nvPr/>
+        </p:nvPicPr>
+        <p:blipFill>
+          <a:blip r:embed="rId2"/>
+          <a:stretch>
+            <a:fillRect/>
+          </a:stretch>
+        </p:blipFill>
+        <p:spPr>
+          <a:xfrm>
+            <a:off x="726053" y="1556173"/>
+            <a:ext cx="11014133" cy="3745654"/>
+          </a:xfrm>
+          <a:prstGeom prst="rect">
+            <a:avLst/>
+          </a:prstGeom>
+        </p:spPr>
+      </p:pic>
+      <p:sp>
+        <p:nvSpPr>
+          <p:cNvPr id="7" name="Content Placeholder 2">
+            <a:extLst>
+              <a:ext uri="{FF2B5EF4-FFF2-40B4-BE49-F238E27FC236}">
+                <a16:creationId xmlns:a16="http://schemas.microsoft.com/office/drawing/2014/main" id="{8F87D9F9-1B35-49BF-A924-12E59CFC1C10}"/>
+              </a:ext>
+            </a:extLst>
+          </p:cNvPr>
+          <p:cNvSpPr txBox="1">
+            <a:spLocks/>
+          </p:cNvSpPr>
+          <p:nvPr/>
+        </p:nvSpPr>
+        <p:spPr>
+          <a:xfrm>
+            <a:off x="3587890" y="5511310"/>
+            <a:ext cx="9905999" cy="1164771"/>
+          </a:xfrm>
+          <a:prstGeom prst="rect">
+            <a:avLst/>
+          </a:prstGeom>
+        </p:spPr>
+        <p:txBody>
+          <a:bodyPr vert="horz" lIns="91440" tIns="45720" rIns="91440" bIns="45720" rtlCol="0">
+            <a:normAutofit/>
+          </a:bodyPr>
+          <a:lstStyle>
+            <a:lvl1pPr marL="228600" indent="-228600" algn="l" defTabSz="914400" rtl="0" eaLnBrk="1" latinLnBrk="0" hangingPunct="1">
+              <a:lnSpc>
+                <a:spcPct val="120000"/>
+              </a:lnSpc>
+              <a:spcBef>
+                <a:spcPts val="1000"/>
+              </a:spcBef>
+              <a:buSzPct val="125000"/>
+              <a:buFont typeface="Arial" panose="020B0604020202020204" pitchFamily="34" charset="0"/>
+              <a:buChar char="•"/>
+              <a:defRPr sz="2400" kern="1200">
+                <a:solidFill>
+                  <a:schemeClr val="tx1"/>
+                </a:solidFill>
+                <a:latin typeface="+mn-lt"/>
+                <a:ea typeface="+mn-ea"/>
+                <a:cs typeface="+mn-cs"/>
+              </a:defRPr>
+            </a:lvl1pPr>
+            <a:lvl2pPr marL="685800" indent="-228600" algn="l" defTabSz="914400" rtl="0" eaLnBrk="1" latinLnBrk="0" hangingPunct="1">
+              <a:lnSpc>
+                <a:spcPct val="120000"/>
+              </a:lnSpc>
+              <a:spcBef>
+                <a:spcPts val="500"/>
+              </a:spcBef>
+              <a:buSzPct val="125000"/>
+              <a:buFont typeface="Arial" panose="020B0604020202020204" pitchFamily="34" charset="0"/>
+              <a:buChar char="•"/>
+              <a:defRPr sz="2000" kern="1200">
+                <a:solidFill>
+                  <a:schemeClr val="tx1"/>
+                </a:solidFill>
+                <a:latin typeface="+mn-lt"/>
+                <a:ea typeface="+mn-ea"/>
+                <a:cs typeface="+mn-cs"/>
+              </a:defRPr>
+            </a:lvl2pPr>
+            <a:lvl3pPr marL="1143000" indent="-228600" algn="l" defTabSz="914400" rtl="0" eaLnBrk="1" latinLnBrk="0" hangingPunct="1">
+              <a:lnSpc>
+                <a:spcPct val="120000"/>
+              </a:lnSpc>
+              <a:spcBef>
+                <a:spcPts val="500"/>
+              </a:spcBef>
+              <a:buSzPct val="125000"/>
+              <a:buFont typeface="Arial" panose="020B0604020202020204" pitchFamily="34" charset="0"/>
+              <a:buChar char="•"/>
+              <a:defRPr sz="1800" kern="1200">
+                <a:solidFill>
+                  <a:schemeClr val="tx1"/>
+                </a:solidFill>
+                <a:latin typeface="+mn-lt"/>
+                <a:ea typeface="+mn-ea"/>
+                <a:cs typeface="+mn-cs"/>
+              </a:defRPr>
+            </a:lvl3pPr>
+            <a:lvl4pPr marL="1600200" indent="-228600" algn="l" defTabSz="914400" rtl="0" eaLnBrk="1" latinLnBrk="0" hangingPunct="1">
+              <a:lnSpc>
+                <a:spcPct val="120000"/>
+              </a:lnSpc>
+              <a:spcBef>
+                <a:spcPts val="500"/>
+              </a:spcBef>
+              <a:buSzPct val="125000"/>
+              <a:buFont typeface="Arial" panose="020B0604020202020204" pitchFamily="34" charset="0"/>
+              <a:buChar char="•"/>
+              <a:defRPr sz="1600" kern="1200">
+                <a:solidFill>
+                  <a:schemeClr val="tx1"/>
+                </a:solidFill>
+                <a:latin typeface="+mn-lt"/>
+                <a:ea typeface="+mn-ea"/>
+                <a:cs typeface="+mn-cs"/>
+              </a:defRPr>
+            </a:lvl4pPr>
+            <a:lvl5pPr marL="2057400" indent="-228600" algn="l" defTabSz="914400" rtl="0" eaLnBrk="1" latinLnBrk="0" hangingPunct="1">
+              <a:lnSpc>
+                <a:spcPct val="120000"/>
+              </a:lnSpc>
+              <a:spcBef>
+                <a:spcPts val="500"/>
+              </a:spcBef>
+              <a:buSzPct val="125000"/>
+              <a:buFont typeface="Arial" panose="020B0604020202020204" pitchFamily="34" charset="0"/>
+              <a:buChar char="•"/>
+              <a:defRPr sz="1600" kern="1200">
+                <a:solidFill>
+                  <a:schemeClr val="tx1"/>
+                </a:solidFill>
+                <a:latin typeface="+mn-lt"/>
+                <a:ea typeface="+mn-ea"/>
+                <a:cs typeface="+mn-cs"/>
+              </a:defRPr>
+            </a:lvl5pPr>
+            <a:lvl6pPr marL="2514600" indent="-228600" algn="l" defTabSz="914400" rtl="0" eaLnBrk="1" latinLnBrk="0" hangingPunct="1">
+              <a:lnSpc>
+                <a:spcPct val="120000"/>
+              </a:lnSpc>
+              <a:spcBef>
+                <a:spcPts val="500"/>
+              </a:spcBef>
+              <a:buSzPct val="125000"/>
+              <a:buFont typeface="Arial" panose="020B0604020202020204" pitchFamily="34" charset="0"/>
+              <a:buChar char="•"/>
+              <a:defRPr sz="1400" kern="1200">
+                <a:solidFill>
+                  <a:schemeClr val="tx1"/>
+                </a:solidFill>
+                <a:latin typeface="+mn-lt"/>
+                <a:ea typeface="+mn-ea"/>
+                <a:cs typeface="+mn-cs"/>
+              </a:defRPr>
+            </a:lvl6pPr>
+            <a:lvl7pPr marL="2971800" indent="-228600" algn="l" defTabSz="914400" rtl="0" eaLnBrk="1" latinLnBrk="0" hangingPunct="1">
+              <a:lnSpc>
+                <a:spcPct val="120000"/>
+              </a:lnSpc>
+              <a:spcBef>
+                <a:spcPts val="500"/>
+              </a:spcBef>
+              <a:buSzPct val="125000"/>
+              <a:buFont typeface="Arial" panose="020B0604020202020204" pitchFamily="34" charset="0"/>
+              <a:buChar char="•"/>
+              <a:defRPr sz="1400" kern="1200">
+                <a:solidFill>
+                  <a:schemeClr val="tx1"/>
+                </a:solidFill>
+                <a:latin typeface="+mn-lt"/>
+                <a:ea typeface="+mn-ea"/>
+                <a:cs typeface="+mn-cs"/>
+              </a:defRPr>
+            </a:lvl7pPr>
+            <a:lvl8pPr marL="3429000" indent="-228600" algn="l" defTabSz="914400" rtl="0" eaLnBrk="1" latinLnBrk="0" hangingPunct="1">
+              <a:lnSpc>
+                <a:spcPct val="120000"/>
+              </a:lnSpc>
+              <a:spcBef>
+                <a:spcPts val="500"/>
+              </a:spcBef>
+              <a:buSzPct val="125000"/>
+              <a:buFont typeface="Arial" panose="020B0604020202020204" pitchFamily="34" charset="0"/>
+              <a:buChar char="•"/>
+              <a:defRPr sz="1400" kern="1200">
+                <a:solidFill>
+                  <a:schemeClr val="tx1"/>
+                </a:solidFill>
+                <a:latin typeface="+mn-lt"/>
+                <a:ea typeface="+mn-ea"/>
+                <a:cs typeface="+mn-cs"/>
+              </a:defRPr>
+            </a:lvl8pPr>
+            <a:lvl9pPr marL="3886200" indent="-228600" algn="l" defTabSz="914400" rtl="0" eaLnBrk="1" latinLnBrk="0" hangingPunct="1">
+              <a:lnSpc>
+                <a:spcPct val="120000"/>
+              </a:lnSpc>
+              <a:spcBef>
+                <a:spcPts val="500"/>
+              </a:spcBef>
+              <a:buSzPct val="125000"/>
+              <a:buFont typeface="Arial" panose="020B0604020202020204" pitchFamily="34" charset="0"/>
+              <a:buChar char="•"/>
+              <a:defRPr sz="1400" kern="1200">
+                <a:solidFill>
+                  <a:schemeClr val="tx1"/>
+                </a:solidFill>
+                <a:latin typeface="+mn-lt"/>
+                <a:ea typeface="+mn-ea"/>
+                <a:cs typeface="+mn-cs"/>
+              </a:defRPr>
+            </a:lvl9pPr>
+          </a:lstStyle>
+          <a:p>
+            <a:pPr marL="0" indent="0">
+              <a:buNone/>
+            </a:pPr>
+            <a:r>
+              <a:rPr lang="lv-LV" dirty="0"/>
+              <a:t>2. Mēģinām pārveidot ievadi no </a:t>
+            </a:r>
+            <a:r>
+              <a:rPr lang="lv-LV" dirty="0">
+                <a:solidFill>
+                  <a:schemeClr val="tx2"/>
+                </a:solidFill>
+              </a:rPr>
+              <a:t>str</a:t>
+            </a:r>
+            <a:r>
+              <a:rPr lang="lv-LV" dirty="0"/>
+              <a:t> uz </a:t>
+            </a:r>
+            <a:r>
+              <a:rPr lang="lv-LV" dirty="0">
+                <a:solidFill>
+                  <a:schemeClr val="tx2"/>
+                </a:solidFill>
+              </a:rPr>
+              <a:t>int</a:t>
+            </a:r>
+            <a:r>
+              <a:rPr lang="lv-LV" dirty="0"/>
+              <a:t>.</a:t>
+            </a:r>
+          </a:p>
+        </p:txBody>
+      </p:sp>
+      <p:sp>
+        <p:nvSpPr>
+          <p:cNvPr id="8" name="Content Placeholder 2">
+            <a:extLst>
+              <a:ext uri="{FF2B5EF4-FFF2-40B4-BE49-F238E27FC236}">
+                <a16:creationId xmlns:a16="http://schemas.microsoft.com/office/drawing/2014/main" id="{9F9C25B3-BD90-40DD-A59D-214996244B32}"/>
+              </a:ext>
+            </a:extLst>
+          </p:cNvPr>
+          <p:cNvSpPr txBox="1">
+            <a:spLocks/>
+          </p:cNvSpPr>
+          <p:nvPr/>
+        </p:nvSpPr>
+        <p:spPr>
+          <a:xfrm>
+            <a:off x="1639347" y="5511309"/>
+            <a:ext cx="9905999" cy="1164771"/>
+          </a:xfrm>
+          <a:prstGeom prst="rect">
+            <a:avLst/>
+          </a:prstGeom>
+        </p:spPr>
+        <p:txBody>
+          <a:bodyPr vert="horz" lIns="91440" tIns="45720" rIns="91440" bIns="45720" rtlCol="0">
+            <a:normAutofit/>
+          </a:bodyPr>
+          <a:lstStyle>
+            <a:lvl1pPr marL="228600" indent="-228600" algn="l" defTabSz="914400" rtl="0" eaLnBrk="1" latinLnBrk="0" hangingPunct="1">
+              <a:lnSpc>
+                <a:spcPct val="120000"/>
+              </a:lnSpc>
+              <a:spcBef>
+                <a:spcPts val="1000"/>
+              </a:spcBef>
+              <a:buSzPct val="125000"/>
+              <a:buFont typeface="Arial" panose="020B0604020202020204" pitchFamily="34" charset="0"/>
+              <a:buChar char="•"/>
+              <a:defRPr sz="2400" kern="1200">
+                <a:solidFill>
+                  <a:schemeClr val="tx1"/>
+                </a:solidFill>
+                <a:latin typeface="+mn-lt"/>
+                <a:ea typeface="+mn-ea"/>
+                <a:cs typeface="+mn-cs"/>
+              </a:defRPr>
+            </a:lvl1pPr>
+            <a:lvl2pPr marL="685800" indent="-228600" algn="l" defTabSz="914400" rtl="0" eaLnBrk="1" latinLnBrk="0" hangingPunct="1">
+              <a:lnSpc>
+                <a:spcPct val="120000"/>
+              </a:lnSpc>
+              <a:spcBef>
+                <a:spcPts val="500"/>
+              </a:spcBef>
+              <a:buSzPct val="125000"/>
+              <a:buFont typeface="Arial" panose="020B0604020202020204" pitchFamily="34" charset="0"/>
+              <a:buChar char="•"/>
+              <a:defRPr sz="2000" kern="1200">
+                <a:solidFill>
+                  <a:schemeClr val="tx1"/>
+                </a:solidFill>
+                <a:latin typeface="+mn-lt"/>
+                <a:ea typeface="+mn-ea"/>
+                <a:cs typeface="+mn-cs"/>
+              </a:defRPr>
+            </a:lvl2pPr>
+            <a:lvl3pPr marL="1143000" indent="-228600" algn="l" defTabSz="914400" rtl="0" eaLnBrk="1" latinLnBrk="0" hangingPunct="1">
+              <a:lnSpc>
+                <a:spcPct val="120000"/>
+              </a:lnSpc>
+              <a:spcBef>
+                <a:spcPts val="500"/>
+              </a:spcBef>
+              <a:buSzPct val="125000"/>
+              <a:buFont typeface="Arial" panose="020B0604020202020204" pitchFamily="34" charset="0"/>
+              <a:buChar char="•"/>
+              <a:defRPr sz="1800" kern="1200">
+                <a:solidFill>
+                  <a:schemeClr val="tx1"/>
+                </a:solidFill>
+                <a:latin typeface="+mn-lt"/>
+                <a:ea typeface="+mn-ea"/>
+                <a:cs typeface="+mn-cs"/>
+              </a:defRPr>
+            </a:lvl3pPr>
+            <a:lvl4pPr marL="1600200" indent="-228600" algn="l" defTabSz="914400" rtl="0" eaLnBrk="1" latinLnBrk="0" hangingPunct="1">
+              <a:lnSpc>
+                <a:spcPct val="120000"/>
+              </a:lnSpc>
+              <a:spcBef>
+                <a:spcPts val="500"/>
+              </a:spcBef>
+              <a:buSzPct val="125000"/>
+              <a:buFont typeface="Arial" panose="020B0604020202020204" pitchFamily="34" charset="0"/>
+              <a:buChar char="•"/>
+              <a:defRPr sz="1600" kern="1200">
+                <a:solidFill>
+                  <a:schemeClr val="tx1"/>
+                </a:solidFill>
+                <a:latin typeface="+mn-lt"/>
+                <a:ea typeface="+mn-ea"/>
+                <a:cs typeface="+mn-cs"/>
+              </a:defRPr>
+            </a:lvl4pPr>
+            <a:lvl5pPr marL="2057400" indent="-228600" algn="l" defTabSz="914400" rtl="0" eaLnBrk="1" latinLnBrk="0" hangingPunct="1">
+              <a:lnSpc>
+                <a:spcPct val="120000"/>
+              </a:lnSpc>
+              <a:spcBef>
+                <a:spcPts val="500"/>
+              </a:spcBef>
+              <a:buSzPct val="125000"/>
+              <a:buFont typeface="Arial" panose="020B0604020202020204" pitchFamily="34" charset="0"/>
+              <a:buChar char="•"/>
+              <a:defRPr sz="1600" kern="1200">
+                <a:solidFill>
+                  <a:schemeClr val="tx1"/>
+                </a:solidFill>
+                <a:latin typeface="+mn-lt"/>
+                <a:ea typeface="+mn-ea"/>
+                <a:cs typeface="+mn-cs"/>
+              </a:defRPr>
+            </a:lvl5pPr>
+            <a:lvl6pPr marL="2514600" indent="-228600" algn="l" defTabSz="914400" rtl="0" eaLnBrk="1" latinLnBrk="0" hangingPunct="1">
+              <a:lnSpc>
+                <a:spcPct val="120000"/>
+              </a:lnSpc>
+              <a:spcBef>
+                <a:spcPts val="500"/>
+              </a:spcBef>
+              <a:buSzPct val="125000"/>
+              <a:buFont typeface="Arial" panose="020B0604020202020204" pitchFamily="34" charset="0"/>
+              <a:buChar char="•"/>
+              <a:defRPr sz="1400" kern="1200">
+                <a:solidFill>
+                  <a:schemeClr val="tx1"/>
+                </a:solidFill>
+                <a:latin typeface="+mn-lt"/>
+                <a:ea typeface="+mn-ea"/>
+                <a:cs typeface="+mn-cs"/>
+              </a:defRPr>
+            </a:lvl6pPr>
+            <a:lvl7pPr marL="2971800" indent="-228600" algn="l" defTabSz="914400" rtl="0" eaLnBrk="1" latinLnBrk="0" hangingPunct="1">
+              <a:lnSpc>
+                <a:spcPct val="120000"/>
+              </a:lnSpc>
+              <a:spcBef>
+                <a:spcPts val="500"/>
+              </a:spcBef>
+              <a:buSzPct val="125000"/>
+              <a:buFont typeface="Arial" panose="020B0604020202020204" pitchFamily="34" charset="0"/>
+              <a:buChar char="•"/>
+              <a:defRPr sz="1400" kern="1200">
+                <a:solidFill>
+                  <a:schemeClr val="tx1"/>
+                </a:solidFill>
+                <a:latin typeface="+mn-lt"/>
+                <a:ea typeface="+mn-ea"/>
+                <a:cs typeface="+mn-cs"/>
+              </a:defRPr>
+            </a:lvl7pPr>
+            <a:lvl8pPr marL="3429000" indent="-228600" algn="l" defTabSz="914400" rtl="0" eaLnBrk="1" latinLnBrk="0" hangingPunct="1">
+              <a:lnSpc>
+                <a:spcPct val="120000"/>
+              </a:lnSpc>
+              <a:spcBef>
+                <a:spcPts val="500"/>
+              </a:spcBef>
+              <a:buSzPct val="125000"/>
+              <a:buFont typeface="Arial" panose="020B0604020202020204" pitchFamily="34" charset="0"/>
+              <a:buChar char="•"/>
+              <a:defRPr sz="1400" kern="1200">
+                <a:solidFill>
+                  <a:schemeClr val="tx1"/>
+                </a:solidFill>
+                <a:latin typeface="+mn-lt"/>
+                <a:ea typeface="+mn-ea"/>
+                <a:cs typeface="+mn-cs"/>
+              </a:defRPr>
+            </a:lvl8pPr>
+            <a:lvl9pPr marL="3886200" indent="-228600" algn="l" defTabSz="914400" rtl="0" eaLnBrk="1" latinLnBrk="0" hangingPunct="1">
+              <a:lnSpc>
+                <a:spcPct val="120000"/>
+              </a:lnSpc>
+              <a:spcBef>
+                <a:spcPts val="500"/>
+              </a:spcBef>
+              <a:buSzPct val="125000"/>
+              <a:buFont typeface="Arial" panose="020B0604020202020204" pitchFamily="34" charset="0"/>
+              <a:buChar char="•"/>
+              <a:defRPr sz="1400" kern="1200">
+                <a:solidFill>
+                  <a:schemeClr val="tx1"/>
+                </a:solidFill>
+                <a:latin typeface="+mn-lt"/>
+                <a:ea typeface="+mn-ea"/>
+                <a:cs typeface="+mn-cs"/>
+              </a:defRPr>
+            </a:lvl9pPr>
+          </a:lstStyle>
+          <a:p>
+            <a:pPr marL="0" indent="0">
+              <a:buNone/>
+            </a:pPr>
+            <a:r>
+              <a:rPr lang="lv-LV" dirty="0"/>
+              <a:t>3. Ja pārvēršana izdodas, pārbaudam, vai skaitlis dalās ar 2 bez atlikuma.</a:t>
+            </a:r>
+          </a:p>
+        </p:txBody>
+      </p:sp>
+      <p:sp>
+        <p:nvSpPr>
+          <p:cNvPr id="9" name="Content Placeholder 2">
+            <a:extLst>
+              <a:ext uri="{FF2B5EF4-FFF2-40B4-BE49-F238E27FC236}">
+                <a16:creationId xmlns:a16="http://schemas.microsoft.com/office/drawing/2014/main" id="{507D047B-8898-45C1-A7C3-2586CA9C480C}"/>
+              </a:ext>
+            </a:extLst>
+          </p:cNvPr>
+          <p:cNvSpPr txBox="1">
+            <a:spLocks/>
+          </p:cNvSpPr>
+          <p:nvPr/>
+        </p:nvSpPr>
+        <p:spPr>
+          <a:xfrm>
+            <a:off x="2183633" y="5521251"/>
+            <a:ext cx="9905999" cy="1164771"/>
+          </a:xfrm>
+          <a:prstGeom prst="rect">
+            <a:avLst/>
+          </a:prstGeom>
+        </p:spPr>
+        <p:txBody>
+          <a:bodyPr vert="horz" lIns="91440" tIns="45720" rIns="91440" bIns="45720" rtlCol="0">
+            <a:normAutofit/>
+          </a:bodyPr>
+          <a:lstStyle>
+            <a:lvl1pPr marL="228600" indent="-228600" algn="l" defTabSz="914400" rtl="0" eaLnBrk="1" latinLnBrk="0" hangingPunct="1">
+              <a:lnSpc>
+                <a:spcPct val="120000"/>
+              </a:lnSpc>
+              <a:spcBef>
+                <a:spcPts val="1000"/>
+              </a:spcBef>
+              <a:buSzPct val="125000"/>
+              <a:buFont typeface="Arial" panose="020B0604020202020204" pitchFamily="34" charset="0"/>
+              <a:buChar char="•"/>
+              <a:defRPr sz="2400" kern="1200">
+                <a:solidFill>
+                  <a:schemeClr val="tx1"/>
+                </a:solidFill>
+                <a:latin typeface="+mn-lt"/>
+                <a:ea typeface="+mn-ea"/>
+                <a:cs typeface="+mn-cs"/>
+              </a:defRPr>
+            </a:lvl1pPr>
+            <a:lvl2pPr marL="685800" indent="-228600" algn="l" defTabSz="914400" rtl="0" eaLnBrk="1" latinLnBrk="0" hangingPunct="1">
+              <a:lnSpc>
+                <a:spcPct val="120000"/>
+              </a:lnSpc>
+              <a:spcBef>
+                <a:spcPts val="500"/>
+              </a:spcBef>
+              <a:buSzPct val="125000"/>
+              <a:buFont typeface="Arial" panose="020B0604020202020204" pitchFamily="34" charset="0"/>
+              <a:buChar char="•"/>
+              <a:defRPr sz="2000" kern="1200">
+                <a:solidFill>
+                  <a:schemeClr val="tx1"/>
+                </a:solidFill>
+                <a:latin typeface="+mn-lt"/>
+                <a:ea typeface="+mn-ea"/>
+                <a:cs typeface="+mn-cs"/>
+              </a:defRPr>
+            </a:lvl2pPr>
+            <a:lvl3pPr marL="1143000" indent="-228600" algn="l" defTabSz="914400" rtl="0" eaLnBrk="1" latinLnBrk="0" hangingPunct="1">
+              <a:lnSpc>
+                <a:spcPct val="120000"/>
+              </a:lnSpc>
+              <a:spcBef>
+                <a:spcPts val="500"/>
+              </a:spcBef>
+              <a:buSzPct val="125000"/>
+              <a:buFont typeface="Arial" panose="020B0604020202020204" pitchFamily="34" charset="0"/>
+              <a:buChar char="•"/>
+              <a:defRPr sz="1800" kern="1200">
+                <a:solidFill>
+                  <a:schemeClr val="tx1"/>
+                </a:solidFill>
+                <a:latin typeface="+mn-lt"/>
+                <a:ea typeface="+mn-ea"/>
+                <a:cs typeface="+mn-cs"/>
+              </a:defRPr>
+            </a:lvl3pPr>
+            <a:lvl4pPr marL="1600200" indent="-228600" algn="l" defTabSz="914400" rtl="0" eaLnBrk="1" latinLnBrk="0" hangingPunct="1">
+              <a:lnSpc>
+                <a:spcPct val="120000"/>
+              </a:lnSpc>
+              <a:spcBef>
+                <a:spcPts val="500"/>
+              </a:spcBef>
+              <a:buSzPct val="125000"/>
+              <a:buFont typeface="Arial" panose="020B0604020202020204" pitchFamily="34" charset="0"/>
+              <a:buChar char="•"/>
+              <a:defRPr sz="1600" kern="1200">
+                <a:solidFill>
+                  <a:schemeClr val="tx1"/>
+                </a:solidFill>
+                <a:latin typeface="+mn-lt"/>
+                <a:ea typeface="+mn-ea"/>
+                <a:cs typeface="+mn-cs"/>
+              </a:defRPr>
+            </a:lvl4pPr>
+            <a:lvl5pPr marL="2057400" indent="-228600" algn="l" defTabSz="914400" rtl="0" eaLnBrk="1" latinLnBrk="0" hangingPunct="1">
+              <a:lnSpc>
+                <a:spcPct val="120000"/>
+              </a:lnSpc>
+              <a:spcBef>
+                <a:spcPts val="500"/>
+              </a:spcBef>
+              <a:buSzPct val="125000"/>
+              <a:buFont typeface="Arial" panose="020B0604020202020204" pitchFamily="34" charset="0"/>
+              <a:buChar char="•"/>
+              <a:defRPr sz="1600" kern="1200">
+                <a:solidFill>
+                  <a:schemeClr val="tx1"/>
+                </a:solidFill>
+                <a:latin typeface="+mn-lt"/>
+                <a:ea typeface="+mn-ea"/>
+                <a:cs typeface="+mn-cs"/>
+              </a:defRPr>
+            </a:lvl5pPr>
+            <a:lvl6pPr marL="2514600" indent="-228600" algn="l" defTabSz="914400" rtl="0" eaLnBrk="1" latinLnBrk="0" hangingPunct="1">
+              <a:lnSpc>
+                <a:spcPct val="120000"/>
+              </a:lnSpc>
+              <a:spcBef>
+                <a:spcPts val="500"/>
+              </a:spcBef>
+              <a:buSzPct val="125000"/>
+              <a:buFont typeface="Arial" panose="020B0604020202020204" pitchFamily="34" charset="0"/>
+              <a:buChar char="•"/>
+              <a:defRPr sz="1400" kern="1200">
+                <a:solidFill>
+                  <a:schemeClr val="tx1"/>
+                </a:solidFill>
+                <a:latin typeface="+mn-lt"/>
+                <a:ea typeface="+mn-ea"/>
+                <a:cs typeface="+mn-cs"/>
+              </a:defRPr>
+            </a:lvl6pPr>
+            <a:lvl7pPr marL="2971800" indent="-228600" algn="l" defTabSz="914400" rtl="0" eaLnBrk="1" latinLnBrk="0" hangingPunct="1">
+              <a:lnSpc>
+                <a:spcPct val="120000"/>
+              </a:lnSpc>
+              <a:spcBef>
+                <a:spcPts val="500"/>
+              </a:spcBef>
+              <a:buSzPct val="125000"/>
+              <a:buFont typeface="Arial" panose="020B0604020202020204" pitchFamily="34" charset="0"/>
+              <a:buChar char="•"/>
+              <a:defRPr sz="1400" kern="1200">
+                <a:solidFill>
+                  <a:schemeClr val="tx1"/>
+                </a:solidFill>
+                <a:latin typeface="+mn-lt"/>
+                <a:ea typeface="+mn-ea"/>
+                <a:cs typeface="+mn-cs"/>
+              </a:defRPr>
+            </a:lvl7pPr>
+            <a:lvl8pPr marL="3429000" indent="-228600" algn="l" defTabSz="914400" rtl="0" eaLnBrk="1" latinLnBrk="0" hangingPunct="1">
+              <a:lnSpc>
+                <a:spcPct val="120000"/>
+              </a:lnSpc>
+              <a:spcBef>
+                <a:spcPts val="500"/>
+              </a:spcBef>
+              <a:buSzPct val="125000"/>
+              <a:buFont typeface="Arial" panose="020B0604020202020204" pitchFamily="34" charset="0"/>
+              <a:buChar char="•"/>
+              <a:defRPr sz="1400" kern="1200">
+                <a:solidFill>
+                  <a:schemeClr val="tx1"/>
+                </a:solidFill>
+                <a:latin typeface="+mn-lt"/>
+                <a:ea typeface="+mn-ea"/>
+                <a:cs typeface="+mn-cs"/>
+              </a:defRPr>
+            </a:lvl8pPr>
+            <a:lvl9pPr marL="3886200" indent="-228600" algn="l" defTabSz="914400" rtl="0" eaLnBrk="1" latinLnBrk="0" hangingPunct="1">
+              <a:lnSpc>
+                <a:spcPct val="120000"/>
+              </a:lnSpc>
+              <a:spcBef>
+                <a:spcPts val="500"/>
+              </a:spcBef>
+              <a:buSzPct val="125000"/>
+              <a:buFont typeface="Arial" panose="020B0604020202020204" pitchFamily="34" charset="0"/>
+              <a:buChar char="•"/>
+              <a:defRPr sz="1400" kern="1200">
+                <a:solidFill>
+                  <a:schemeClr val="tx1"/>
+                </a:solidFill>
+                <a:latin typeface="+mn-lt"/>
+                <a:ea typeface="+mn-ea"/>
+                <a:cs typeface="+mn-cs"/>
+              </a:defRPr>
+            </a:lvl9pPr>
+          </a:lstStyle>
+          <a:p>
+            <a:pPr marL="0" indent="0">
+              <a:buNone/>
+            </a:pPr>
+            <a:r>
+              <a:rPr lang="lv-LV" dirty="0"/>
+              <a:t>4. Izvadām atbilstošu paziņojumu par skaitļa pāra vai nepāra statusu.</a:t>
+            </a:r>
+          </a:p>
+        </p:txBody>
+      </p:sp>
+      <p:sp>
+        <p:nvSpPr>
+          <p:cNvPr id="10" name="Content Placeholder 2">
+            <a:extLst>
+              <a:ext uri="{FF2B5EF4-FFF2-40B4-BE49-F238E27FC236}">
+                <a16:creationId xmlns:a16="http://schemas.microsoft.com/office/drawing/2014/main" id="{6F838472-8E78-4999-8A9B-043313128087}"/>
+              </a:ext>
+            </a:extLst>
+          </p:cNvPr>
+          <p:cNvSpPr txBox="1">
+            <a:spLocks/>
+          </p:cNvSpPr>
+          <p:nvPr/>
+        </p:nvSpPr>
+        <p:spPr>
+          <a:xfrm>
+            <a:off x="2423118" y="5511308"/>
+            <a:ext cx="9905999" cy="1164771"/>
+          </a:xfrm>
+          <a:prstGeom prst="rect">
+            <a:avLst/>
+          </a:prstGeom>
+        </p:spPr>
+        <p:txBody>
+          <a:bodyPr vert="horz" lIns="91440" tIns="45720" rIns="91440" bIns="45720" rtlCol="0">
+            <a:normAutofit/>
+          </a:bodyPr>
+          <a:lstStyle>
+            <a:lvl1pPr marL="228600" indent="-228600" algn="l" defTabSz="914400" rtl="0" eaLnBrk="1" latinLnBrk="0" hangingPunct="1">
+              <a:lnSpc>
+                <a:spcPct val="120000"/>
+              </a:lnSpc>
+              <a:spcBef>
+                <a:spcPts val="1000"/>
+              </a:spcBef>
+              <a:buSzPct val="125000"/>
+              <a:buFont typeface="Arial" panose="020B0604020202020204" pitchFamily="34" charset="0"/>
+              <a:buChar char="•"/>
+              <a:defRPr sz="2400" kern="1200">
+                <a:solidFill>
+                  <a:schemeClr val="tx1"/>
+                </a:solidFill>
+                <a:latin typeface="+mn-lt"/>
+                <a:ea typeface="+mn-ea"/>
+                <a:cs typeface="+mn-cs"/>
+              </a:defRPr>
+            </a:lvl1pPr>
+            <a:lvl2pPr marL="685800" indent="-228600" algn="l" defTabSz="914400" rtl="0" eaLnBrk="1" latinLnBrk="0" hangingPunct="1">
+              <a:lnSpc>
+                <a:spcPct val="120000"/>
+              </a:lnSpc>
+              <a:spcBef>
+                <a:spcPts val="500"/>
+              </a:spcBef>
+              <a:buSzPct val="125000"/>
+              <a:buFont typeface="Arial" panose="020B0604020202020204" pitchFamily="34" charset="0"/>
+              <a:buChar char="•"/>
+              <a:defRPr sz="2000" kern="1200">
+                <a:solidFill>
+                  <a:schemeClr val="tx1"/>
+                </a:solidFill>
+                <a:latin typeface="+mn-lt"/>
+                <a:ea typeface="+mn-ea"/>
+                <a:cs typeface="+mn-cs"/>
+              </a:defRPr>
+            </a:lvl2pPr>
+            <a:lvl3pPr marL="1143000" indent="-228600" algn="l" defTabSz="914400" rtl="0" eaLnBrk="1" latinLnBrk="0" hangingPunct="1">
+              <a:lnSpc>
+                <a:spcPct val="120000"/>
+              </a:lnSpc>
+              <a:spcBef>
+                <a:spcPts val="500"/>
+              </a:spcBef>
+              <a:buSzPct val="125000"/>
+              <a:buFont typeface="Arial" panose="020B0604020202020204" pitchFamily="34" charset="0"/>
+              <a:buChar char="•"/>
+              <a:defRPr sz="1800" kern="1200">
+                <a:solidFill>
+                  <a:schemeClr val="tx1"/>
+                </a:solidFill>
+                <a:latin typeface="+mn-lt"/>
+                <a:ea typeface="+mn-ea"/>
+                <a:cs typeface="+mn-cs"/>
+              </a:defRPr>
+            </a:lvl3pPr>
+            <a:lvl4pPr marL="1600200" indent="-228600" algn="l" defTabSz="914400" rtl="0" eaLnBrk="1" latinLnBrk="0" hangingPunct="1">
+              <a:lnSpc>
+                <a:spcPct val="120000"/>
+              </a:lnSpc>
+              <a:spcBef>
+                <a:spcPts val="500"/>
+              </a:spcBef>
+              <a:buSzPct val="125000"/>
+              <a:buFont typeface="Arial" panose="020B0604020202020204" pitchFamily="34" charset="0"/>
+              <a:buChar char="•"/>
+              <a:defRPr sz="1600" kern="1200">
+                <a:solidFill>
+                  <a:schemeClr val="tx1"/>
+                </a:solidFill>
+                <a:latin typeface="+mn-lt"/>
+                <a:ea typeface="+mn-ea"/>
+                <a:cs typeface="+mn-cs"/>
+              </a:defRPr>
+            </a:lvl4pPr>
+            <a:lvl5pPr marL="2057400" indent="-228600" algn="l" defTabSz="914400" rtl="0" eaLnBrk="1" latinLnBrk="0" hangingPunct="1">
+              <a:lnSpc>
+                <a:spcPct val="120000"/>
+              </a:lnSpc>
+              <a:spcBef>
+                <a:spcPts val="500"/>
+              </a:spcBef>
+              <a:buSzPct val="125000"/>
+              <a:buFont typeface="Arial" panose="020B0604020202020204" pitchFamily="34" charset="0"/>
+              <a:buChar char="•"/>
+              <a:defRPr sz="1600" kern="1200">
+                <a:solidFill>
+                  <a:schemeClr val="tx1"/>
+                </a:solidFill>
+                <a:latin typeface="+mn-lt"/>
+                <a:ea typeface="+mn-ea"/>
+                <a:cs typeface="+mn-cs"/>
+              </a:defRPr>
+            </a:lvl5pPr>
+            <a:lvl6pPr marL="2514600" indent="-228600" algn="l" defTabSz="914400" rtl="0" eaLnBrk="1" latinLnBrk="0" hangingPunct="1">
+              <a:lnSpc>
+                <a:spcPct val="120000"/>
+              </a:lnSpc>
+              <a:spcBef>
+                <a:spcPts val="500"/>
+              </a:spcBef>
+              <a:buSzPct val="125000"/>
+              <a:buFont typeface="Arial" panose="020B0604020202020204" pitchFamily="34" charset="0"/>
+              <a:buChar char="•"/>
+              <a:defRPr sz="1400" kern="1200">
+                <a:solidFill>
+                  <a:schemeClr val="tx1"/>
+                </a:solidFill>
+                <a:latin typeface="+mn-lt"/>
+                <a:ea typeface="+mn-ea"/>
+                <a:cs typeface="+mn-cs"/>
+              </a:defRPr>
+            </a:lvl6pPr>
+            <a:lvl7pPr marL="2971800" indent="-228600" algn="l" defTabSz="914400" rtl="0" eaLnBrk="1" latinLnBrk="0" hangingPunct="1">
+              <a:lnSpc>
+                <a:spcPct val="120000"/>
+              </a:lnSpc>
+              <a:spcBef>
+                <a:spcPts val="500"/>
+              </a:spcBef>
+              <a:buSzPct val="125000"/>
+              <a:buFont typeface="Arial" panose="020B0604020202020204" pitchFamily="34" charset="0"/>
+              <a:buChar char="•"/>
+              <a:defRPr sz="1400" kern="1200">
+                <a:solidFill>
+                  <a:schemeClr val="tx1"/>
+                </a:solidFill>
+                <a:latin typeface="+mn-lt"/>
+                <a:ea typeface="+mn-ea"/>
+                <a:cs typeface="+mn-cs"/>
+              </a:defRPr>
+            </a:lvl7pPr>
+            <a:lvl8pPr marL="3429000" indent="-228600" algn="l" defTabSz="914400" rtl="0" eaLnBrk="1" latinLnBrk="0" hangingPunct="1">
+              <a:lnSpc>
+                <a:spcPct val="120000"/>
+              </a:lnSpc>
+              <a:spcBef>
+                <a:spcPts val="500"/>
+              </a:spcBef>
+              <a:buSzPct val="125000"/>
+              <a:buFont typeface="Arial" panose="020B0604020202020204" pitchFamily="34" charset="0"/>
+              <a:buChar char="•"/>
+              <a:defRPr sz="1400" kern="1200">
+                <a:solidFill>
+                  <a:schemeClr val="tx1"/>
+                </a:solidFill>
+                <a:latin typeface="+mn-lt"/>
+                <a:ea typeface="+mn-ea"/>
+                <a:cs typeface="+mn-cs"/>
+              </a:defRPr>
+            </a:lvl8pPr>
+            <a:lvl9pPr marL="3886200" indent="-228600" algn="l" defTabSz="914400" rtl="0" eaLnBrk="1" latinLnBrk="0" hangingPunct="1">
+              <a:lnSpc>
+                <a:spcPct val="120000"/>
+              </a:lnSpc>
+              <a:spcBef>
+                <a:spcPts val="500"/>
+              </a:spcBef>
+              <a:buSzPct val="125000"/>
+              <a:buFont typeface="Arial" panose="020B0604020202020204" pitchFamily="34" charset="0"/>
+              <a:buChar char="•"/>
+              <a:defRPr sz="1400" kern="1200">
+                <a:solidFill>
+                  <a:schemeClr val="tx1"/>
+                </a:solidFill>
+                <a:latin typeface="+mn-lt"/>
+                <a:ea typeface="+mn-ea"/>
+                <a:cs typeface="+mn-cs"/>
+              </a:defRPr>
+            </a:lvl9pPr>
+          </a:lstStyle>
+          <a:p>
+            <a:pPr marL="0" indent="0">
+              <a:buNone/>
+            </a:pPr>
+            <a:r>
+              <a:rPr lang="lv-LV" dirty="0"/>
+              <a:t>5. Ja pārvēršana neizdodas, izvadām kļūdas paziņojumu.</a:t>
+            </a:r>
           </a:p>
         </p:txBody>
       </p:sp>
@@ -19235,243 +20171,6 @@
     <p:extLst>
       <p:ext uri="{BB962C8B-B14F-4D97-AF65-F5344CB8AC3E}">
         <p14:creationId xmlns:p14="http://schemas.microsoft.com/office/powerpoint/2010/main" val="4169351868"/>
-      </p:ext>
-    </p:extLst>
-  </p:cSld>
-  <p:clrMapOvr>
-    <a:masterClrMapping/>
-  </p:clrMapOvr>
-</p:sld>
-</file>
-
-<file path=ppt/slides/slide17.xml><?xml version="1.0" encoding="utf-8"?>
-<p:sld xmlns:a="http://schemas.openxmlformats.org/drawingml/2006/main" xmlns:r="http://schemas.openxmlformats.org/officeDocument/2006/relationships" xmlns:p="http://schemas.openxmlformats.org/presentationml/2006/main">
-  <p:cSld>
-    <p:spTree>
-      <p:nvGrpSpPr>
-        <p:cNvPr id="1" name=""/>
-        <p:cNvGrpSpPr/>
-        <p:nvPr/>
-      </p:nvGrpSpPr>
-      <p:grpSpPr>
-        <a:xfrm>
-          <a:off x="0" y="0"/>
-          <a:ext cx="0" cy="0"/>
-          <a:chOff x="0" y="0"/>
-          <a:chExt cx="0" cy="0"/>
-        </a:xfrm>
-      </p:grpSpPr>
-      <p:sp>
-        <p:nvSpPr>
-          <p:cNvPr id="2" name="Title 1">
-            <a:extLst>
-              <a:ext uri="{FF2B5EF4-FFF2-40B4-BE49-F238E27FC236}">
-                <a16:creationId xmlns:a16="http://schemas.microsoft.com/office/drawing/2014/main" id="{B50330EF-B5EC-46E4-B867-D3E24A6E239D}"/>
-              </a:ext>
-            </a:extLst>
-          </p:cNvPr>
-          <p:cNvSpPr>
-            <a:spLocks noGrp="1"/>
-          </p:cNvSpPr>
-          <p:nvPr>
-            <p:ph type="title"/>
-          </p:nvPr>
-        </p:nvSpPr>
-        <p:spPr>
-          <a:xfrm>
-            <a:off x="1243012" y="-113002"/>
-            <a:ext cx="9905998" cy="1478570"/>
-          </a:xfrm>
-        </p:spPr>
-        <p:txBody>
-          <a:bodyPr>
-            <a:normAutofit/>
-          </a:bodyPr>
-          <a:lstStyle/>
-          <a:p>
-            <a:r>
-              <a:rPr lang="lv-LV" sz="4800" dirty="0"/>
-              <a:t>Izmantotā literatūra</a:t>
-            </a:r>
-          </a:p>
-        </p:txBody>
-      </p:sp>
-      <p:sp>
-        <p:nvSpPr>
-          <p:cNvPr id="3" name="Content Placeholder 2">
-            <a:extLst>
-              <a:ext uri="{FF2B5EF4-FFF2-40B4-BE49-F238E27FC236}">
-                <a16:creationId xmlns:a16="http://schemas.microsoft.com/office/drawing/2014/main" id="{C0BDF603-85F5-46C4-BD81-37710BD2D123}"/>
-              </a:ext>
-            </a:extLst>
-          </p:cNvPr>
-          <p:cNvSpPr>
-            <a:spLocks noGrp="1"/>
-          </p:cNvSpPr>
-          <p:nvPr>
-            <p:ph idx="1"/>
-          </p:nvPr>
-        </p:nvSpPr>
-        <p:spPr>
-          <a:xfrm>
-            <a:off x="1141412" y="1117600"/>
-            <a:ext cx="10308908" cy="5445760"/>
-          </a:xfrm>
-        </p:spPr>
-        <p:txBody>
-          <a:bodyPr>
-            <a:normAutofit lnSpcReduction="10000"/>
-          </a:bodyPr>
-          <a:lstStyle/>
-          <a:p>
-            <a:r>
-              <a:rPr lang="lv-LV" dirty="0">
-                <a:solidFill>
-                  <a:schemeClr val="tx2"/>
-                </a:solidFill>
-              </a:rPr>
-              <a:t>Python Variables [tiešsaiste]. [Skatīts 09.06.2025].</a:t>
-            </a:r>
-          </a:p>
-          <a:p>
-            <a:r>
-              <a:rPr lang="lv-LV" dirty="0">
-                <a:solidFill>
-                  <a:schemeClr val="tx2"/>
-                </a:solidFill>
-              </a:rPr>
-              <a:t>Pieejams: </a:t>
-            </a:r>
-            <a:r>
-              <a:rPr lang="lv-LV" dirty="0">
-                <a:solidFill>
-                  <a:schemeClr val="tx2"/>
-                </a:solidFill>
-                <a:hlinkClick r:id="rId2"/>
-              </a:rPr>
-              <a:t>https://www.w3schools.com/python/python_variables.asp</a:t>
-            </a:r>
-            <a:endParaRPr lang="lv-LV" dirty="0">
-              <a:solidFill>
-                <a:schemeClr val="tx2"/>
-              </a:solidFill>
-            </a:endParaRPr>
-          </a:p>
-          <a:p>
-            <a:r>
-              <a:rPr lang="lv-LV" dirty="0"/>
-              <a:t>Python - Variable Names [tiešsaiste]. [Skatīts 09.06.2025].</a:t>
-            </a:r>
-          </a:p>
-          <a:p>
-            <a:r>
-              <a:rPr lang="lv-LV" dirty="0"/>
-              <a:t>Pieejams: </a:t>
-            </a:r>
-            <a:r>
-              <a:rPr lang="lv-LV" dirty="0">
-                <a:hlinkClick r:id="rId3"/>
-              </a:rPr>
-              <a:t>https://www.w3schools.com/python/python_variables_names.asp</a:t>
-            </a:r>
-            <a:endParaRPr lang="lv-LV" dirty="0"/>
-          </a:p>
-          <a:p>
-            <a:r>
-              <a:rPr lang="lv-LV" dirty="0">
-                <a:solidFill>
-                  <a:schemeClr val="tx2"/>
-                </a:solidFill>
-              </a:rPr>
-              <a:t>Python Variables - Assign Multiple Values [tiešsaiste]. [Skatīts 09.06.2025].</a:t>
-            </a:r>
-          </a:p>
-          <a:p>
-            <a:r>
-              <a:rPr lang="lv-LV" dirty="0">
-                <a:solidFill>
-                  <a:schemeClr val="tx2"/>
-                </a:solidFill>
-              </a:rPr>
-              <a:t>Pieejams: </a:t>
-            </a:r>
-            <a:r>
-              <a:rPr lang="lv-LV" dirty="0">
-                <a:solidFill>
-                  <a:schemeClr val="tx2"/>
-                </a:solidFill>
-                <a:hlinkClick r:id="rId4"/>
-              </a:rPr>
-              <a:t>https://www.w3schools.com/python/python_variables_multiple.asp</a:t>
-            </a:r>
-            <a:endParaRPr lang="lv-LV" dirty="0">
-              <a:solidFill>
-                <a:schemeClr val="tx2"/>
-              </a:solidFill>
-            </a:endParaRPr>
-          </a:p>
-          <a:p>
-            <a:r>
-              <a:rPr lang="lv-LV" dirty="0"/>
-              <a:t>Python  - Output Variables [tiešsaiste]. [Skatīts 09.06.2025].</a:t>
-            </a:r>
-          </a:p>
-          <a:p>
-            <a:r>
-              <a:rPr lang="lv-LV" dirty="0"/>
-              <a:t>Pieejams: </a:t>
-            </a:r>
-            <a:r>
-              <a:rPr lang="lv-LV" dirty="0">
-                <a:hlinkClick r:id="rId5"/>
-              </a:rPr>
-              <a:t>https://www.w3schools.com/python/python_variables_output.asp</a:t>
-            </a:r>
-            <a:endParaRPr lang="lv-LV" dirty="0"/>
-          </a:p>
-          <a:p>
-            <a:r>
-              <a:rPr lang="lv-LV" dirty="0">
-                <a:solidFill>
-                  <a:schemeClr val="tx2"/>
-                </a:solidFill>
-              </a:rPr>
-              <a:t>Python - Global Variables [tiešsaiste]. [Skatīts 09.06.2025].</a:t>
-            </a:r>
-          </a:p>
-          <a:p>
-            <a:r>
-              <a:rPr lang="lv-LV" dirty="0">
-                <a:solidFill>
-                  <a:schemeClr val="tx2"/>
-                </a:solidFill>
-              </a:rPr>
-              <a:t>Pieejams: </a:t>
-            </a:r>
-            <a:r>
-              <a:rPr lang="lv-LV" dirty="0">
-                <a:solidFill>
-                  <a:schemeClr val="tx2"/>
-                </a:solidFill>
-                <a:hlinkClick r:id="rId6"/>
-              </a:rPr>
-              <a:t>https://www.w3schools.com/python/python_variables_global.asp</a:t>
-            </a:r>
-            <a:endParaRPr lang="lv-LV" dirty="0">
-              <a:solidFill>
-                <a:schemeClr val="tx2"/>
-              </a:solidFill>
-            </a:endParaRPr>
-          </a:p>
-          <a:p>
-            <a:endParaRPr lang="lv-LV" dirty="0"/>
-          </a:p>
-        </p:txBody>
-      </p:sp>
-    </p:spTree>
-    <p:extLst>
-      <p:ext uri="{BB962C8B-B14F-4D97-AF65-F5344CB8AC3E}">
-        <p14:creationId xmlns:p14="http://schemas.microsoft.com/office/powerpoint/2010/main" val="1524739529"/>
       </p:ext>
     </p:extLst>
   </p:cSld>
@@ -19568,6 +20267,41 @@
                                           </p:stCondLst>
                                         </p:cTn>
                                         <p:tgtEl>
+                                          <p:spTgt spid="6"/>
+                                        </p:tgtEl>
+                                        <p:attrNameLst>
+                                          <p:attrName>style.visibility</p:attrName>
+                                        </p:attrNameLst>
+                                      </p:cBhvr>
+                                      <p:to>
+                                        <p:strVal val="visible"/>
+                                      </p:to>
+                                    </p:set>
+                                    <p:animEffect transition="in" filter="fade">
+                                      <p:cBhvr>
+                                        <p:cTn id="12" dur="500"/>
+                                        <p:tgtEl>
+                                          <p:spTgt spid="6"/>
+                                        </p:tgtEl>
+                                      </p:cBhvr>
+                                    </p:animEffect>
+                                  </p:childTnLst>
+                                </p:cTn>
+                              </p:par>
+                              <p:par>
+                                <p:cTn id="13" presetID="10" presetClass="entr" presetSubtype="0" fill="hold" grpId="0" nodeType="withEffect">
+                                  <p:stCondLst>
+                                    <p:cond delay="0"/>
+                                  </p:stCondLst>
+                                  <p:childTnLst>
+                                    <p:set>
+                                      <p:cBhvr>
+                                        <p:cTn id="14" dur="1" fill="hold">
+                                          <p:stCondLst>
+                                            <p:cond delay="0"/>
+                                          </p:stCondLst>
+                                        </p:cTn>
+                                        <p:tgtEl>
                                           <p:spTgt spid="3">
                                             <p:txEl>
                                               <p:pRg st="0" end="0"/>
@@ -19584,7 +20318,7 @@
                                     </p:set>
                                     <p:animEffect transition="in" filter="fade">
                                       <p:cBhvr>
-                                        <p:cTn id="12" dur="500"/>
+                                        <p:cTn id="15" dur="500"/>
                                         <p:tgtEl>
                                           <p:spTgt spid="3">
                                             <p:txEl>
@@ -19597,15 +20331,879 @@
                                   </p:childTnLst>
                                 </p:cTn>
                               </p:par>
+                            </p:childTnLst>
+                          </p:cTn>
+                        </p:par>
+                      </p:childTnLst>
+                    </p:cTn>
+                  </p:par>
+                  <p:par>
+                    <p:cTn id="16" fill="hold">
+                      <p:stCondLst>
+                        <p:cond delay="indefinite"/>
+                      </p:stCondLst>
+                      <p:childTnLst>
+                        <p:par>
+                          <p:cTn id="17" fill="hold">
+                            <p:stCondLst>
+                              <p:cond delay="0"/>
+                            </p:stCondLst>
+                            <p:childTnLst>
                               <p:par>
-                                <p:cTn id="13" presetID="10" presetClass="entr" presetSubtype="0" fill="hold" nodeType="withEffect">
+                                <p:cTn id="18" presetID="10" presetClass="exit" presetSubtype="0" fill="hold" grpId="1" nodeType="clickEffect">
+                                  <p:stCondLst>
+                                    <p:cond delay="0"/>
+                                  </p:stCondLst>
+                                  <p:childTnLst>
+                                    <p:animEffect transition="out" filter="fade">
+                                      <p:cBhvr>
+                                        <p:cTn id="19" dur="500"/>
+                                        <p:tgtEl>
+                                          <p:spTgt spid="3">
+                                            <p:txEl>
+                                              <p:pRg st="0" end="0"/>
+                                            </p:txEl>
+                                          </p:spTgt>
+                                        </p:tgtEl>
+                                      </p:cBhvr>
+                                    </p:animEffect>
+                                    <p:set>
+                                      <p:cBhvr>
+                                        <p:cTn id="20" dur="1" fill="hold">
+                                          <p:stCondLst>
+                                            <p:cond delay="499"/>
+                                          </p:stCondLst>
+                                        </p:cTn>
+                                        <p:tgtEl>
+                                          <p:spTgt spid="3">
+                                            <p:txEl>
+                                              <p:pRg st="0" end="0"/>
+                                            </p:txEl>
+                                          </p:spTgt>
+                                        </p:tgtEl>
+                                        <p:attrNameLst>
+                                          <p:attrName>style.visibility</p:attrName>
+                                        </p:attrNameLst>
+                                      </p:cBhvr>
+                                      <p:to>
+                                        <p:strVal val="hidden"/>
+                                      </p:to>
+                                    </p:set>
+                                  </p:childTnLst>
+                                </p:cTn>
+                              </p:par>
+                              <p:par>
+                                <p:cTn id="21" presetID="10" presetClass="entr" presetSubtype="0" fill="hold" grpId="0" nodeType="withEffect">
                                   <p:stCondLst>
                                     <p:cond delay="0"/>
                                   </p:stCondLst>
                                   <p:childTnLst>
                                     <p:set>
                                       <p:cBhvr>
-                                        <p:cTn id="14" dur="1" fill="hold">
+                                        <p:cTn id="22" dur="1" fill="hold">
+                                          <p:stCondLst>
+                                            <p:cond delay="0"/>
+                                          </p:stCondLst>
+                                        </p:cTn>
+                                        <p:tgtEl>
+                                          <p:spTgt spid="7"/>
+                                        </p:tgtEl>
+                                        <p:attrNameLst>
+                                          <p:attrName>style.visibility</p:attrName>
+                                        </p:attrNameLst>
+                                      </p:cBhvr>
+                                      <p:to>
+                                        <p:strVal val="visible"/>
+                                      </p:to>
+                                    </p:set>
+                                    <p:animEffect transition="in" filter="fade">
+                                      <p:cBhvr>
+                                        <p:cTn id="23" dur="500"/>
+                                        <p:tgtEl>
+                                          <p:spTgt spid="7"/>
+                                        </p:tgtEl>
+                                      </p:cBhvr>
+                                    </p:animEffect>
+                                  </p:childTnLst>
+                                </p:cTn>
+                              </p:par>
+                            </p:childTnLst>
+                          </p:cTn>
+                        </p:par>
+                      </p:childTnLst>
+                    </p:cTn>
+                  </p:par>
+                  <p:par>
+                    <p:cTn id="24" fill="hold">
+                      <p:stCondLst>
+                        <p:cond delay="indefinite"/>
+                      </p:stCondLst>
+                      <p:childTnLst>
+                        <p:par>
+                          <p:cTn id="25" fill="hold">
+                            <p:stCondLst>
+                              <p:cond delay="0"/>
+                            </p:stCondLst>
+                            <p:childTnLst>
+                              <p:par>
+                                <p:cTn id="26" presetID="10" presetClass="exit" presetSubtype="0" fill="hold" grpId="1" nodeType="clickEffect">
+                                  <p:stCondLst>
+                                    <p:cond delay="0"/>
+                                  </p:stCondLst>
+                                  <p:childTnLst>
+                                    <p:animEffect transition="out" filter="fade">
+                                      <p:cBhvr>
+                                        <p:cTn id="27" dur="500"/>
+                                        <p:tgtEl>
+                                          <p:spTgt spid="7"/>
+                                        </p:tgtEl>
+                                      </p:cBhvr>
+                                    </p:animEffect>
+                                    <p:set>
+                                      <p:cBhvr>
+                                        <p:cTn id="28" dur="1" fill="hold">
+                                          <p:stCondLst>
+                                            <p:cond delay="499"/>
+                                          </p:stCondLst>
+                                        </p:cTn>
+                                        <p:tgtEl>
+                                          <p:spTgt spid="7"/>
+                                        </p:tgtEl>
+                                        <p:attrNameLst>
+                                          <p:attrName>style.visibility</p:attrName>
+                                        </p:attrNameLst>
+                                      </p:cBhvr>
+                                      <p:to>
+                                        <p:strVal val="hidden"/>
+                                      </p:to>
+                                    </p:set>
+                                  </p:childTnLst>
+                                </p:cTn>
+                              </p:par>
+                              <p:par>
+                                <p:cTn id="29" presetID="10" presetClass="entr" presetSubtype="0" fill="hold" grpId="0" nodeType="withEffect">
+                                  <p:stCondLst>
+                                    <p:cond delay="0"/>
+                                  </p:stCondLst>
+                                  <p:childTnLst>
+                                    <p:set>
+                                      <p:cBhvr>
+                                        <p:cTn id="30" dur="1" fill="hold">
+                                          <p:stCondLst>
+                                            <p:cond delay="0"/>
+                                          </p:stCondLst>
+                                        </p:cTn>
+                                        <p:tgtEl>
+                                          <p:spTgt spid="8"/>
+                                        </p:tgtEl>
+                                        <p:attrNameLst>
+                                          <p:attrName>style.visibility</p:attrName>
+                                        </p:attrNameLst>
+                                      </p:cBhvr>
+                                      <p:to>
+                                        <p:strVal val="visible"/>
+                                      </p:to>
+                                    </p:set>
+                                    <p:animEffect transition="in" filter="fade">
+                                      <p:cBhvr>
+                                        <p:cTn id="31" dur="500"/>
+                                        <p:tgtEl>
+                                          <p:spTgt spid="8"/>
+                                        </p:tgtEl>
+                                      </p:cBhvr>
+                                    </p:animEffect>
+                                  </p:childTnLst>
+                                </p:cTn>
+                              </p:par>
+                            </p:childTnLst>
+                          </p:cTn>
+                        </p:par>
+                      </p:childTnLst>
+                    </p:cTn>
+                  </p:par>
+                  <p:par>
+                    <p:cTn id="32" fill="hold">
+                      <p:stCondLst>
+                        <p:cond delay="indefinite"/>
+                      </p:stCondLst>
+                      <p:childTnLst>
+                        <p:par>
+                          <p:cTn id="33" fill="hold">
+                            <p:stCondLst>
+                              <p:cond delay="0"/>
+                            </p:stCondLst>
+                            <p:childTnLst>
+                              <p:par>
+                                <p:cTn id="34" presetID="10" presetClass="exit" presetSubtype="0" fill="hold" grpId="1" nodeType="clickEffect">
+                                  <p:stCondLst>
+                                    <p:cond delay="0"/>
+                                  </p:stCondLst>
+                                  <p:childTnLst>
+                                    <p:animEffect transition="out" filter="fade">
+                                      <p:cBhvr>
+                                        <p:cTn id="35" dur="500"/>
+                                        <p:tgtEl>
+                                          <p:spTgt spid="8"/>
+                                        </p:tgtEl>
+                                      </p:cBhvr>
+                                    </p:animEffect>
+                                    <p:set>
+                                      <p:cBhvr>
+                                        <p:cTn id="36" dur="1" fill="hold">
+                                          <p:stCondLst>
+                                            <p:cond delay="499"/>
+                                          </p:stCondLst>
+                                        </p:cTn>
+                                        <p:tgtEl>
+                                          <p:spTgt spid="8"/>
+                                        </p:tgtEl>
+                                        <p:attrNameLst>
+                                          <p:attrName>style.visibility</p:attrName>
+                                        </p:attrNameLst>
+                                      </p:cBhvr>
+                                      <p:to>
+                                        <p:strVal val="hidden"/>
+                                      </p:to>
+                                    </p:set>
+                                  </p:childTnLst>
+                                </p:cTn>
+                              </p:par>
+                              <p:par>
+                                <p:cTn id="37" presetID="10" presetClass="entr" presetSubtype="0" fill="hold" grpId="0" nodeType="withEffect">
+                                  <p:stCondLst>
+                                    <p:cond delay="0"/>
+                                  </p:stCondLst>
+                                  <p:childTnLst>
+                                    <p:set>
+                                      <p:cBhvr>
+                                        <p:cTn id="38" dur="1" fill="hold">
+                                          <p:stCondLst>
+                                            <p:cond delay="0"/>
+                                          </p:stCondLst>
+                                        </p:cTn>
+                                        <p:tgtEl>
+                                          <p:spTgt spid="9"/>
+                                        </p:tgtEl>
+                                        <p:attrNameLst>
+                                          <p:attrName>style.visibility</p:attrName>
+                                        </p:attrNameLst>
+                                      </p:cBhvr>
+                                      <p:to>
+                                        <p:strVal val="visible"/>
+                                      </p:to>
+                                    </p:set>
+                                    <p:animEffect transition="in" filter="fade">
+                                      <p:cBhvr>
+                                        <p:cTn id="39" dur="500"/>
+                                        <p:tgtEl>
+                                          <p:spTgt spid="9"/>
+                                        </p:tgtEl>
+                                      </p:cBhvr>
+                                    </p:animEffect>
+                                  </p:childTnLst>
+                                </p:cTn>
+                              </p:par>
+                            </p:childTnLst>
+                          </p:cTn>
+                        </p:par>
+                      </p:childTnLst>
+                    </p:cTn>
+                  </p:par>
+                  <p:par>
+                    <p:cTn id="40" fill="hold">
+                      <p:stCondLst>
+                        <p:cond delay="indefinite"/>
+                      </p:stCondLst>
+                      <p:childTnLst>
+                        <p:par>
+                          <p:cTn id="41" fill="hold">
+                            <p:stCondLst>
+                              <p:cond delay="0"/>
+                            </p:stCondLst>
+                            <p:childTnLst>
+                              <p:par>
+                                <p:cTn id="42" presetID="10" presetClass="exit" presetSubtype="0" fill="hold" grpId="1" nodeType="clickEffect">
+                                  <p:stCondLst>
+                                    <p:cond delay="0"/>
+                                  </p:stCondLst>
+                                  <p:childTnLst>
+                                    <p:animEffect transition="out" filter="fade">
+                                      <p:cBhvr>
+                                        <p:cTn id="43" dur="500"/>
+                                        <p:tgtEl>
+                                          <p:spTgt spid="9"/>
+                                        </p:tgtEl>
+                                      </p:cBhvr>
+                                    </p:animEffect>
+                                    <p:set>
+                                      <p:cBhvr>
+                                        <p:cTn id="44" dur="1" fill="hold">
+                                          <p:stCondLst>
+                                            <p:cond delay="499"/>
+                                          </p:stCondLst>
+                                        </p:cTn>
+                                        <p:tgtEl>
+                                          <p:spTgt spid="9"/>
+                                        </p:tgtEl>
+                                        <p:attrNameLst>
+                                          <p:attrName>style.visibility</p:attrName>
+                                        </p:attrNameLst>
+                                      </p:cBhvr>
+                                      <p:to>
+                                        <p:strVal val="hidden"/>
+                                      </p:to>
+                                    </p:set>
+                                  </p:childTnLst>
+                                </p:cTn>
+                              </p:par>
+                              <p:par>
+                                <p:cTn id="45" presetID="10" presetClass="entr" presetSubtype="0" fill="hold" grpId="0" nodeType="withEffect">
+                                  <p:stCondLst>
+                                    <p:cond delay="0"/>
+                                  </p:stCondLst>
+                                  <p:childTnLst>
+                                    <p:set>
+                                      <p:cBhvr>
+                                        <p:cTn id="46" dur="1" fill="hold">
+                                          <p:stCondLst>
+                                            <p:cond delay="0"/>
+                                          </p:stCondLst>
+                                        </p:cTn>
+                                        <p:tgtEl>
+                                          <p:spTgt spid="10"/>
+                                        </p:tgtEl>
+                                        <p:attrNameLst>
+                                          <p:attrName>style.visibility</p:attrName>
+                                        </p:attrNameLst>
+                                      </p:cBhvr>
+                                      <p:to>
+                                        <p:strVal val="visible"/>
+                                      </p:to>
+                                    </p:set>
+                                    <p:animEffect transition="in" filter="fade">
+                                      <p:cBhvr>
+                                        <p:cTn id="47" dur="500"/>
+                                        <p:tgtEl>
+                                          <p:spTgt spid="10"/>
+                                        </p:tgtEl>
+                                      </p:cBhvr>
+                                    </p:animEffect>
+                                  </p:childTnLst>
+                                </p:cTn>
+                              </p:par>
+                            </p:childTnLst>
+                          </p:cTn>
+                        </p:par>
+                      </p:childTnLst>
+                    </p:cTn>
+                  </p:par>
+                </p:childTnLst>
+              </p:cTn>
+              <p:prevCondLst>
+                <p:cond evt="onPrev" delay="0">
+                  <p:tgtEl>
+                    <p:sldTgt/>
+                  </p:tgtEl>
+                </p:cond>
+              </p:prevCondLst>
+              <p:nextCondLst>
+                <p:cond evt="onNext" delay="0">
+                  <p:tgtEl>
+                    <p:sldTgt/>
+                  </p:tgtEl>
+                </p:cond>
+              </p:nextCondLst>
+            </p:seq>
+          </p:childTnLst>
+        </p:cTn>
+      </p:par>
+    </p:tnLst>
+    <p:bldLst>
+      <p:bldP spid="2" grpId="0"/>
+      <p:bldP spid="3" grpId="0" build="p"/>
+      <p:bldP spid="3" grpId="1" build="p"/>
+      <p:bldP spid="7" grpId="0"/>
+      <p:bldP spid="7" grpId="1"/>
+      <p:bldP spid="8" grpId="0"/>
+      <p:bldP spid="8" grpId="1"/>
+      <p:bldP spid="9" grpId="0"/>
+      <p:bldP spid="9" grpId="1"/>
+      <p:bldP spid="10" grpId="0"/>
+    </p:bldLst>
+  </p:timing>
+</p:sld>
+</file>
+
+<file path=ppt/slides/slide17.xml><?xml version="1.0" encoding="utf-8"?>
+<p:sld xmlns:a="http://schemas.openxmlformats.org/drawingml/2006/main" xmlns:r="http://schemas.openxmlformats.org/officeDocument/2006/relationships" xmlns:p="http://schemas.openxmlformats.org/presentationml/2006/main">
+  <p:cSld>
+    <p:spTree>
+      <p:nvGrpSpPr>
+        <p:cNvPr id="1" name=""/>
+        <p:cNvGrpSpPr/>
+        <p:nvPr/>
+      </p:nvGrpSpPr>
+      <p:grpSpPr>
+        <a:xfrm>
+          <a:off x="0" y="0"/>
+          <a:ext cx="0" cy="0"/>
+          <a:chOff x="0" y="0"/>
+          <a:chExt cx="0" cy="0"/>
+        </a:xfrm>
+      </p:grpSpPr>
+      <p:sp>
+        <p:nvSpPr>
+          <p:cNvPr id="2" name="Title 1">
+            <a:extLst>
+              <a:ext uri="{FF2B5EF4-FFF2-40B4-BE49-F238E27FC236}">
+                <a16:creationId xmlns:a16="http://schemas.microsoft.com/office/drawing/2014/main" id="{2E2A1282-2873-4DAA-A525-283196830FBF}"/>
+              </a:ext>
+            </a:extLst>
+          </p:cNvPr>
+          <p:cNvSpPr>
+            <a:spLocks noGrp="1"/>
+          </p:cNvSpPr>
+          <p:nvPr>
+            <p:ph type="title"/>
+          </p:nvPr>
+        </p:nvSpPr>
+        <p:spPr/>
+        <p:txBody>
+          <a:bodyPr>
+            <a:normAutofit/>
+          </a:bodyPr>
+          <a:lstStyle/>
+          <a:p>
+            <a:r>
+              <a:rPr lang="lv-LV" sz="4800" dirty="0"/>
+              <a:t>Kopsavilkums par tēmu</a:t>
+            </a:r>
+          </a:p>
+        </p:txBody>
+      </p:sp>
+      <p:sp>
+        <p:nvSpPr>
+          <p:cNvPr id="3" name="Content Placeholder 2">
+            <a:extLst>
+              <a:ext uri="{FF2B5EF4-FFF2-40B4-BE49-F238E27FC236}">
+                <a16:creationId xmlns:a16="http://schemas.microsoft.com/office/drawing/2014/main" id="{DDBBB65C-6A35-4407-805C-4D49D24F0D29}"/>
+              </a:ext>
+            </a:extLst>
+          </p:cNvPr>
+          <p:cNvSpPr>
+            <a:spLocks noGrp="1"/>
+          </p:cNvSpPr>
+          <p:nvPr>
+            <p:ph idx="1"/>
+          </p:nvPr>
+        </p:nvSpPr>
+        <p:spPr>
+          <a:xfrm>
+            <a:off x="1141413" y="2314801"/>
+            <a:ext cx="10157959" cy="3541714"/>
+          </a:xfrm>
+        </p:spPr>
+        <p:txBody>
+          <a:bodyPr>
+            <a:normAutofit/>
+          </a:bodyPr>
+          <a:lstStyle/>
+          <a:p>
+            <a:r>
+              <a:rPr lang="lv-LV" dirty="0"/>
+              <a:t>Mainīgie ir vieni no būtiskākajiem pamatelementiem programmēšanā, neatkarīgi no izmantotās programmēšanas valodas. </a:t>
+            </a:r>
+          </a:p>
+          <a:p>
+            <a:r>
+              <a:rPr lang="lv-LV" dirty="0"/>
+              <a:t>Tie ļauj glabāt un manipulēt ar dažāda veida datiem, kas ir nepieciešami programmas darbībai – sākot no vienkāršiem teksta vai skaitļu laukiem līdz pat strukturētai informācijai. </a:t>
+            </a:r>
+          </a:p>
+          <a:p>
+            <a:r>
+              <a:rPr lang="lv-LV" dirty="0"/>
+              <a:t>Python valodā mainīgie ir īpaši parocīgi, jo datu tips tiek noteikts automātiski pēc piešķirtās vērtības, padarot kodu pierakstu vienkāršāku un vieglāk uzturamu.</a:t>
+            </a:r>
+          </a:p>
+        </p:txBody>
+      </p:sp>
+      <p:sp>
+        <p:nvSpPr>
+          <p:cNvPr id="4" name="Content Placeholder 2">
+            <a:extLst>
+              <a:ext uri="{FF2B5EF4-FFF2-40B4-BE49-F238E27FC236}">
+                <a16:creationId xmlns:a16="http://schemas.microsoft.com/office/drawing/2014/main" id="{95807F6A-11E1-45A6-A3B9-AAB9A94D3FBC}"/>
+              </a:ext>
+            </a:extLst>
+          </p:cNvPr>
+          <p:cNvSpPr txBox="1">
+            <a:spLocks/>
+          </p:cNvSpPr>
+          <p:nvPr/>
+        </p:nvSpPr>
+        <p:spPr>
+          <a:xfrm>
+            <a:off x="1141412" y="2314801"/>
+            <a:ext cx="10157959" cy="3541714"/>
+          </a:xfrm>
+          <a:prstGeom prst="rect">
+            <a:avLst/>
+          </a:prstGeom>
+        </p:spPr>
+        <p:txBody>
+          <a:bodyPr vert="horz" lIns="91440" tIns="45720" rIns="91440" bIns="45720" rtlCol="0">
+            <a:normAutofit/>
+          </a:bodyPr>
+          <a:lstStyle>
+            <a:lvl1pPr marL="228600" indent="-228600" algn="l" defTabSz="914400" rtl="0" eaLnBrk="1" latinLnBrk="0" hangingPunct="1">
+              <a:lnSpc>
+                <a:spcPct val="120000"/>
+              </a:lnSpc>
+              <a:spcBef>
+                <a:spcPts val="1000"/>
+              </a:spcBef>
+              <a:buSzPct val="125000"/>
+              <a:buFont typeface="Arial" panose="020B0604020202020204" pitchFamily="34" charset="0"/>
+              <a:buChar char="•"/>
+              <a:defRPr sz="2400" kern="1200">
+                <a:solidFill>
+                  <a:schemeClr val="tx1"/>
+                </a:solidFill>
+                <a:latin typeface="+mn-lt"/>
+                <a:ea typeface="+mn-ea"/>
+                <a:cs typeface="+mn-cs"/>
+              </a:defRPr>
+            </a:lvl1pPr>
+            <a:lvl2pPr marL="685800" indent="-228600" algn="l" defTabSz="914400" rtl="0" eaLnBrk="1" latinLnBrk="0" hangingPunct="1">
+              <a:lnSpc>
+                <a:spcPct val="120000"/>
+              </a:lnSpc>
+              <a:spcBef>
+                <a:spcPts val="500"/>
+              </a:spcBef>
+              <a:buSzPct val="125000"/>
+              <a:buFont typeface="Arial" panose="020B0604020202020204" pitchFamily="34" charset="0"/>
+              <a:buChar char="•"/>
+              <a:defRPr sz="2000" kern="1200">
+                <a:solidFill>
+                  <a:schemeClr val="tx1"/>
+                </a:solidFill>
+                <a:latin typeface="+mn-lt"/>
+                <a:ea typeface="+mn-ea"/>
+                <a:cs typeface="+mn-cs"/>
+              </a:defRPr>
+            </a:lvl2pPr>
+            <a:lvl3pPr marL="1143000" indent="-228600" algn="l" defTabSz="914400" rtl="0" eaLnBrk="1" latinLnBrk="0" hangingPunct="1">
+              <a:lnSpc>
+                <a:spcPct val="120000"/>
+              </a:lnSpc>
+              <a:spcBef>
+                <a:spcPts val="500"/>
+              </a:spcBef>
+              <a:buSzPct val="125000"/>
+              <a:buFont typeface="Arial" panose="020B0604020202020204" pitchFamily="34" charset="0"/>
+              <a:buChar char="•"/>
+              <a:defRPr sz="1800" kern="1200">
+                <a:solidFill>
+                  <a:schemeClr val="tx1"/>
+                </a:solidFill>
+                <a:latin typeface="+mn-lt"/>
+                <a:ea typeface="+mn-ea"/>
+                <a:cs typeface="+mn-cs"/>
+              </a:defRPr>
+            </a:lvl3pPr>
+            <a:lvl4pPr marL="1600200" indent="-228600" algn="l" defTabSz="914400" rtl="0" eaLnBrk="1" latinLnBrk="0" hangingPunct="1">
+              <a:lnSpc>
+                <a:spcPct val="120000"/>
+              </a:lnSpc>
+              <a:spcBef>
+                <a:spcPts val="500"/>
+              </a:spcBef>
+              <a:buSzPct val="125000"/>
+              <a:buFont typeface="Arial" panose="020B0604020202020204" pitchFamily="34" charset="0"/>
+              <a:buChar char="•"/>
+              <a:defRPr sz="1600" kern="1200">
+                <a:solidFill>
+                  <a:schemeClr val="tx1"/>
+                </a:solidFill>
+                <a:latin typeface="+mn-lt"/>
+                <a:ea typeface="+mn-ea"/>
+                <a:cs typeface="+mn-cs"/>
+              </a:defRPr>
+            </a:lvl4pPr>
+            <a:lvl5pPr marL="2057400" indent="-228600" algn="l" defTabSz="914400" rtl="0" eaLnBrk="1" latinLnBrk="0" hangingPunct="1">
+              <a:lnSpc>
+                <a:spcPct val="120000"/>
+              </a:lnSpc>
+              <a:spcBef>
+                <a:spcPts val="500"/>
+              </a:spcBef>
+              <a:buSzPct val="125000"/>
+              <a:buFont typeface="Arial" panose="020B0604020202020204" pitchFamily="34" charset="0"/>
+              <a:buChar char="•"/>
+              <a:defRPr sz="1600" kern="1200">
+                <a:solidFill>
+                  <a:schemeClr val="tx1"/>
+                </a:solidFill>
+                <a:latin typeface="+mn-lt"/>
+                <a:ea typeface="+mn-ea"/>
+                <a:cs typeface="+mn-cs"/>
+              </a:defRPr>
+            </a:lvl5pPr>
+            <a:lvl6pPr marL="2514600" indent="-228600" algn="l" defTabSz="914400" rtl="0" eaLnBrk="1" latinLnBrk="0" hangingPunct="1">
+              <a:lnSpc>
+                <a:spcPct val="120000"/>
+              </a:lnSpc>
+              <a:spcBef>
+                <a:spcPts val="500"/>
+              </a:spcBef>
+              <a:buSzPct val="125000"/>
+              <a:buFont typeface="Arial" panose="020B0604020202020204" pitchFamily="34" charset="0"/>
+              <a:buChar char="•"/>
+              <a:defRPr sz="1400" kern="1200">
+                <a:solidFill>
+                  <a:schemeClr val="tx1"/>
+                </a:solidFill>
+                <a:latin typeface="+mn-lt"/>
+                <a:ea typeface="+mn-ea"/>
+                <a:cs typeface="+mn-cs"/>
+              </a:defRPr>
+            </a:lvl6pPr>
+            <a:lvl7pPr marL="2971800" indent="-228600" algn="l" defTabSz="914400" rtl="0" eaLnBrk="1" latinLnBrk="0" hangingPunct="1">
+              <a:lnSpc>
+                <a:spcPct val="120000"/>
+              </a:lnSpc>
+              <a:spcBef>
+                <a:spcPts val="500"/>
+              </a:spcBef>
+              <a:buSzPct val="125000"/>
+              <a:buFont typeface="Arial" panose="020B0604020202020204" pitchFamily="34" charset="0"/>
+              <a:buChar char="•"/>
+              <a:defRPr sz="1400" kern="1200">
+                <a:solidFill>
+                  <a:schemeClr val="tx1"/>
+                </a:solidFill>
+                <a:latin typeface="+mn-lt"/>
+                <a:ea typeface="+mn-ea"/>
+                <a:cs typeface="+mn-cs"/>
+              </a:defRPr>
+            </a:lvl7pPr>
+            <a:lvl8pPr marL="3429000" indent="-228600" algn="l" defTabSz="914400" rtl="0" eaLnBrk="1" latinLnBrk="0" hangingPunct="1">
+              <a:lnSpc>
+                <a:spcPct val="120000"/>
+              </a:lnSpc>
+              <a:spcBef>
+                <a:spcPts val="500"/>
+              </a:spcBef>
+              <a:buSzPct val="125000"/>
+              <a:buFont typeface="Arial" panose="020B0604020202020204" pitchFamily="34" charset="0"/>
+              <a:buChar char="•"/>
+              <a:defRPr sz="1400" kern="1200">
+                <a:solidFill>
+                  <a:schemeClr val="tx1"/>
+                </a:solidFill>
+                <a:latin typeface="+mn-lt"/>
+                <a:ea typeface="+mn-ea"/>
+                <a:cs typeface="+mn-cs"/>
+              </a:defRPr>
+            </a:lvl8pPr>
+            <a:lvl9pPr marL="3886200" indent="-228600" algn="l" defTabSz="914400" rtl="0" eaLnBrk="1" latinLnBrk="0" hangingPunct="1">
+              <a:lnSpc>
+                <a:spcPct val="120000"/>
+              </a:lnSpc>
+              <a:spcBef>
+                <a:spcPts val="500"/>
+              </a:spcBef>
+              <a:buSzPct val="125000"/>
+              <a:buFont typeface="Arial" panose="020B0604020202020204" pitchFamily="34" charset="0"/>
+              <a:buChar char="•"/>
+              <a:defRPr sz="1400" kern="1200">
+                <a:solidFill>
+                  <a:schemeClr val="tx1"/>
+                </a:solidFill>
+                <a:latin typeface="+mn-lt"/>
+                <a:ea typeface="+mn-ea"/>
+                <a:cs typeface="+mn-cs"/>
+              </a:defRPr>
+            </a:lvl9pPr>
+          </a:lstStyle>
+          <a:p>
+            <a:r>
+              <a:rPr lang="lv-LV" dirty="0"/>
+              <a:t>Šajā materiālā tika aplūkoti gan pamata datu tipi, gan praktiski piemēri to lietojumā, iekļaujot arī lietotāja ievadi, operatoru izmantošanu un loģikas pārbaudes. </a:t>
+            </a:r>
+          </a:p>
+          <a:p>
+            <a:r>
+              <a:rPr lang="lv-LV" dirty="0"/>
+              <a:t>Šāda pieeja palīdz nostiprināt izpratni par to, kā mainīgie darbojas reālās situācijās. </a:t>
+            </a:r>
+          </a:p>
+          <a:p>
+            <a:r>
+              <a:rPr lang="lv-LV" dirty="0"/>
+              <a:t>Zināšanas par mainīgo pareizu pielietošanu ir pamatā ikvienai funkcionālai programmai un ir nozīmīgs solis ikviena programmētāja profesionālajā attīstībā.</a:t>
+            </a:r>
+          </a:p>
+        </p:txBody>
+      </p:sp>
+    </p:spTree>
+    <p:extLst>
+      <p:ext uri="{BB962C8B-B14F-4D97-AF65-F5344CB8AC3E}">
+        <p14:creationId xmlns:p14="http://schemas.microsoft.com/office/powerpoint/2010/main" val="2036139634"/>
+      </p:ext>
+    </p:extLst>
+  </p:cSld>
+  <p:clrMapOvr>
+    <a:masterClrMapping/>
+  </p:clrMapOvr>
+  <p:timing>
+    <p:tnLst>
+      <p:par>
+        <p:cTn id="1" dur="indefinite" restart="never" nodeType="tmRoot">
+          <p:childTnLst>
+            <p:seq concurrent="1" nextAc="seek">
+              <p:cTn id="2" dur="indefinite" nodeType="mainSeq">
+                <p:childTnLst>
+                  <p:par>
+                    <p:cTn id="3" fill="hold">
+                      <p:stCondLst>
+                        <p:cond delay="indefinite"/>
+                        <p:cond evt="onBegin" delay="0">
+                          <p:tn val="2"/>
+                        </p:cond>
+                      </p:stCondLst>
+                      <p:childTnLst>
+                        <p:par>
+                          <p:cTn id="4" fill="hold">
+                            <p:stCondLst>
+                              <p:cond delay="0"/>
+                            </p:stCondLst>
+                            <p:childTnLst>
+                              <p:par>
+                                <p:cTn id="5" presetID="10" presetClass="entr" presetSubtype="0" fill="hold" grpId="0" nodeType="withEffect">
+                                  <p:stCondLst>
+                                    <p:cond delay="0"/>
+                                  </p:stCondLst>
+                                  <p:childTnLst>
+                                    <p:set>
+                                      <p:cBhvr>
+                                        <p:cTn id="6" dur="1" fill="hold">
+                                          <p:stCondLst>
+                                            <p:cond delay="0"/>
+                                          </p:stCondLst>
+                                        </p:cTn>
+                                        <p:tgtEl>
+                                          <p:spTgt spid="2"/>
+                                        </p:tgtEl>
+                                        <p:attrNameLst>
+                                          <p:attrName>style.visibility</p:attrName>
+                                        </p:attrNameLst>
+                                      </p:cBhvr>
+                                      <p:to>
+                                        <p:strVal val="visible"/>
+                                      </p:to>
+                                    </p:set>
+                                    <p:animEffect transition="in" filter="fade">
+                                      <p:cBhvr>
+                                        <p:cTn id="7" dur="500"/>
+                                        <p:tgtEl>
+                                          <p:spTgt spid="2"/>
+                                        </p:tgtEl>
+                                      </p:cBhvr>
+                                    </p:animEffect>
+                                  </p:childTnLst>
+                                </p:cTn>
+                              </p:par>
+                            </p:childTnLst>
+                          </p:cTn>
+                        </p:par>
+                      </p:childTnLst>
+                    </p:cTn>
+                  </p:par>
+                  <p:par>
+                    <p:cTn id="8" fill="hold">
+                      <p:stCondLst>
+                        <p:cond delay="indefinite"/>
+                      </p:stCondLst>
+                      <p:childTnLst>
+                        <p:par>
+                          <p:cTn id="9" fill="hold">
+                            <p:stCondLst>
+                              <p:cond delay="0"/>
+                            </p:stCondLst>
+                            <p:childTnLst>
+                              <p:par>
+                                <p:cTn id="10" presetID="10" presetClass="entr" presetSubtype="0" fill="hold" nodeType="clickEffect">
+                                  <p:stCondLst>
+                                    <p:cond delay="0"/>
+                                  </p:stCondLst>
+                                  <p:childTnLst>
+                                    <p:set>
+                                      <p:cBhvr>
+                                        <p:cTn id="11" dur="1" fill="hold">
+                                          <p:stCondLst>
+                                            <p:cond delay="0"/>
+                                          </p:stCondLst>
+                                        </p:cTn>
+                                        <p:tgtEl>
+                                          <p:spTgt spid="3">
+                                            <p:txEl>
+                                              <p:pRg st="0" end="0"/>
+                                            </p:txEl>
+                                          </p:spTgt>
+                                        </p:tgtEl>
+                                        <p:attrNameLst>
+                                          <p:attrName>style.visibility</p:attrName>
+                                        </p:attrNameLst>
+                                      </p:cBhvr>
+                                      <p:to>
+                                        <p:strVal val="visible"/>
+                                      </p:to>
+                                    </p:set>
+                                    <p:animEffect transition="in" filter="fade">
+                                      <p:cBhvr>
+                                        <p:cTn id="12" dur="500"/>
+                                        <p:tgtEl>
+                                          <p:spTgt spid="3">
+                                            <p:txEl>
+                                              <p:pRg st="0" end="0"/>
+                                            </p:txEl>
+                                          </p:spTgt>
+                                        </p:tgtEl>
+                                      </p:cBhvr>
+                                    </p:animEffect>
+                                  </p:childTnLst>
+                                </p:cTn>
+                              </p:par>
+                            </p:childTnLst>
+                          </p:cTn>
+                        </p:par>
+                      </p:childTnLst>
+                    </p:cTn>
+                  </p:par>
+                  <p:par>
+                    <p:cTn id="13" fill="hold">
+                      <p:stCondLst>
+                        <p:cond delay="indefinite"/>
+                      </p:stCondLst>
+                      <p:childTnLst>
+                        <p:par>
+                          <p:cTn id="14" fill="hold">
+                            <p:stCondLst>
+                              <p:cond delay="0"/>
+                            </p:stCondLst>
+                            <p:childTnLst>
+                              <p:par>
+                                <p:cTn id="15" presetID="10" presetClass="entr" presetSubtype="0" fill="hold" nodeType="clickEffect">
+                                  <p:stCondLst>
+                                    <p:cond delay="0"/>
+                                  </p:stCondLst>
+                                  <p:childTnLst>
+                                    <p:set>
+                                      <p:cBhvr>
+                                        <p:cTn id="16" dur="1" fill="hold">
                                           <p:stCondLst>
                                             <p:cond delay="0"/>
                                           </p:stCondLst>
@@ -19627,7 +21225,7 @@
                                     </p:set>
                                     <p:animEffect transition="in" filter="fade">
                                       <p:cBhvr>
-                                        <p:cTn id="15" dur="500"/>
+                                        <p:cTn id="17" dur="500"/>
                                         <p:tgtEl>
                                           <p:spTgt spid="3">
                                             <p:txEl>
@@ -19640,15 +21238,33 @@
                                   </p:childTnLst>
                                 </p:cTn>
                               </p:par>
+                            </p:childTnLst>
+                          </p:cTn>
+                        </p:par>
+                      </p:childTnLst>
+                    </p:cTn>
+                  </p:par>
+                  <p:par>
+                    <p:cTn id="18" fill="hold">
+                      <p:stCondLst>
+                        <p:cond delay="indefinite"/>
+                      </p:stCondLst>
+                      <p:childTnLst>
+                        <p:par>
+                          <p:cTn id="19" fill="hold">
+                            <p:stCondLst>
+                              <p:cond delay="0"/>
+                            </p:stCondLst>
+                            <p:childTnLst>
                               <p:par>
-                                <p:cTn id="16" presetID="10" presetClass="entr" presetSubtype="0" fill="hold" nodeType="withEffect">
+                                <p:cTn id="20" presetID="10" presetClass="entr" presetSubtype="0" fill="hold" nodeType="clickEffect">
                                   <p:stCondLst>
                                     <p:cond delay="0"/>
                                   </p:stCondLst>
                                   <p:childTnLst>
                                     <p:set>
                                       <p:cBhvr>
-                                        <p:cTn id="17" dur="1" fill="hold">
+                                        <p:cTn id="21" dur="1" fill="hold">
                                           <p:stCondLst>
                                             <p:cond delay="0"/>
                                           </p:stCondLst>
@@ -19670,7 +21286,7 @@
                                     </p:set>
                                     <p:animEffect transition="in" filter="fade">
                                       <p:cBhvr>
-                                        <p:cTn id="18" dur="500"/>
+                                        <p:cTn id="22" dur="500"/>
                                         <p:tgtEl>
                                           <p:spTgt spid="3">
                                             <p:txEl>
@@ -19683,23 +21299,53 @@
                                   </p:childTnLst>
                                 </p:cTn>
                               </p:par>
+                            </p:childTnLst>
+                          </p:cTn>
+                        </p:par>
+                      </p:childTnLst>
+                    </p:cTn>
+                  </p:par>
+                  <p:par>
+                    <p:cTn id="23" fill="hold">
+                      <p:stCondLst>
+                        <p:cond delay="indefinite"/>
+                      </p:stCondLst>
+                      <p:childTnLst>
+                        <p:par>
+                          <p:cTn id="24" fill="hold">
+                            <p:stCondLst>
+                              <p:cond delay="0"/>
+                            </p:stCondLst>
+                            <p:childTnLst>
                               <p:par>
-                                <p:cTn id="19" presetID="10" presetClass="entr" presetSubtype="0" fill="hold" nodeType="withEffect">
+                                <p:cTn id="25" presetID="10" presetClass="exit" presetSubtype="0" fill="hold" nodeType="clickEffect">
                                   <p:stCondLst>
                                     <p:cond delay="0"/>
                                   </p:stCondLst>
                                   <p:childTnLst>
+                                    <p:animEffect transition="out" filter="fade">
+                                      <p:cBhvr>
+                                        <p:cTn id="26" dur="500"/>
+                                        <p:tgtEl>
+                                          <p:spTgt spid="3">
+                                            <p:txEl>
+                                              <p:pRg st="0" end="0"/>
+                                            </p:txEl>
+                                          </p:spTgt>
+                                        </p:tgtEl>
+                                      </p:cBhvr>
+                                    </p:animEffect>
                                     <p:set>
                                       <p:cBhvr>
-                                        <p:cTn id="20" dur="1" fill="hold">
+                                        <p:cTn id="27" dur="1" fill="hold">
                                           <p:stCondLst>
-                                            <p:cond delay="0"/>
+                                            <p:cond delay="499"/>
                                           </p:stCondLst>
                                         </p:cTn>
                                         <p:tgtEl>
                                           <p:spTgt spid="3">
                                             <p:txEl>
-                                              <p:pRg st="3" end="3"/>
+                                              <p:pRg st="0" end="0"/>
                                             </p:txEl>
                                           </p:spTgt>
                                         </p:tgtEl>
@@ -19708,41 +21354,41 @@
                                         </p:attrNameLst>
                                       </p:cBhvr>
                                       <p:to>
-                                        <p:strVal val="visible"/>
+                                        <p:strVal val="hidden"/>
                                       </p:to>
                                     </p:set>
-                                    <p:animEffect transition="in" filter="fade">
-                                      <p:cBhvr>
-                                        <p:cTn id="21" dur="500"/>
-                                        <p:tgtEl>
-                                          <p:spTgt spid="3">
-                                            <p:txEl>
-                                              <p:pRg st="3" end="3"/>
-                                            </p:txEl>
-                                          </p:spTgt>
-                                        </p:tgtEl>
-                                      </p:cBhvr>
-                                    </p:animEffect>
                                   </p:childTnLst>
                                 </p:cTn>
                               </p:par>
                               <p:par>
-                                <p:cTn id="22" presetID="10" presetClass="entr" presetSubtype="0" fill="hold" nodeType="withEffect">
+                                <p:cTn id="28" presetID="10" presetClass="exit" presetSubtype="0" fill="hold" nodeType="withEffect">
                                   <p:stCondLst>
                                     <p:cond delay="0"/>
                                   </p:stCondLst>
                                   <p:childTnLst>
+                                    <p:animEffect transition="out" filter="fade">
+                                      <p:cBhvr>
+                                        <p:cTn id="29" dur="500"/>
+                                        <p:tgtEl>
+                                          <p:spTgt spid="3">
+                                            <p:txEl>
+                                              <p:pRg st="1" end="1"/>
+                                            </p:txEl>
+                                          </p:spTgt>
+                                        </p:tgtEl>
+                                      </p:cBhvr>
+                                    </p:animEffect>
                                     <p:set>
                                       <p:cBhvr>
-                                        <p:cTn id="23" dur="1" fill="hold">
+                                        <p:cTn id="30" dur="1" fill="hold">
                                           <p:stCondLst>
-                                            <p:cond delay="0"/>
+                                            <p:cond delay="499"/>
                                           </p:stCondLst>
                                         </p:cTn>
                                         <p:tgtEl>
                                           <p:spTgt spid="3">
                                             <p:txEl>
-                                              <p:pRg st="4" end="4"/>
+                                              <p:pRg st="1" end="1"/>
                                             </p:txEl>
                                           </p:spTgt>
                                         </p:tgtEl>
@@ -19751,41 +21397,41 @@
                                         </p:attrNameLst>
                                       </p:cBhvr>
                                       <p:to>
-                                        <p:strVal val="visible"/>
+                                        <p:strVal val="hidden"/>
                                       </p:to>
                                     </p:set>
-                                    <p:animEffect transition="in" filter="fade">
-                                      <p:cBhvr>
-                                        <p:cTn id="24" dur="500"/>
-                                        <p:tgtEl>
-                                          <p:spTgt spid="3">
-                                            <p:txEl>
-                                              <p:pRg st="4" end="4"/>
-                                            </p:txEl>
-                                          </p:spTgt>
-                                        </p:tgtEl>
-                                      </p:cBhvr>
-                                    </p:animEffect>
                                   </p:childTnLst>
                                 </p:cTn>
                               </p:par>
                               <p:par>
-                                <p:cTn id="25" presetID="10" presetClass="entr" presetSubtype="0" fill="hold" nodeType="withEffect">
+                                <p:cTn id="31" presetID="10" presetClass="exit" presetSubtype="0" fill="hold" nodeType="withEffect">
                                   <p:stCondLst>
                                     <p:cond delay="0"/>
                                   </p:stCondLst>
                                   <p:childTnLst>
+                                    <p:animEffect transition="out" filter="fade">
+                                      <p:cBhvr>
+                                        <p:cTn id="32" dur="500"/>
+                                        <p:tgtEl>
+                                          <p:spTgt spid="3">
+                                            <p:txEl>
+                                              <p:pRg st="2" end="2"/>
+                                            </p:txEl>
+                                          </p:spTgt>
+                                        </p:tgtEl>
+                                      </p:cBhvr>
+                                    </p:animEffect>
                                     <p:set>
                                       <p:cBhvr>
-                                        <p:cTn id="26" dur="1" fill="hold">
+                                        <p:cTn id="33" dur="1" fill="hold">
                                           <p:stCondLst>
-                                            <p:cond delay="0"/>
+                                            <p:cond delay="499"/>
                                           </p:stCondLst>
                                         </p:cTn>
                                         <p:tgtEl>
                                           <p:spTgt spid="3">
                                             <p:txEl>
-                                              <p:pRg st="5" end="5"/>
+                                              <p:pRg st="2" end="2"/>
                                             </p:txEl>
                                           </p:spTgt>
                                         </p:tgtEl>
@@ -19794,107 +21440,9 @@
                                         </p:attrNameLst>
                                       </p:cBhvr>
                                       <p:to>
-                                        <p:strVal val="visible"/>
+                                        <p:strVal val="hidden"/>
                                       </p:to>
                                     </p:set>
-                                    <p:animEffect transition="in" filter="fade">
-                                      <p:cBhvr>
-                                        <p:cTn id="27" dur="500"/>
-                                        <p:tgtEl>
-                                          <p:spTgt spid="3">
-                                            <p:txEl>
-                                              <p:pRg st="5" end="5"/>
-                                            </p:txEl>
-                                          </p:spTgt>
-                                        </p:tgtEl>
-                                      </p:cBhvr>
-                                    </p:animEffect>
-                                  </p:childTnLst>
-                                </p:cTn>
-                              </p:par>
-                              <p:par>
-                                <p:cTn id="28" presetID="10" presetClass="entr" presetSubtype="0" fill="hold" nodeType="withEffect">
-                                  <p:stCondLst>
-                                    <p:cond delay="0"/>
-                                  </p:stCondLst>
-                                  <p:childTnLst>
-                                    <p:set>
-                                      <p:cBhvr>
-                                        <p:cTn id="29" dur="1" fill="hold">
-                                          <p:stCondLst>
-                                            <p:cond delay="0"/>
-                                          </p:stCondLst>
-                                        </p:cTn>
-                                        <p:tgtEl>
-                                          <p:spTgt spid="3">
-                                            <p:txEl>
-                                              <p:pRg st="6" end="6"/>
-                                            </p:txEl>
-                                          </p:spTgt>
-                                        </p:tgtEl>
-                                        <p:attrNameLst>
-                                          <p:attrName>style.visibility</p:attrName>
-                                        </p:attrNameLst>
-                                      </p:cBhvr>
-                                      <p:to>
-                                        <p:strVal val="visible"/>
-                                      </p:to>
-                                    </p:set>
-                                    <p:animEffect transition="in" filter="fade">
-                                      <p:cBhvr>
-                                        <p:cTn id="30" dur="500"/>
-                                        <p:tgtEl>
-                                          <p:spTgt spid="3">
-                                            <p:txEl>
-                                              <p:pRg st="6" end="6"/>
-                                            </p:txEl>
-                                          </p:spTgt>
-                                        </p:tgtEl>
-                                      </p:cBhvr>
-                                    </p:animEffect>
-                                  </p:childTnLst>
-                                </p:cTn>
-                              </p:par>
-                              <p:par>
-                                <p:cTn id="31" presetID="10" presetClass="entr" presetSubtype="0" fill="hold" nodeType="withEffect">
-                                  <p:stCondLst>
-                                    <p:cond delay="0"/>
-                                  </p:stCondLst>
-                                  <p:childTnLst>
-                                    <p:set>
-                                      <p:cBhvr>
-                                        <p:cTn id="32" dur="1" fill="hold">
-                                          <p:stCondLst>
-                                            <p:cond delay="0"/>
-                                          </p:stCondLst>
-                                        </p:cTn>
-                                        <p:tgtEl>
-                                          <p:spTgt spid="3">
-                                            <p:txEl>
-                                              <p:pRg st="7" end="7"/>
-                                            </p:txEl>
-                                          </p:spTgt>
-                                        </p:tgtEl>
-                                        <p:attrNameLst>
-                                          <p:attrName>style.visibility</p:attrName>
-                                        </p:attrNameLst>
-                                      </p:cBhvr>
-                                      <p:to>
-                                        <p:strVal val="visible"/>
-                                      </p:to>
-                                    </p:set>
-                                    <p:animEffect transition="in" filter="fade">
-                                      <p:cBhvr>
-                                        <p:cTn id="33" dur="500"/>
-                                        <p:tgtEl>
-                                          <p:spTgt spid="3">
-                                            <p:txEl>
-                                              <p:pRg st="7" end="7"/>
-                                            </p:txEl>
-                                          </p:spTgt>
-                                        </p:tgtEl>
-                                      </p:cBhvr>
-                                    </p:animEffect>
                                   </p:childTnLst>
                                 </p:cTn>
                               </p:par>
@@ -19912,9 +21460,9 @@
                                           </p:stCondLst>
                                         </p:cTn>
                                         <p:tgtEl>
-                                          <p:spTgt spid="3">
+                                          <p:spTgt spid="4">
                                             <p:txEl>
-                                              <p:pRg st="8" end="8"/>
+                                              <p:pRg st="0" end="0"/>
                                             </p:txEl>
                                           </p:spTgt>
                                         </p:tgtEl>
@@ -19930,9 +21478,9 @@
                                       <p:cBhvr>
                                         <p:cTn id="36" dur="500"/>
                                         <p:tgtEl>
-                                          <p:spTgt spid="3">
+                                          <p:spTgt spid="4">
                                             <p:txEl>
-                                              <p:pRg st="8" end="8"/>
+                                              <p:pRg st="0" end="0"/>
                                             </p:txEl>
                                           </p:spTgt>
                                         </p:tgtEl>
@@ -19941,23 +21489,41 @@
                                   </p:childTnLst>
                                 </p:cTn>
                               </p:par>
+                            </p:childTnLst>
+                          </p:cTn>
+                        </p:par>
+                      </p:childTnLst>
+                    </p:cTn>
+                  </p:par>
+                  <p:par>
+                    <p:cTn id="37" fill="hold">
+                      <p:stCondLst>
+                        <p:cond delay="indefinite"/>
+                      </p:stCondLst>
+                      <p:childTnLst>
+                        <p:par>
+                          <p:cTn id="38" fill="hold">
+                            <p:stCondLst>
+                              <p:cond delay="0"/>
+                            </p:stCondLst>
+                            <p:childTnLst>
                               <p:par>
-                                <p:cTn id="37" presetID="10" presetClass="entr" presetSubtype="0" fill="hold" nodeType="withEffect">
+                                <p:cTn id="39" presetID="10" presetClass="entr" presetSubtype="0" fill="hold" nodeType="clickEffect">
                                   <p:stCondLst>
                                     <p:cond delay="0"/>
                                   </p:stCondLst>
                                   <p:childTnLst>
                                     <p:set>
                                       <p:cBhvr>
-                                        <p:cTn id="38" dur="1" fill="hold">
+                                        <p:cTn id="40" dur="1" fill="hold">
                                           <p:stCondLst>
                                             <p:cond delay="0"/>
                                           </p:stCondLst>
                                         </p:cTn>
                                         <p:tgtEl>
-                                          <p:spTgt spid="3">
+                                          <p:spTgt spid="4">
                                             <p:txEl>
-                                              <p:pRg st="9" end="9"/>
+                                              <p:pRg st="1" end="1"/>
                                             </p:txEl>
                                           </p:spTgt>
                                         </p:tgtEl>
@@ -19971,11 +21537,72 @@
                                     </p:set>
                                     <p:animEffect transition="in" filter="fade">
                                       <p:cBhvr>
-                                        <p:cTn id="39" dur="500"/>
-                                        <p:tgtEl>
-                                          <p:spTgt spid="3">
+                                        <p:cTn id="41" dur="500"/>
+                                        <p:tgtEl>
+                                          <p:spTgt spid="4">
                                             <p:txEl>
-                                              <p:pRg st="9" end="9"/>
+                                              <p:pRg st="1" end="1"/>
+                                            </p:txEl>
+                                          </p:spTgt>
+                                        </p:tgtEl>
+                                      </p:cBhvr>
+                                    </p:animEffect>
+                                  </p:childTnLst>
+                                </p:cTn>
+                              </p:par>
+                            </p:childTnLst>
+                          </p:cTn>
+                        </p:par>
+                      </p:childTnLst>
+                    </p:cTn>
+                  </p:par>
+                  <p:par>
+                    <p:cTn id="42" fill="hold">
+                      <p:stCondLst>
+                        <p:cond delay="indefinite"/>
+                      </p:stCondLst>
+                      <p:childTnLst>
+                        <p:par>
+                          <p:cTn id="43" fill="hold">
+                            <p:stCondLst>
+                              <p:cond delay="0"/>
+                            </p:stCondLst>
+                            <p:childTnLst>
+                              <p:par>
+                                <p:cTn id="44" presetID="10" presetClass="entr" presetSubtype="0" fill="hold" nodeType="clickEffect">
+                                  <p:stCondLst>
+                                    <p:cond delay="0"/>
+                                  </p:stCondLst>
+                                  <p:childTnLst>
+                                    <p:set>
+                                      <p:cBhvr>
+                                        <p:cTn id="45" dur="1" fill="hold">
+                                          <p:stCondLst>
+                                            <p:cond delay="0"/>
+                                          </p:stCondLst>
+                                        </p:cTn>
+                                        <p:tgtEl>
+                                          <p:spTgt spid="4">
+                                            <p:txEl>
+                                              <p:pRg st="2" end="2"/>
+                                            </p:txEl>
+                                          </p:spTgt>
+                                        </p:tgtEl>
+                                        <p:attrNameLst>
+                                          <p:attrName>style.visibility</p:attrName>
+                                        </p:attrNameLst>
+                                      </p:cBhvr>
+                                      <p:to>
+                                        <p:strVal val="visible"/>
+                                      </p:to>
+                                    </p:set>
+                                    <p:animEffect transition="in" filter="fade">
+                                      <p:cBhvr>
+                                        <p:cTn id="46" dur="500"/>
+                                        <p:tgtEl>
+                                          <p:spTgt spid="4">
+                                            <p:txEl>
+                                              <p:pRg st="2" end="2"/>
                                             </p:txEl>
                                           </p:spTgt>
                                         </p:tgtEl>
@@ -20088,6 +21715,780 @@
         </p:nvSpPr>
         <p:spPr>
           <a:xfrm>
+            <a:off x="1141412" y="1117600"/>
+            <a:ext cx="10308908" cy="5445760"/>
+          </a:xfrm>
+        </p:spPr>
+        <p:txBody>
+          <a:bodyPr>
+            <a:normAutofit lnSpcReduction="10000"/>
+          </a:bodyPr>
+          <a:lstStyle/>
+          <a:p>
+            <a:r>
+              <a:rPr lang="lv-LV" dirty="0">
+                <a:solidFill>
+                  <a:schemeClr val="tx2"/>
+                </a:solidFill>
+              </a:rPr>
+              <a:t>Python Variables [tiešsaiste]. [Skatīts 09.06.2025].</a:t>
+            </a:r>
+          </a:p>
+          <a:p>
+            <a:r>
+              <a:rPr lang="lv-LV" dirty="0">
+                <a:solidFill>
+                  <a:schemeClr val="tx2"/>
+                </a:solidFill>
+              </a:rPr>
+              <a:t>Pieejams: </a:t>
+            </a:r>
+            <a:r>
+              <a:rPr lang="lv-LV" dirty="0">
+                <a:solidFill>
+                  <a:schemeClr val="tx2"/>
+                </a:solidFill>
+                <a:hlinkClick r:id="rId2"/>
+              </a:rPr>
+              <a:t>https://www.w3schools.com/python/python_variables.asp</a:t>
+            </a:r>
+            <a:endParaRPr lang="lv-LV" dirty="0">
+              <a:solidFill>
+                <a:schemeClr val="tx2"/>
+              </a:solidFill>
+            </a:endParaRPr>
+          </a:p>
+          <a:p>
+            <a:r>
+              <a:rPr lang="lv-LV" dirty="0"/>
+              <a:t>Python - Variable Names [tiešsaiste]. [Skatīts 09.06.2025].</a:t>
+            </a:r>
+          </a:p>
+          <a:p>
+            <a:r>
+              <a:rPr lang="lv-LV" dirty="0"/>
+              <a:t>Pieejams: </a:t>
+            </a:r>
+            <a:r>
+              <a:rPr lang="lv-LV" dirty="0">
+                <a:hlinkClick r:id="rId3"/>
+              </a:rPr>
+              <a:t>https://www.w3schools.com/python/python_variables_names.asp</a:t>
+            </a:r>
+            <a:endParaRPr lang="lv-LV" dirty="0"/>
+          </a:p>
+          <a:p>
+            <a:r>
+              <a:rPr lang="lv-LV" dirty="0">
+                <a:solidFill>
+                  <a:schemeClr val="tx2"/>
+                </a:solidFill>
+              </a:rPr>
+              <a:t>Python Variables - Assign Multiple Values [tiešsaiste]. [Skatīts 09.06.2025].</a:t>
+            </a:r>
+          </a:p>
+          <a:p>
+            <a:r>
+              <a:rPr lang="lv-LV" dirty="0">
+                <a:solidFill>
+                  <a:schemeClr val="tx2"/>
+                </a:solidFill>
+              </a:rPr>
+              <a:t>Pieejams: </a:t>
+            </a:r>
+            <a:r>
+              <a:rPr lang="lv-LV" dirty="0">
+                <a:solidFill>
+                  <a:schemeClr val="tx2"/>
+                </a:solidFill>
+                <a:hlinkClick r:id="rId4"/>
+              </a:rPr>
+              <a:t>https://www.w3schools.com/python/python_variables_multiple.asp</a:t>
+            </a:r>
+            <a:endParaRPr lang="lv-LV" dirty="0">
+              <a:solidFill>
+                <a:schemeClr val="tx2"/>
+              </a:solidFill>
+            </a:endParaRPr>
+          </a:p>
+          <a:p>
+            <a:r>
+              <a:rPr lang="lv-LV" dirty="0"/>
+              <a:t>Python  - Output Variables [tiešsaiste]. [Skatīts 09.06.2025].</a:t>
+            </a:r>
+          </a:p>
+          <a:p>
+            <a:r>
+              <a:rPr lang="lv-LV" dirty="0"/>
+              <a:t>Pieejams: </a:t>
+            </a:r>
+            <a:r>
+              <a:rPr lang="lv-LV" dirty="0">
+                <a:hlinkClick r:id="rId5"/>
+              </a:rPr>
+              <a:t>https://www.w3schools.com/python/python_variables_output.asp</a:t>
+            </a:r>
+            <a:endParaRPr lang="lv-LV" dirty="0"/>
+          </a:p>
+          <a:p>
+            <a:r>
+              <a:rPr lang="lv-LV" dirty="0">
+                <a:solidFill>
+                  <a:schemeClr val="tx2"/>
+                </a:solidFill>
+              </a:rPr>
+              <a:t>Python - Global Variables [tiešsaiste]. [Skatīts 09.06.2025].</a:t>
+            </a:r>
+          </a:p>
+          <a:p>
+            <a:r>
+              <a:rPr lang="lv-LV" dirty="0">
+                <a:solidFill>
+                  <a:schemeClr val="tx2"/>
+                </a:solidFill>
+              </a:rPr>
+              <a:t>Pieejams: </a:t>
+            </a:r>
+            <a:r>
+              <a:rPr lang="lv-LV" dirty="0">
+                <a:solidFill>
+                  <a:schemeClr val="tx2"/>
+                </a:solidFill>
+                <a:hlinkClick r:id="rId6"/>
+              </a:rPr>
+              <a:t>https://www.w3schools.com/python/python_variables_global.asp</a:t>
+            </a:r>
+            <a:endParaRPr lang="lv-LV" dirty="0">
+              <a:solidFill>
+                <a:schemeClr val="tx2"/>
+              </a:solidFill>
+            </a:endParaRPr>
+          </a:p>
+          <a:p>
+            <a:endParaRPr lang="lv-LV" dirty="0"/>
+          </a:p>
+        </p:txBody>
+      </p:sp>
+    </p:spTree>
+    <p:extLst>
+      <p:ext uri="{BB962C8B-B14F-4D97-AF65-F5344CB8AC3E}">
+        <p14:creationId xmlns:p14="http://schemas.microsoft.com/office/powerpoint/2010/main" val="1524739529"/>
+      </p:ext>
+    </p:extLst>
+  </p:cSld>
+  <p:clrMapOvr>
+    <a:masterClrMapping/>
+  </p:clrMapOvr>
+  <p:timing>
+    <p:tnLst>
+      <p:par>
+        <p:cTn id="1" dur="indefinite" restart="never" nodeType="tmRoot">
+          <p:childTnLst>
+            <p:seq concurrent="1" nextAc="seek">
+              <p:cTn id="2" dur="indefinite" nodeType="mainSeq">
+                <p:childTnLst>
+                  <p:par>
+                    <p:cTn id="3" fill="hold">
+                      <p:stCondLst>
+                        <p:cond delay="indefinite"/>
+                        <p:cond evt="onBegin" delay="0">
+                          <p:tn val="2"/>
+                        </p:cond>
+                      </p:stCondLst>
+                      <p:childTnLst>
+                        <p:par>
+                          <p:cTn id="4" fill="hold">
+                            <p:stCondLst>
+                              <p:cond delay="0"/>
+                            </p:stCondLst>
+                            <p:childTnLst>
+                              <p:par>
+                                <p:cTn id="5" presetID="10" presetClass="entr" presetSubtype="0" fill="hold" grpId="0" nodeType="withEffect">
+                                  <p:stCondLst>
+                                    <p:cond delay="0"/>
+                                  </p:stCondLst>
+                                  <p:childTnLst>
+                                    <p:set>
+                                      <p:cBhvr>
+                                        <p:cTn id="6" dur="1" fill="hold">
+                                          <p:stCondLst>
+                                            <p:cond delay="0"/>
+                                          </p:stCondLst>
+                                        </p:cTn>
+                                        <p:tgtEl>
+                                          <p:spTgt spid="2"/>
+                                        </p:tgtEl>
+                                        <p:attrNameLst>
+                                          <p:attrName>style.visibility</p:attrName>
+                                        </p:attrNameLst>
+                                      </p:cBhvr>
+                                      <p:to>
+                                        <p:strVal val="visible"/>
+                                      </p:to>
+                                    </p:set>
+                                    <p:animEffect transition="in" filter="fade">
+                                      <p:cBhvr>
+                                        <p:cTn id="7" dur="500"/>
+                                        <p:tgtEl>
+                                          <p:spTgt spid="2"/>
+                                        </p:tgtEl>
+                                      </p:cBhvr>
+                                    </p:animEffect>
+                                  </p:childTnLst>
+                                </p:cTn>
+                              </p:par>
+                            </p:childTnLst>
+                          </p:cTn>
+                        </p:par>
+                      </p:childTnLst>
+                    </p:cTn>
+                  </p:par>
+                  <p:par>
+                    <p:cTn id="8" fill="hold">
+                      <p:stCondLst>
+                        <p:cond delay="indefinite"/>
+                      </p:stCondLst>
+                      <p:childTnLst>
+                        <p:par>
+                          <p:cTn id="9" fill="hold">
+                            <p:stCondLst>
+                              <p:cond delay="0"/>
+                            </p:stCondLst>
+                            <p:childTnLst>
+                              <p:par>
+                                <p:cTn id="10" presetID="10" presetClass="entr" presetSubtype="0" fill="hold" nodeType="clickEffect">
+                                  <p:stCondLst>
+                                    <p:cond delay="0"/>
+                                  </p:stCondLst>
+                                  <p:childTnLst>
+                                    <p:set>
+                                      <p:cBhvr>
+                                        <p:cTn id="11" dur="1" fill="hold">
+                                          <p:stCondLst>
+                                            <p:cond delay="0"/>
+                                          </p:stCondLst>
+                                        </p:cTn>
+                                        <p:tgtEl>
+                                          <p:spTgt spid="3">
+                                            <p:txEl>
+                                              <p:pRg st="0" end="0"/>
+                                            </p:txEl>
+                                          </p:spTgt>
+                                        </p:tgtEl>
+                                        <p:attrNameLst>
+                                          <p:attrName>style.visibility</p:attrName>
+                                        </p:attrNameLst>
+                                      </p:cBhvr>
+                                      <p:to>
+                                        <p:strVal val="visible"/>
+                                      </p:to>
+                                    </p:set>
+                                    <p:animEffect transition="in" filter="fade">
+                                      <p:cBhvr>
+                                        <p:cTn id="12" dur="500"/>
+                                        <p:tgtEl>
+                                          <p:spTgt spid="3">
+                                            <p:txEl>
+                                              <p:pRg st="0" end="0"/>
+                                            </p:txEl>
+                                          </p:spTgt>
+                                        </p:tgtEl>
+                                      </p:cBhvr>
+                                    </p:animEffect>
+                                  </p:childTnLst>
+                                </p:cTn>
+                              </p:par>
+                              <p:par>
+                                <p:cTn id="13" presetID="10" presetClass="entr" presetSubtype="0" fill="hold" nodeType="withEffect">
+                                  <p:stCondLst>
+                                    <p:cond delay="0"/>
+                                  </p:stCondLst>
+                                  <p:childTnLst>
+                                    <p:set>
+                                      <p:cBhvr>
+                                        <p:cTn id="14" dur="1" fill="hold">
+                                          <p:stCondLst>
+                                            <p:cond delay="0"/>
+                                          </p:stCondLst>
+                                        </p:cTn>
+                                        <p:tgtEl>
+                                          <p:spTgt spid="3">
+                                            <p:txEl>
+                                              <p:pRg st="1" end="1"/>
+                                            </p:txEl>
+                                          </p:spTgt>
+                                        </p:tgtEl>
+                                        <p:attrNameLst>
+                                          <p:attrName>style.visibility</p:attrName>
+                                        </p:attrNameLst>
+                                      </p:cBhvr>
+                                      <p:to>
+                                        <p:strVal val="visible"/>
+                                      </p:to>
+                                    </p:set>
+                                    <p:animEffect transition="in" filter="fade">
+                                      <p:cBhvr>
+                                        <p:cTn id="15" dur="500"/>
+                                        <p:tgtEl>
+                                          <p:spTgt spid="3">
+                                            <p:txEl>
+                                              <p:pRg st="1" end="1"/>
+                                            </p:txEl>
+                                          </p:spTgt>
+                                        </p:tgtEl>
+                                      </p:cBhvr>
+                                    </p:animEffect>
+                                  </p:childTnLst>
+                                </p:cTn>
+                              </p:par>
+                              <p:par>
+                                <p:cTn id="16" presetID="10" presetClass="entr" presetSubtype="0" fill="hold" nodeType="withEffect">
+                                  <p:stCondLst>
+                                    <p:cond delay="0"/>
+                                  </p:stCondLst>
+                                  <p:childTnLst>
+                                    <p:set>
+                                      <p:cBhvr>
+                                        <p:cTn id="17" dur="1" fill="hold">
+                                          <p:stCondLst>
+                                            <p:cond delay="0"/>
+                                          </p:stCondLst>
+                                        </p:cTn>
+                                        <p:tgtEl>
+                                          <p:spTgt spid="3">
+                                            <p:txEl>
+                                              <p:pRg st="2" end="2"/>
+                                            </p:txEl>
+                                          </p:spTgt>
+                                        </p:tgtEl>
+                                        <p:attrNameLst>
+                                          <p:attrName>style.visibility</p:attrName>
+                                        </p:attrNameLst>
+                                      </p:cBhvr>
+                                      <p:to>
+                                        <p:strVal val="visible"/>
+                                      </p:to>
+                                    </p:set>
+                                    <p:animEffect transition="in" filter="fade">
+                                      <p:cBhvr>
+                                        <p:cTn id="18" dur="500"/>
+                                        <p:tgtEl>
+                                          <p:spTgt spid="3">
+                                            <p:txEl>
+                                              <p:pRg st="2" end="2"/>
+                                            </p:txEl>
+                                          </p:spTgt>
+                                        </p:tgtEl>
+                                      </p:cBhvr>
+                                    </p:animEffect>
+                                  </p:childTnLst>
+                                </p:cTn>
+                              </p:par>
+                              <p:par>
+                                <p:cTn id="19" presetID="10" presetClass="entr" presetSubtype="0" fill="hold" nodeType="withEffect">
+                                  <p:stCondLst>
+                                    <p:cond delay="0"/>
+                                  </p:stCondLst>
+                                  <p:childTnLst>
+                                    <p:set>
+                                      <p:cBhvr>
+                                        <p:cTn id="20" dur="1" fill="hold">
+                                          <p:stCondLst>
+                                            <p:cond delay="0"/>
+                                          </p:stCondLst>
+                                        </p:cTn>
+                                        <p:tgtEl>
+                                          <p:spTgt spid="3">
+                                            <p:txEl>
+                                              <p:pRg st="3" end="3"/>
+                                            </p:txEl>
+                                          </p:spTgt>
+                                        </p:tgtEl>
+                                        <p:attrNameLst>
+                                          <p:attrName>style.visibility</p:attrName>
+                                        </p:attrNameLst>
+                                      </p:cBhvr>
+                                      <p:to>
+                                        <p:strVal val="visible"/>
+                                      </p:to>
+                                    </p:set>
+                                    <p:animEffect transition="in" filter="fade">
+                                      <p:cBhvr>
+                                        <p:cTn id="21" dur="500"/>
+                                        <p:tgtEl>
+                                          <p:spTgt spid="3">
+                                            <p:txEl>
+                                              <p:pRg st="3" end="3"/>
+                                            </p:txEl>
+                                          </p:spTgt>
+                                        </p:tgtEl>
+                                      </p:cBhvr>
+                                    </p:animEffect>
+                                  </p:childTnLst>
+                                </p:cTn>
+                              </p:par>
+                              <p:par>
+                                <p:cTn id="22" presetID="10" presetClass="entr" presetSubtype="0" fill="hold" nodeType="withEffect">
+                                  <p:stCondLst>
+                                    <p:cond delay="0"/>
+                                  </p:stCondLst>
+                                  <p:childTnLst>
+                                    <p:set>
+                                      <p:cBhvr>
+                                        <p:cTn id="23" dur="1" fill="hold">
+                                          <p:stCondLst>
+                                            <p:cond delay="0"/>
+                                          </p:stCondLst>
+                                        </p:cTn>
+                                        <p:tgtEl>
+                                          <p:spTgt spid="3">
+                                            <p:txEl>
+                                              <p:pRg st="4" end="4"/>
+                                            </p:txEl>
+                                          </p:spTgt>
+                                        </p:tgtEl>
+                                        <p:attrNameLst>
+                                          <p:attrName>style.visibility</p:attrName>
+                                        </p:attrNameLst>
+                                      </p:cBhvr>
+                                      <p:to>
+                                        <p:strVal val="visible"/>
+                                      </p:to>
+                                    </p:set>
+                                    <p:animEffect transition="in" filter="fade">
+                                      <p:cBhvr>
+                                        <p:cTn id="24" dur="500"/>
+                                        <p:tgtEl>
+                                          <p:spTgt spid="3">
+                                            <p:txEl>
+                                              <p:pRg st="4" end="4"/>
+                                            </p:txEl>
+                                          </p:spTgt>
+                                        </p:tgtEl>
+                                      </p:cBhvr>
+                                    </p:animEffect>
+                                  </p:childTnLst>
+                                </p:cTn>
+                              </p:par>
+                              <p:par>
+                                <p:cTn id="25" presetID="10" presetClass="entr" presetSubtype="0" fill="hold" nodeType="withEffect">
+                                  <p:stCondLst>
+                                    <p:cond delay="0"/>
+                                  </p:stCondLst>
+                                  <p:childTnLst>
+                                    <p:set>
+                                      <p:cBhvr>
+                                        <p:cTn id="26" dur="1" fill="hold">
+                                          <p:stCondLst>
+                                            <p:cond delay="0"/>
+                                          </p:stCondLst>
+                                        </p:cTn>
+                                        <p:tgtEl>
+                                          <p:spTgt spid="3">
+                                            <p:txEl>
+                                              <p:pRg st="5" end="5"/>
+                                            </p:txEl>
+                                          </p:spTgt>
+                                        </p:tgtEl>
+                                        <p:attrNameLst>
+                                          <p:attrName>style.visibility</p:attrName>
+                                        </p:attrNameLst>
+                                      </p:cBhvr>
+                                      <p:to>
+                                        <p:strVal val="visible"/>
+                                      </p:to>
+                                    </p:set>
+                                    <p:animEffect transition="in" filter="fade">
+                                      <p:cBhvr>
+                                        <p:cTn id="27" dur="500"/>
+                                        <p:tgtEl>
+                                          <p:spTgt spid="3">
+                                            <p:txEl>
+                                              <p:pRg st="5" end="5"/>
+                                            </p:txEl>
+                                          </p:spTgt>
+                                        </p:tgtEl>
+                                      </p:cBhvr>
+                                    </p:animEffect>
+                                  </p:childTnLst>
+                                </p:cTn>
+                              </p:par>
+                              <p:par>
+                                <p:cTn id="28" presetID="10" presetClass="entr" presetSubtype="0" fill="hold" nodeType="withEffect">
+                                  <p:stCondLst>
+                                    <p:cond delay="0"/>
+                                  </p:stCondLst>
+                                  <p:childTnLst>
+                                    <p:set>
+                                      <p:cBhvr>
+                                        <p:cTn id="29" dur="1" fill="hold">
+                                          <p:stCondLst>
+                                            <p:cond delay="0"/>
+                                          </p:stCondLst>
+                                        </p:cTn>
+                                        <p:tgtEl>
+                                          <p:spTgt spid="3">
+                                            <p:txEl>
+                                              <p:pRg st="6" end="6"/>
+                                            </p:txEl>
+                                          </p:spTgt>
+                                        </p:tgtEl>
+                                        <p:attrNameLst>
+                                          <p:attrName>style.visibility</p:attrName>
+                                        </p:attrNameLst>
+                                      </p:cBhvr>
+                                      <p:to>
+                                        <p:strVal val="visible"/>
+                                      </p:to>
+                                    </p:set>
+                                    <p:animEffect transition="in" filter="fade">
+                                      <p:cBhvr>
+                                        <p:cTn id="30" dur="500"/>
+                                        <p:tgtEl>
+                                          <p:spTgt spid="3">
+                                            <p:txEl>
+                                              <p:pRg st="6" end="6"/>
+                                            </p:txEl>
+                                          </p:spTgt>
+                                        </p:tgtEl>
+                                      </p:cBhvr>
+                                    </p:animEffect>
+                                  </p:childTnLst>
+                                </p:cTn>
+                              </p:par>
+                              <p:par>
+                                <p:cTn id="31" presetID="10" presetClass="entr" presetSubtype="0" fill="hold" nodeType="withEffect">
+                                  <p:stCondLst>
+                                    <p:cond delay="0"/>
+                                  </p:stCondLst>
+                                  <p:childTnLst>
+                                    <p:set>
+                                      <p:cBhvr>
+                                        <p:cTn id="32" dur="1" fill="hold">
+                                          <p:stCondLst>
+                                            <p:cond delay="0"/>
+                                          </p:stCondLst>
+                                        </p:cTn>
+                                        <p:tgtEl>
+                                          <p:spTgt spid="3">
+                                            <p:txEl>
+                                              <p:pRg st="7" end="7"/>
+                                            </p:txEl>
+                                          </p:spTgt>
+                                        </p:tgtEl>
+                                        <p:attrNameLst>
+                                          <p:attrName>style.visibility</p:attrName>
+                                        </p:attrNameLst>
+                                      </p:cBhvr>
+                                      <p:to>
+                                        <p:strVal val="visible"/>
+                                      </p:to>
+                                    </p:set>
+                                    <p:animEffect transition="in" filter="fade">
+                                      <p:cBhvr>
+                                        <p:cTn id="33" dur="500"/>
+                                        <p:tgtEl>
+                                          <p:spTgt spid="3">
+                                            <p:txEl>
+                                              <p:pRg st="7" end="7"/>
+                                            </p:txEl>
+                                          </p:spTgt>
+                                        </p:tgtEl>
+                                      </p:cBhvr>
+                                    </p:animEffect>
+                                  </p:childTnLst>
+                                </p:cTn>
+                              </p:par>
+                              <p:par>
+                                <p:cTn id="34" presetID="10" presetClass="entr" presetSubtype="0" fill="hold" nodeType="withEffect">
+                                  <p:stCondLst>
+                                    <p:cond delay="0"/>
+                                  </p:stCondLst>
+                                  <p:childTnLst>
+                                    <p:set>
+                                      <p:cBhvr>
+                                        <p:cTn id="35" dur="1" fill="hold">
+                                          <p:stCondLst>
+                                            <p:cond delay="0"/>
+                                          </p:stCondLst>
+                                        </p:cTn>
+                                        <p:tgtEl>
+                                          <p:spTgt spid="3">
+                                            <p:txEl>
+                                              <p:pRg st="8" end="8"/>
+                                            </p:txEl>
+                                          </p:spTgt>
+                                        </p:tgtEl>
+                                        <p:attrNameLst>
+                                          <p:attrName>style.visibility</p:attrName>
+                                        </p:attrNameLst>
+                                      </p:cBhvr>
+                                      <p:to>
+                                        <p:strVal val="visible"/>
+                                      </p:to>
+                                    </p:set>
+                                    <p:animEffect transition="in" filter="fade">
+                                      <p:cBhvr>
+                                        <p:cTn id="36" dur="500"/>
+                                        <p:tgtEl>
+                                          <p:spTgt spid="3">
+                                            <p:txEl>
+                                              <p:pRg st="8" end="8"/>
+                                            </p:txEl>
+                                          </p:spTgt>
+                                        </p:tgtEl>
+                                      </p:cBhvr>
+                                    </p:animEffect>
+                                  </p:childTnLst>
+                                </p:cTn>
+                              </p:par>
+                              <p:par>
+                                <p:cTn id="37" presetID="10" presetClass="entr" presetSubtype="0" fill="hold" nodeType="withEffect">
+                                  <p:stCondLst>
+                                    <p:cond delay="0"/>
+                                  </p:stCondLst>
+                                  <p:childTnLst>
+                                    <p:set>
+                                      <p:cBhvr>
+                                        <p:cTn id="38" dur="1" fill="hold">
+                                          <p:stCondLst>
+                                            <p:cond delay="0"/>
+                                          </p:stCondLst>
+                                        </p:cTn>
+                                        <p:tgtEl>
+                                          <p:spTgt spid="3">
+                                            <p:txEl>
+                                              <p:pRg st="9" end="9"/>
+                                            </p:txEl>
+                                          </p:spTgt>
+                                        </p:tgtEl>
+                                        <p:attrNameLst>
+                                          <p:attrName>style.visibility</p:attrName>
+                                        </p:attrNameLst>
+                                      </p:cBhvr>
+                                      <p:to>
+                                        <p:strVal val="visible"/>
+                                      </p:to>
+                                    </p:set>
+                                    <p:animEffect transition="in" filter="fade">
+                                      <p:cBhvr>
+                                        <p:cTn id="39" dur="500"/>
+                                        <p:tgtEl>
+                                          <p:spTgt spid="3">
+                                            <p:txEl>
+                                              <p:pRg st="9" end="9"/>
+                                            </p:txEl>
+                                          </p:spTgt>
+                                        </p:tgtEl>
+                                      </p:cBhvr>
+                                    </p:animEffect>
+                                  </p:childTnLst>
+                                </p:cTn>
+                              </p:par>
+                            </p:childTnLst>
+                          </p:cTn>
+                        </p:par>
+                      </p:childTnLst>
+                    </p:cTn>
+                  </p:par>
+                </p:childTnLst>
+              </p:cTn>
+              <p:prevCondLst>
+                <p:cond evt="onPrev" delay="0">
+                  <p:tgtEl>
+                    <p:sldTgt/>
+                  </p:tgtEl>
+                </p:cond>
+              </p:prevCondLst>
+              <p:nextCondLst>
+                <p:cond evt="onNext" delay="0">
+                  <p:tgtEl>
+                    <p:sldTgt/>
+                  </p:tgtEl>
+                </p:cond>
+              </p:nextCondLst>
+            </p:seq>
+          </p:childTnLst>
+        </p:cTn>
+      </p:par>
+    </p:tnLst>
+    <p:bldLst>
+      <p:bldP spid="2" grpId="0"/>
+    </p:bldLst>
+  </p:timing>
+</p:sld>
+</file>
+
+<file path=ppt/slides/slide19.xml><?xml version="1.0" encoding="utf-8"?>
+<p:sld xmlns:a="http://schemas.openxmlformats.org/drawingml/2006/main" xmlns:r="http://schemas.openxmlformats.org/officeDocument/2006/relationships" xmlns:p="http://schemas.openxmlformats.org/presentationml/2006/main">
+  <p:cSld>
+    <p:spTree>
+      <p:nvGrpSpPr>
+        <p:cNvPr id="1" name=""/>
+        <p:cNvGrpSpPr/>
+        <p:nvPr/>
+      </p:nvGrpSpPr>
+      <p:grpSpPr>
+        <a:xfrm>
+          <a:off x="0" y="0"/>
+          <a:ext cx="0" cy="0"/>
+          <a:chOff x="0" y="0"/>
+          <a:chExt cx="0" cy="0"/>
+        </a:xfrm>
+      </p:grpSpPr>
+      <p:sp>
+        <p:nvSpPr>
+          <p:cNvPr id="2" name="Title 1">
+            <a:extLst>
+              <a:ext uri="{FF2B5EF4-FFF2-40B4-BE49-F238E27FC236}">
+                <a16:creationId xmlns:a16="http://schemas.microsoft.com/office/drawing/2014/main" id="{B50330EF-B5EC-46E4-B867-D3E24A6E239D}"/>
+              </a:ext>
+            </a:extLst>
+          </p:cNvPr>
+          <p:cNvSpPr>
+            <a:spLocks noGrp="1"/>
+          </p:cNvSpPr>
+          <p:nvPr>
+            <p:ph type="title"/>
+          </p:nvPr>
+        </p:nvSpPr>
+        <p:spPr>
+          <a:xfrm>
+            <a:off x="1243012" y="-113002"/>
+            <a:ext cx="9905998" cy="1478570"/>
+          </a:xfrm>
+        </p:spPr>
+        <p:txBody>
+          <a:bodyPr>
+            <a:normAutofit/>
+          </a:bodyPr>
+          <a:lstStyle/>
+          <a:p>
+            <a:r>
+              <a:rPr lang="lv-LV" sz="4800" dirty="0"/>
+              <a:t>Izmantotā literatūra</a:t>
+            </a:r>
+          </a:p>
+        </p:txBody>
+      </p:sp>
+      <p:sp>
+        <p:nvSpPr>
+          <p:cNvPr id="3" name="Content Placeholder 2">
+            <a:extLst>
+              <a:ext uri="{FF2B5EF4-FFF2-40B4-BE49-F238E27FC236}">
+                <a16:creationId xmlns:a16="http://schemas.microsoft.com/office/drawing/2014/main" id="{C0BDF603-85F5-46C4-BD81-37710BD2D123}"/>
+              </a:ext>
+            </a:extLst>
+          </p:cNvPr>
+          <p:cNvSpPr>
+            <a:spLocks noGrp="1"/>
+          </p:cNvSpPr>
+          <p:nvPr>
+            <p:ph idx="1"/>
+          </p:nvPr>
+        </p:nvSpPr>
+        <p:spPr>
+          <a:xfrm>
             <a:off x="843280" y="1036320"/>
             <a:ext cx="10668000" cy="5537200"/>
           </a:xfrm>
@@ -20837,161 +23238,6 @@
         </p:cTn>
       </p:par>
     </p:tnLst>
-  </p:timing>
-</p:sld>
-</file>
-
-<file path=ppt/slides/slide19.xml><?xml version="1.0" encoding="utf-8"?>
-<p:sld xmlns:a="http://schemas.openxmlformats.org/drawingml/2006/main" xmlns:r="http://schemas.openxmlformats.org/officeDocument/2006/relationships" xmlns:p="http://schemas.openxmlformats.org/presentationml/2006/main">
-  <p:cSld>
-    <p:spTree>
-      <p:nvGrpSpPr>
-        <p:cNvPr id="1" name=""/>
-        <p:cNvGrpSpPr/>
-        <p:nvPr/>
-      </p:nvGrpSpPr>
-      <p:grpSpPr>
-        <a:xfrm>
-          <a:off x="0" y="0"/>
-          <a:ext cx="0" cy="0"/>
-          <a:chOff x="0" y="0"/>
-          <a:chExt cx="0" cy="0"/>
-        </a:xfrm>
-      </p:grpSpPr>
-      <p:sp>
-        <p:nvSpPr>
-          <p:cNvPr id="2" name="Title 1">
-            <a:extLst>
-              <a:ext uri="{FF2B5EF4-FFF2-40B4-BE49-F238E27FC236}">
-                <a16:creationId xmlns:a16="http://schemas.microsoft.com/office/drawing/2014/main" id="{8D5F35C7-3032-47FF-A98B-DDF28C3AF8B8}"/>
-              </a:ext>
-            </a:extLst>
-          </p:cNvPr>
-          <p:cNvSpPr>
-            <a:spLocks noGrp="1"/>
-          </p:cNvSpPr>
-          <p:nvPr>
-            <p:ph type="title"/>
-          </p:nvPr>
-        </p:nvSpPr>
-        <p:spPr>
-          <a:xfrm>
-            <a:off x="1143001" y="2689715"/>
-            <a:ext cx="9905998" cy="1478570"/>
-          </a:xfrm>
-        </p:spPr>
-        <p:txBody>
-          <a:bodyPr>
-            <a:normAutofit/>
-          </a:bodyPr>
-          <a:lstStyle/>
-          <a:p>
-            <a:pPr algn="ctr"/>
-            <a:r>
-              <a:rPr lang="lv-LV" sz="7200" dirty="0"/>
-              <a:t>PALDIES PAR UZMANĪBU!</a:t>
-            </a:r>
-          </a:p>
-        </p:txBody>
-      </p:sp>
-    </p:spTree>
-    <p:extLst>
-      <p:ext uri="{BB962C8B-B14F-4D97-AF65-F5344CB8AC3E}">
-        <p14:creationId xmlns:p14="http://schemas.microsoft.com/office/powerpoint/2010/main" val="2880640806"/>
-      </p:ext>
-    </p:extLst>
-  </p:cSld>
-  <p:clrMapOvr>
-    <a:masterClrMapping/>
-  </p:clrMapOvr>
-  <p:timing>
-    <p:tnLst>
-      <p:par>
-        <p:cTn id="1" dur="indefinite" restart="never" nodeType="tmRoot">
-          <p:childTnLst>
-            <p:seq concurrent="1" nextAc="seek">
-              <p:cTn id="2" dur="indefinite" nodeType="mainSeq">
-                <p:childTnLst>
-                  <p:par>
-                    <p:cTn id="3" fill="hold">
-                      <p:stCondLst>
-                        <p:cond delay="indefinite"/>
-                        <p:cond evt="onBegin" delay="0">
-                          <p:tn val="2"/>
-                        </p:cond>
-                      </p:stCondLst>
-                      <p:childTnLst>
-                        <p:par>
-                          <p:cTn id="4" fill="hold">
-                            <p:stCondLst>
-                              <p:cond delay="0"/>
-                            </p:stCondLst>
-                            <p:childTnLst>
-                              <p:par>
-                                <p:cTn id="5" presetID="10" presetClass="entr" presetSubtype="0" fill="hold" grpId="0" nodeType="withEffect">
-                                  <p:stCondLst>
-                                    <p:cond delay="0"/>
-                                  </p:stCondLst>
-                                  <p:childTnLst>
-                                    <p:set>
-                                      <p:cBhvr>
-                                        <p:cTn id="6" dur="1" fill="hold">
-                                          <p:stCondLst>
-                                            <p:cond delay="0"/>
-                                          </p:stCondLst>
-                                        </p:cTn>
-                                        <p:tgtEl>
-                                          <p:spTgt spid="2"/>
-                                        </p:tgtEl>
-                                        <p:attrNameLst>
-                                          <p:attrName>style.visibility</p:attrName>
-                                        </p:attrNameLst>
-                                      </p:cBhvr>
-                                      <p:to>
-                                        <p:strVal val="visible"/>
-                                      </p:to>
-                                    </p:set>
-                                    <p:animEffect transition="in" filter="fade">
-                                      <p:cBhvr>
-                                        <p:cTn id="7" dur="500"/>
-                                        <p:tgtEl>
-                                          <p:spTgt spid="2"/>
-                                        </p:tgtEl>
-                                      </p:cBhvr>
-                                    </p:animEffect>
-                                  </p:childTnLst>
-                                </p:cTn>
-                              </p:par>
-                            </p:childTnLst>
-                          </p:cTn>
-                        </p:par>
-                      </p:childTnLst>
-                    </p:cTn>
-                  </p:par>
-                </p:childTnLst>
-              </p:cTn>
-              <p:prevCondLst>
-                <p:cond evt="onPrev" delay="0">
-                  <p:tgtEl>
-                    <p:sldTgt/>
-                  </p:tgtEl>
-                </p:cond>
-              </p:prevCondLst>
-              <p:nextCondLst>
-                <p:cond evt="onNext" delay="0">
-                  <p:tgtEl>
-                    <p:sldTgt/>
-                  </p:tgtEl>
-                </p:cond>
-              </p:nextCondLst>
-            </p:seq>
-          </p:childTnLst>
-        </p:cTn>
-      </p:par>
-    </p:tnLst>
-    <p:bldLst>
-      <p:bldP spid="2" grpId="0"/>
-    </p:bldLst>
   </p:timing>
 </p:sld>
 </file>
@@ -21839,6 +24085,161 @@
 </p:sld>
 </file>
 
+<file path=ppt/slides/slide20.xml><?xml version="1.0" encoding="utf-8"?>
+<p:sld xmlns:a="http://schemas.openxmlformats.org/drawingml/2006/main" xmlns:r="http://schemas.openxmlformats.org/officeDocument/2006/relationships" xmlns:p="http://schemas.openxmlformats.org/presentationml/2006/main">
+  <p:cSld>
+    <p:spTree>
+      <p:nvGrpSpPr>
+        <p:cNvPr id="1" name=""/>
+        <p:cNvGrpSpPr/>
+        <p:nvPr/>
+      </p:nvGrpSpPr>
+      <p:grpSpPr>
+        <a:xfrm>
+          <a:off x="0" y="0"/>
+          <a:ext cx="0" cy="0"/>
+          <a:chOff x="0" y="0"/>
+          <a:chExt cx="0" cy="0"/>
+        </a:xfrm>
+      </p:grpSpPr>
+      <p:sp>
+        <p:nvSpPr>
+          <p:cNvPr id="2" name="Title 1">
+            <a:extLst>
+              <a:ext uri="{FF2B5EF4-FFF2-40B4-BE49-F238E27FC236}">
+                <a16:creationId xmlns:a16="http://schemas.microsoft.com/office/drawing/2014/main" id="{8D5F35C7-3032-47FF-A98B-DDF28C3AF8B8}"/>
+              </a:ext>
+            </a:extLst>
+          </p:cNvPr>
+          <p:cNvSpPr>
+            <a:spLocks noGrp="1"/>
+          </p:cNvSpPr>
+          <p:nvPr>
+            <p:ph type="title"/>
+          </p:nvPr>
+        </p:nvSpPr>
+        <p:spPr>
+          <a:xfrm>
+            <a:off x="1143001" y="2689715"/>
+            <a:ext cx="9905998" cy="1478570"/>
+          </a:xfrm>
+        </p:spPr>
+        <p:txBody>
+          <a:bodyPr>
+            <a:normAutofit/>
+          </a:bodyPr>
+          <a:lstStyle/>
+          <a:p>
+            <a:pPr algn="ctr"/>
+            <a:r>
+              <a:rPr lang="lv-LV" sz="7200" dirty="0"/>
+              <a:t>PALDIES PAR UZMANĪBU!</a:t>
+            </a:r>
+          </a:p>
+        </p:txBody>
+      </p:sp>
+    </p:spTree>
+    <p:extLst>
+      <p:ext uri="{BB962C8B-B14F-4D97-AF65-F5344CB8AC3E}">
+        <p14:creationId xmlns:p14="http://schemas.microsoft.com/office/powerpoint/2010/main" val="2880640806"/>
+      </p:ext>
+    </p:extLst>
+  </p:cSld>
+  <p:clrMapOvr>
+    <a:masterClrMapping/>
+  </p:clrMapOvr>
+  <p:timing>
+    <p:tnLst>
+      <p:par>
+        <p:cTn id="1" dur="indefinite" restart="never" nodeType="tmRoot">
+          <p:childTnLst>
+            <p:seq concurrent="1" nextAc="seek">
+              <p:cTn id="2" dur="indefinite" nodeType="mainSeq">
+                <p:childTnLst>
+                  <p:par>
+                    <p:cTn id="3" fill="hold">
+                      <p:stCondLst>
+                        <p:cond delay="indefinite"/>
+                        <p:cond evt="onBegin" delay="0">
+                          <p:tn val="2"/>
+                        </p:cond>
+                      </p:stCondLst>
+                      <p:childTnLst>
+                        <p:par>
+                          <p:cTn id="4" fill="hold">
+                            <p:stCondLst>
+                              <p:cond delay="0"/>
+                            </p:stCondLst>
+                            <p:childTnLst>
+                              <p:par>
+                                <p:cTn id="5" presetID="10" presetClass="entr" presetSubtype="0" fill="hold" grpId="0" nodeType="withEffect">
+                                  <p:stCondLst>
+                                    <p:cond delay="0"/>
+                                  </p:stCondLst>
+                                  <p:childTnLst>
+                                    <p:set>
+                                      <p:cBhvr>
+                                        <p:cTn id="6" dur="1" fill="hold">
+                                          <p:stCondLst>
+                                            <p:cond delay="0"/>
+                                          </p:stCondLst>
+                                        </p:cTn>
+                                        <p:tgtEl>
+                                          <p:spTgt spid="2"/>
+                                        </p:tgtEl>
+                                        <p:attrNameLst>
+                                          <p:attrName>style.visibility</p:attrName>
+                                        </p:attrNameLst>
+                                      </p:cBhvr>
+                                      <p:to>
+                                        <p:strVal val="visible"/>
+                                      </p:to>
+                                    </p:set>
+                                    <p:animEffect transition="in" filter="fade">
+                                      <p:cBhvr>
+                                        <p:cTn id="7" dur="500"/>
+                                        <p:tgtEl>
+                                          <p:spTgt spid="2"/>
+                                        </p:tgtEl>
+                                      </p:cBhvr>
+                                    </p:animEffect>
+                                  </p:childTnLst>
+                                </p:cTn>
+                              </p:par>
+                            </p:childTnLst>
+                          </p:cTn>
+                        </p:par>
+                      </p:childTnLst>
+                    </p:cTn>
+                  </p:par>
+                </p:childTnLst>
+              </p:cTn>
+              <p:prevCondLst>
+                <p:cond evt="onPrev" delay="0">
+                  <p:tgtEl>
+                    <p:sldTgt/>
+                  </p:tgtEl>
+                </p:cond>
+              </p:prevCondLst>
+              <p:nextCondLst>
+                <p:cond evt="onNext" delay="0">
+                  <p:tgtEl>
+                    <p:sldTgt/>
+                  </p:tgtEl>
+                </p:cond>
+              </p:nextCondLst>
+            </p:seq>
+          </p:childTnLst>
+        </p:cTn>
+      </p:par>
+    </p:tnLst>
+    <p:bldLst>
+      <p:bldP spid="2" grpId="0"/>
+    </p:bldLst>
+  </p:timing>
+</p:sld>
+</file>
+
 <file path=ppt/slides/slide3.xml><?xml version="1.0" encoding="utf-8"?>
 <p:sld xmlns:a="http://schemas.openxmlformats.org/drawingml/2006/main" xmlns:r="http://schemas.openxmlformats.org/officeDocument/2006/relationships" xmlns:p="http://schemas.openxmlformats.org/presentationml/2006/main">
   <p:cSld>
@@ -22160,6 +24561,66 @@
           </a:prstGeom>
         </p:spPr>
       </p:pic>
+      <p:pic>
+        <p:nvPicPr>
+          <p:cNvPr id="7" name="Picture 6">
+            <a:extLst>
+              <a:ext uri="{FF2B5EF4-FFF2-40B4-BE49-F238E27FC236}">
+                <a16:creationId xmlns:a16="http://schemas.microsoft.com/office/drawing/2014/main" id="{7303C9EE-D3FB-4B9D-8FE4-1344327D2BD2}"/>
+              </a:ext>
+            </a:extLst>
+          </p:cNvPr>
+          <p:cNvPicPr>
+            <a:picLocks noChangeAspect="1"/>
+          </p:cNvPicPr>
+          <p:nvPr/>
+        </p:nvPicPr>
+        <p:blipFill>
+          <a:blip r:embed="rId4"/>
+          <a:stretch>
+            <a:fillRect/>
+          </a:stretch>
+        </p:blipFill>
+        <p:spPr>
+          <a:xfrm>
+            <a:off x="9236345" y="1451193"/>
+            <a:ext cx="2381250" cy="533400"/>
+          </a:xfrm>
+          <a:prstGeom prst="rect">
+            <a:avLst/>
+          </a:prstGeom>
+        </p:spPr>
+      </p:pic>
+      <p:pic>
+        <p:nvPicPr>
+          <p:cNvPr id="8" name="Picture 7">
+            <a:extLst>
+              <a:ext uri="{FF2B5EF4-FFF2-40B4-BE49-F238E27FC236}">
+                <a16:creationId xmlns:a16="http://schemas.microsoft.com/office/drawing/2014/main" id="{D23ABC20-9248-45F0-BED1-1D237B3A3AC4}"/>
+              </a:ext>
+            </a:extLst>
+          </p:cNvPr>
+          <p:cNvPicPr>
+            <a:picLocks noChangeAspect="1"/>
+          </p:cNvPicPr>
+          <p:nvPr/>
+        </p:nvPicPr>
+        <p:blipFill>
+          <a:blip r:embed="rId5"/>
+          <a:stretch>
+            <a:fillRect/>
+          </a:stretch>
+        </p:blipFill>
+        <p:spPr>
+          <a:xfrm>
+            <a:off x="8892611" y="2299283"/>
+            <a:ext cx="2381250" cy="571500"/>
+          </a:xfrm>
+          <a:prstGeom prst="rect">
+            <a:avLst/>
+          </a:prstGeom>
+        </p:spPr>
+      </p:pic>
     </p:spTree>
     <p:extLst>
       <p:ext uri="{BB962C8B-B14F-4D97-AF65-F5344CB8AC3E}">
@@ -22324,74 +24785,21 @@
                                   </p:childTnLst>
                                 </p:cTn>
                               </p:par>
-                            </p:childTnLst>
-                          </p:cTn>
-                        </p:par>
-                      </p:childTnLst>
-                    </p:cTn>
-                  </p:par>
-                  <p:par>
-                    <p:cTn id="16" fill="hold">
-                      <p:stCondLst>
-                        <p:cond delay="indefinite"/>
-                      </p:stCondLst>
-                      <p:childTnLst>
-                        <p:par>
-                          <p:cTn id="17" fill="hold">
-                            <p:stCondLst>
-                              <p:cond delay="0"/>
-                            </p:stCondLst>
-                            <p:childTnLst>
                               <p:par>
-                                <p:cTn id="18" presetID="10" presetClass="exit" presetSubtype="0" fill="hold" nodeType="clickEffect">
-                                  <p:stCondLst>
-                                    <p:cond delay="0"/>
-                                  </p:stCondLst>
-                                  <p:childTnLst>
-                                    <p:animEffect transition="out" filter="fade">
-                                      <p:cBhvr>
-                                        <p:cTn id="19" dur="500"/>
-                                        <p:tgtEl>
-                                          <p:spTgt spid="4"/>
-                                        </p:tgtEl>
-                                      </p:cBhvr>
-                                    </p:animEffect>
-                                    <p:set>
-                                      <p:cBhvr>
-                                        <p:cTn id="20" dur="1" fill="hold">
-                                          <p:stCondLst>
-                                            <p:cond delay="499"/>
-                                          </p:stCondLst>
-                                        </p:cTn>
-                                        <p:tgtEl>
-                                          <p:spTgt spid="4"/>
-                                        </p:tgtEl>
-                                        <p:attrNameLst>
-                                          <p:attrName>style.visibility</p:attrName>
-                                        </p:attrNameLst>
-                                      </p:cBhvr>
-                                      <p:to>
-                                        <p:strVal val="hidden"/>
-                                      </p:to>
-                                    </p:set>
-                                  </p:childTnLst>
-                                </p:cTn>
-                              </p:par>
-                              <p:par>
-                                <p:cTn id="21" presetID="10" presetClass="entr" presetSubtype="0" fill="hold" nodeType="withEffect">
+                                <p:cTn id="16" presetID="10" presetClass="entr" presetSubtype="0" fill="hold" nodeType="withEffect">
                                   <p:stCondLst>
                                     <p:cond delay="0"/>
                                   </p:stCondLst>
                                   <p:childTnLst>
                                     <p:set>
                                       <p:cBhvr>
-                                        <p:cTn id="22" dur="1" fill="hold">
+                                        <p:cTn id="17" dur="1" fill="hold">
                                           <p:stCondLst>
                                             <p:cond delay="0"/>
                                           </p:stCondLst>
                                         </p:cTn>
                                         <p:tgtEl>
-                                          <p:spTgt spid="5"/>
+                                          <p:spTgt spid="7"/>
                                         </p:tgtEl>
                                         <p:attrNameLst>
                                           <p:attrName>style.visibility</p:attrName>
@@ -22403,52 +24811,9 @@
                                     </p:set>
                                     <p:animEffect transition="in" filter="fade">
                                       <p:cBhvr>
-                                        <p:cTn id="23" dur="500"/>
-                                        <p:tgtEl>
-                                          <p:spTgt spid="5"/>
-                                        </p:tgtEl>
-                                      </p:cBhvr>
-                                    </p:animEffect>
-                                  </p:childTnLst>
-                                </p:cTn>
-                              </p:par>
-                              <p:par>
-                                <p:cTn id="24" presetID="10" presetClass="entr" presetSubtype="0" fill="hold" nodeType="withEffect">
-                                  <p:stCondLst>
-                                    <p:cond delay="0"/>
-                                  </p:stCondLst>
-                                  <p:childTnLst>
-                                    <p:set>
-                                      <p:cBhvr>
-                                        <p:cTn id="25" dur="1" fill="hold">
-                                          <p:stCondLst>
-                                            <p:cond delay="0"/>
-                                          </p:stCondLst>
-                                        </p:cTn>
-                                        <p:tgtEl>
-                                          <p:spTgt spid="3">
-                                            <p:txEl>
-                                              <p:pRg st="1" end="1"/>
-                                            </p:txEl>
-                                          </p:spTgt>
-                                        </p:tgtEl>
-                                        <p:attrNameLst>
-                                          <p:attrName>style.visibility</p:attrName>
-                                        </p:attrNameLst>
-                                      </p:cBhvr>
-                                      <p:to>
-                                        <p:strVal val="visible"/>
-                                      </p:to>
-                                    </p:set>
-                                    <p:animEffect transition="in" filter="fade">
-                                      <p:cBhvr>
-                                        <p:cTn id="26" dur="500"/>
-                                        <p:tgtEl>
-                                          <p:spTgt spid="3">
-                                            <p:txEl>
-                                              <p:pRg st="1" end="1"/>
-                                            </p:txEl>
-                                          </p:spTgt>
+                                        <p:cTn id="18" dur="500"/>
+                                        <p:tgtEl>
+                                          <p:spTgt spid="7"/>
                                         </p:tgtEl>
                                       </p:cBhvr>
                                     </p:animEffect>
@@ -22462,36 +24827,102 @@
                     </p:cTn>
                   </p:par>
                   <p:par>
-                    <p:cTn id="27" fill="hold">
+                    <p:cTn id="19" fill="hold">
                       <p:stCondLst>
                         <p:cond delay="indefinite"/>
                       </p:stCondLst>
                       <p:childTnLst>
                         <p:par>
-                          <p:cTn id="28" fill="hold">
+                          <p:cTn id="20" fill="hold">
                             <p:stCondLst>
                               <p:cond delay="0"/>
                             </p:stCondLst>
                             <p:childTnLst>
                               <p:par>
-                                <p:cTn id="29" presetID="10" presetClass="entr" presetSubtype="0" fill="hold" nodeType="clickEffect">
+                                <p:cTn id="21" presetID="10" presetClass="exit" presetSubtype="0" fill="hold" nodeType="clickEffect">
+                                  <p:stCondLst>
+                                    <p:cond delay="0"/>
+                                  </p:stCondLst>
+                                  <p:childTnLst>
+                                    <p:animEffect transition="out" filter="fade">
+                                      <p:cBhvr>
+                                        <p:cTn id="22" dur="500"/>
+                                        <p:tgtEl>
+                                          <p:spTgt spid="4"/>
+                                        </p:tgtEl>
+                                      </p:cBhvr>
+                                    </p:animEffect>
+                                    <p:set>
+                                      <p:cBhvr>
+                                        <p:cTn id="23" dur="1" fill="hold">
+                                          <p:stCondLst>
+                                            <p:cond delay="499"/>
+                                          </p:stCondLst>
+                                        </p:cTn>
+                                        <p:tgtEl>
+                                          <p:spTgt spid="4"/>
+                                        </p:tgtEl>
+                                        <p:attrNameLst>
+                                          <p:attrName>style.visibility</p:attrName>
+                                        </p:attrNameLst>
+                                      </p:cBhvr>
+                                      <p:to>
+                                        <p:strVal val="hidden"/>
+                                      </p:to>
+                                    </p:set>
+                                  </p:childTnLst>
+                                </p:cTn>
+                              </p:par>
+                              <p:par>
+                                <p:cTn id="24" presetID="10" presetClass="exit" presetSubtype="0" fill="hold" nodeType="withEffect">
+                                  <p:stCondLst>
+                                    <p:cond delay="0"/>
+                                  </p:stCondLst>
+                                  <p:childTnLst>
+                                    <p:animEffect transition="out" filter="fade">
+                                      <p:cBhvr>
+                                        <p:cTn id="25" dur="500"/>
+                                        <p:tgtEl>
+                                          <p:spTgt spid="7"/>
+                                        </p:tgtEl>
+                                      </p:cBhvr>
+                                    </p:animEffect>
+                                    <p:set>
+                                      <p:cBhvr>
+                                        <p:cTn id="26" dur="1" fill="hold">
+                                          <p:stCondLst>
+                                            <p:cond delay="499"/>
+                                          </p:stCondLst>
+                                        </p:cTn>
+                                        <p:tgtEl>
+                                          <p:spTgt spid="7"/>
+                                        </p:tgtEl>
+                                        <p:attrNameLst>
+                                          <p:attrName>style.visibility</p:attrName>
+                                        </p:attrNameLst>
+                                      </p:cBhvr>
+                                      <p:to>
+                                        <p:strVal val="hidden"/>
+                                      </p:to>
+                                    </p:set>
+                                  </p:childTnLst>
+                                </p:cTn>
+                              </p:par>
+                              <p:par>
+                                <p:cTn id="27" presetID="10" presetClass="entr" presetSubtype="0" fill="hold" nodeType="withEffect">
                                   <p:stCondLst>
                                     <p:cond delay="0"/>
                                   </p:stCondLst>
                                   <p:childTnLst>
                                     <p:set>
                                       <p:cBhvr>
-                                        <p:cTn id="30" dur="1" fill="hold">
+                                        <p:cTn id="28" dur="1" fill="hold">
                                           <p:stCondLst>
                                             <p:cond delay="0"/>
                                           </p:stCondLst>
                                         </p:cTn>
                                         <p:tgtEl>
-                                          <p:spTgt spid="3">
-                                            <p:txEl>
-                                              <p:pRg st="2" end="2"/>
-                                            </p:txEl>
-                                          </p:spTgt>
+                                          <p:spTgt spid="5"/>
                                         </p:tgtEl>
                                         <p:attrNameLst>
                                           <p:attrName>style.visibility</p:attrName>
@@ -22503,11 +24934,85 @@
                                     </p:set>
                                     <p:animEffect transition="in" filter="fade">
                                       <p:cBhvr>
-                                        <p:cTn id="31" dur="500"/>
+                                        <p:cTn id="29" dur="500"/>
+                                        <p:tgtEl>
+                                          <p:spTgt spid="5"/>
+                                        </p:tgtEl>
+                                      </p:cBhvr>
+                                    </p:animEffect>
+                                  </p:childTnLst>
+                                </p:cTn>
+                              </p:par>
+                              <p:par>
+                                <p:cTn id="30" presetID="10" presetClass="entr" presetSubtype="0" fill="hold" nodeType="withEffect">
+                                  <p:stCondLst>
+                                    <p:cond delay="0"/>
+                                  </p:stCondLst>
+                                  <p:childTnLst>
+                                    <p:set>
+                                      <p:cBhvr>
+                                        <p:cTn id="31" dur="1" fill="hold">
+                                          <p:stCondLst>
+                                            <p:cond delay="0"/>
+                                          </p:stCondLst>
+                                        </p:cTn>
+                                        <p:tgtEl>
+                                          <p:spTgt spid="8"/>
+                                        </p:tgtEl>
+                                        <p:attrNameLst>
+                                          <p:attrName>style.visibility</p:attrName>
+                                        </p:attrNameLst>
+                                      </p:cBhvr>
+                                      <p:to>
+                                        <p:strVal val="visible"/>
+                                      </p:to>
+                                    </p:set>
+                                    <p:animEffect transition="in" filter="fade">
+                                      <p:cBhvr>
+                                        <p:cTn id="32" dur="500"/>
+                                        <p:tgtEl>
+                                          <p:spTgt spid="8"/>
+                                        </p:tgtEl>
+                                      </p:cBhvr>
+                                    </p:animEffect>
+                                  </p:childTnLst>
+                                </p:cTn>
+                              </p:par>
+                              <p:par>
+                                <p:cTn id="33" presetID="10" presetClass="entr" presetSubtype="0" fill="hold" nodeType="withEffect">
+                                  <p:stCondLst>
+                                    <p:cond delay="0"/>
+                                  </p:stCondLst>
+                                  <p:childTnLst>
+                                    <p:set>
+                                      <p:cBhvr>
+                                        <p:cTn id="34" dur="1" fill="hold">
+                                          <p:stCondLst>
+                                            <p:cond delay="0"/>
+                                          </p:stCondLst>
+                                        </p:cTn>
                                         <p:tgtEl>
                                           <p:spTgt spid="3">
                                             <p:txEl>
-                                              <p:pRg st="2" end="2"/>
+                                              <p:pRg st="1" end="1"/>
+                                            </p:txEl>
+                                          </p:spTgt>
+                                        </p:tgtEl>
+                                        <p:attrNameLst>
+                                          <p:attrName>style.visibility</p:attrName>
+                                        </p:attrNameLst>
+                                      </p:cBhvr>
+                                      <p:to>
+                                        <p:strVal val="visible"/>
+                                      </p:to>
+                                    </p:set>
+                                    <p:animEffect transition="in" filter="fade">
+                                      <p:cBhvr>
+                                        <p:cTn id="35" dur="500"/>
+                                        <p:tgtEl>
+                                          <p:spTgt spid="3">
+                                            <p:txEl>
+                                              <p:pRg st="1" end="1"/>
                                             </p:txEl>
                                           </p:spTgt>
                                         </p:tgtEl>
@@ -22523,26 +25028,26 @@
                     </p:cTn>
                   </p:par>
                   <p:par>
-                    <p:cTn id="32" fill="hold">
+                    <p:cTn id="36" fill="hold">
                       <p:stCondLst>
                         <p:cond delay="indefinite"/>
                       </p:stCondLst>
                       <p:childTnLst>
                         <p:par>
-                          <p:cTn id="33" fill="hold">
+                          <p:cTn id="37" fill="hold">
                             <p:stCondLst>
                               <p:cond delay="0"/>
                             </p:stCondLst>
                             <p:childTnLst>
                               <p:par>
-                                <p:cTn id="34" presetID="10" presetClass="entr" presetSubtype="0" fill="hold" nodeType="clickEffect">
+                                <p:cTn id="38" presetID="10" presetClass="entr" presetSubtype="0" fill="hold" nodeType="clickEffect">
                                   <p:stCondLst>
                                     <p:cond delay="0"/>
                                   </p:stCondLst>
                                   <p:childTnLst>
                                     <p:set>
                                       <p:cBhvr>
-                                        <p:cTn id="35" dur="1" fill="hold">
+                                        <p:cTn id="39" dur="1" fill="hold">
                                           <p:stCondLst>
                                             <p:cond delay="0"/>
                                           </p:stCondLst>
@@ -22550,7 +25055,7 @@
                                         <p:tgtEl>
                                           <p:spTgt spid="3">
                                             <p:txEl>
-                                              <p:pRg st="3" end="3"/>
+                                              <p:pRg st="2" end="2"/>
                                             </p:txEl>
                                           </p:spTgt>
                                         </p:tgtEl>
@@ -22564,11 +25069,11 @@
                                     </p:set>
                                     <p:animEffect transition="in" filter="fade">
                                       <p:cBhvr>
-                                        <p:cTn id="36" dur="500"/>
+                                        <p:cTn id="40" dur="500"/>
                                         <p:tgtEl>
                                           <p:spTgt spid="3">
                                             <p:txEl>
-                                              <p:pRg st="3" end="3"/>
+                                              <p:pRg st="2" end="2"/>
                                             </p:txEl>
                                           </p:spTgt>
                                         </p:tgtEl>
@@ -22584,26 +25089,26 @@
                     </p:cTn>
                   </p:par>
                   <p:par>
-                    <p:cTn id="37" fill="hold">
+                    <p:cTn id="41" fill="hold">
                       <p:stCondLst>
                         <p:cond delay="indefinite"/>
                       </p:stCondLst>
                       <p:childTnLst>
                         <p:par>
-                          <p:cTn id="38" fill="hold">
+                          <p:cTn id="42" fill="hold">
                             <p:stCondLst>
                               <p:cond delay="0"/>
                             </p:stCondLst>
                             <p:childTnLst>
                               <p:par>
-                                <p:cTn id="39" presetID="10" presetClass="entr" presetSubtype="0" fill="hold" nodeType="clickEffect">
+                                <p:cTn id="43" presetID="10" presetClass="entr" presetSubtype="0" fill="hold" nodeType="clickEffect">
                                   <p:stCondLst>
                                     <p:cond delay="0"/>
                                   </p:stCondLst>
                                   <p:childTnLst>
                                     <p:set>
                                       <p:cBhvr>
-                                        <p:cTn id="40" dur="1" fill="hold">
+                                        <p:cTn id="44" dur="1" fill="hold">
                                           <p:stCondLst>
                                             <p:cond delay="0"/>
                                           </p:stCondLst>
@@ -22611,7 +25116,7 @@
                                         <p:tgtEl>
                                           <p:spTgt spid="3">
                                             <p:txEl>
-                                              <p:pRg st="4" end="4"/>
+                                              <p:pRg st="3" end="3"/>
                                             </p:txEl>
                                           </p:spTgt>
                                         </p:tgtEl>
@@ -22625,11 +25130,11 @@
                                     </p:set>
                                     <p:animEffect transition="in" filter="fade">
                                       <p:cBhvr>
-                                        <p:cTn id="41" dur="500"/>
+                                        <p:cTn id="45" dur="500"/>
                                         <p:tgtEl>
                                           <p:spTgt spid="3">
                                             <p:txEl>
-                                              <p:pRg st="4" end="4"/>
+                                              <p:pRg st="3" end="3"/>
                                             </p:txEl>
                                           </p:spTgt>
                                         </p:tgtEl>
@@ -22645,26 +25150,26 @@
                     </p:cTn>
                   </p:par>
                   <p:par>
-                    <p:cTn id="42" fill="hold">
+                    <p:cTn id="46" fill="hold">
                       <p:stCondLst>
                         <p:cond delay="indefinite"/>
                       </p:stCondLst>
                       <p:childTnLst>
                         <p:par>
-                          <p:cTn id="43" fill="hold">
+                          <p:cTn id="47" fill="hold">
                             <p:stCondLst>
                               <p:cond delay="0"/>
                             </p:stCondLst>
                             <p:childTnLst>
                               <p:par>
-                                <p:cTn id="44" presetID="10" presetClass="entr" presetSubtype="0" fill="hold" nodeType="clickEffect">
+                                <p:cTn id="48" presetID="10" presetClass="entr" presetSubtype="0" fill="hold" nodeType="clickEffect">
                                   <p:stCondLst>
                                     <p:cond delay="0"/>
                                   </p:stCondLst>
                                   <p:childTnLst>
                                     <p:set>
                                       <p:cBhvr>
-                                        <p:cTn id="45" dur="1" fill="hold">
+                                        <p:cTn id="49" dur="1" fill="hold">
                                           <p:stCondLst>
                                             <p:cond delay="0"/>
                                           </p:stCondLst>
@@ -22672,7 +25177,7 @@
                                         <p:tgtEl>
                                           <p:spTgt spid="3">
                                             <p:txEl>
-                                              <p:pRg st="5" end="5"/>
+                                              <p:pRg st="4" end="4"/>
                                             </p:txEl>
                                           </p:spTgt>
                                         </p:tgtEl>
@@ -22686,11 +25191,11 @@
                                     </p:set>
                                     <p:animEffect transition="in" filter="fade">
                                       <p:cBhvr>
-                                        <p:cTn id="46" dur="500"/>
+                                        <p:cTn id="50" dur="500"/>
                                         <p:tgtEl>
                                           <p:spTgt spid="3">
                                             <p:txEl>
-                                              <p:pRg st="5" end="5"/>
+                                              <p:pRg st="4" end="4"/>
                                             </p:txEl>
                                           </p:spTgt>
                                         </p:tgtEl>
@@ -22706,26 +25211,87 @@
                     </p:cTn>
                   </p:par>
                   <p:par>
-                    <p:cTn id="47" fill="hold">
+                    <p:cTn id="51" fill="hold">
                       <p:stCondLst>
                         <p:cond delay="indefinite"/>
                       </p:stCondLst>
                       <p:childTnLst>
                         <p:par>
-                          <p:cTn id="48" fill="hold">
+                          <p:cTn id="52" fill="hold">
                             <p:stCondLst>
                               <p:cond delay="0"/>
                             </p:stCondLst>
                             <p:childTnLst>
                               <p:par>
-                                <p:cTn id="49" presetID="10" presetClass="entr" presetSubtype="0" fill="hold" nodeType="clickEffect">
+                                <p:cTn id="53" presetID="10" presetClass="entr" presetSubtype="0" fill="hold" nodeType="clickEffect">
                                   <p:stCondLst>
                                     <p:cond delay="0"/>
                                   </p:stCondLst>
                                   <p:childTnLst>
                                     <p:set>
                                       <p:cBhvr>
-                                        <p:cTn id="50" dur="1" fill="hold">
+                                        <p:cTn id="54" dur="1" fill="hold">
+                                          <p:stCondLst>
+                                            <p:cond delay="0"/>
+                                          </p:stCondLst>
+                                        </p:cTn>
+                                        <p:tgtEl>
+                                          <p:spTgt spid="3">
+                                            <p:txEl>
+                                              <p:pRg st="5" end="5"/>
+                                            </p:txEl>
+                                          </p:spTgt>
+                                        </p:tgtEl>
+                                        <p:attrNameLst>
+                                          <p:attrName>style.visibility</p:attrName>
+                                        </p:attrNameLst>
+                                      </p:cBhvr>
+                                      <p:to>
+                                        <p:strVal val="visible"/>
+                                      </p:to>
+                                    </p:set>
+                                    <p:animEffect transition="in" filter="fade">
+                                      <p:cBhvr>
+                                        <p:cTn id="55" dur="500"/>
+                                        <p:tgtEl>
+                                          <p:spTgt spid="3">
+                                            <p:txEl>
+                                              <p:pRg st="5" end="5"/>
+                                            </p:txEl>
+                                          </p:spTgt>
+                                        </p:tgtEl>
+                                      </p:cBhvr>
+                                    </p:animEffect>
+                                  </p:childTnLst>
+                                </p:cTn>
+                              </p:par>
+                            </p:childTnLst>
+                          </p:cTn>
+                        </p:par>
+                      </p:childTnLst>
+                    </p:cTn>
+                  </p:par>
+                  <p:par>
+                    <p:cTn id="56" fill="hold">
+                      <p:stCondLst>
+                        <p:cond delay="indefinite"/>
+                      </p:stCondLst>
+                      <p:childTnLst>
+                        <p:par>
+                          <p:cTn id="57" fill="hold">
+                            <p:stCondLst>
+                              <p:cond delay="0"/>
+                            </p:stCondLst>
+                            <p:childTnLst>
+                              <p:par>
+                                <p:cTn id="58" presetID="10" presetClass="entr" presetSubtype="0" fill="hold" nodeType="clickEffect">
+                                  <p:stCondLst>
+                                    <p:cond delay="0"/>
+                                  </p:stCondLst>
+                                  <p:childTnLst>
+                                    <p:set>
+                                      <p:cBhvr>
+                                        <p:cTn id="59" dur="1" fill="hold">
                                           <p:stCondLst>
                                             <p:cond delay="0"/>
                                           </p:stCondLst>
@@ -22747,7 +25313,7 @@
                                     </p:set>
                                     <p:animEffect transition="in" filter="fade">
                                       <p:cBhvr>
-                                        <p:cTn id="51" dur="500"/>
+                                        <p:cTn id="60" dur="500"/>
                                         <p:tgtEl>
                                           <p:spTgt spid="3">
                                             <p:txEl>
@@ -23204,6 +25770,9 @@
                     <p:cTn id="3" fill="hold">
                       <p:stCondLst>
                         <p:cond delay="indefinite"/>
+                        <p:cond evt="onBegin" delay="0">
+                          <p:tn val="2"/>
+                        </p:cond>
                       </p:stCondLst>
                       <p:childTnLst>
                         <p:par>
@@ -23213,7 +25782,7 @@
                             </p:stCondLst>
                             <p:childTnLst>
                               <p:par>
-                                <p:cTn id="5" presetID="10" presetClass="entr" presetSubtype="0" fill="hold" nodeType="clickEffect">
+                                <p:cTn id="5" presetID="10" presetClass="entr" presetSubtype="0" fill="hold" nodeType="withEffect">
                                   <p:stCondLst>
                                     <p:cond delay="0"/>
                                   </p:stCondLst>

</xml_diff>